<commit_message>
update R/30th and SR-03
</commit_message>
<xml_diff>
--- a/R/スライド/第30回.pptx
+++ b/R/スライド/第30回.pptx
@@ -284,7 +284,7 @@
           <a:p>
             <a:fld id="{5C3D4433-5FBF-1E49-94A9-02E237BA3490}" type="datetimeFigureOut">
               <a:rPr kumimoji="1" lang="ja-JP" altLang="en-US" smtClean="0"/>
-              <a:t>2021/12/10</a:t>
+              <a:t>2022/10/25</a:t>
             </a:fld>
             <a:endParaRPr kumimoji="1" lang="ja-JP" altLang="en-US"/>
           </a:p>
@@ -627,7 +627,20 @@
           <a:bodyPr/>
           <a:lstStyle/>
           <a:p>
-            <a:endParaRPr kumimoji="1" lang="ja-JP" altLang="en-US"/>
+            <a:r>
+              <a:rPr kumimoji="1" lang="ja-JP" altLang="en-US"/>
+              <a:t>カテゴリ変数の場合、各カテゴリに係数が割り振られるのでは？</a:t>
+            </a:r>
+            <a:endParaRPr kumimoji="1" lang="en-US" altLang="ja-JP" dirty="0"/>
+          </a:p>
+          <a:p>
+            <a:endParaRPr kumimoji="1" lang="en-US" altLang="ja-JP" dirty="0"/>
+          </a:p>
+          <a:p>
+            <a:r>
+              <a:rPr kumimoji="1" lang="ja-JP" altLang="en-US"/>
+              <a:t>ランダム効果は、線形モデルでカテゴリごとに与えられる係数を確率分布で表現するイメージ？</a:t>
+            </a:r>
           </a:p>
         </p:txBody>
       </p:sp>
@@ -648,6 +661,100 @@
           <a:p>
             <a:fld id="{9639B2E0-7C4F-B341-AB89-E06623C928CE}" type="slidenum">
               <a:rPr kumimoji="1" lang="ja-JP" altLang="en-US" smtClean="0"/>
+              <a:t>2</a:t>
+            </a:fld>
+            <a:endParaRPr kumimoji="1" lang="ja-JP" altLang="en-US"/>
+          </a:p>
+        </p:txBody>
+      </p:sp>
+    </p:spTree>
+    <p:extLst>
+      <p:ext uri="{BB962C8B-B14F-4D97-AF65-F5344CB8AC3E}">
+        <p14:creationId xmlns:p14="http://schemas.microsoft.com/office/powerpoint/2010/main" val="3689591581"/>
+      </p:ext>
+    </p:extLst>
+  </p:cSld>
+  <p:clrMapOvr>
+    <a:masterClrMapping/>
+  </p:clrMapOvr>
+</p:notes>
+</file>
+
+<file path=ppt/notesSlides/notesSlide2.xml><?xml version="1.0" encoding="utf-8"?>
+<p:notes xmlns:a="http://schemas.openxmlformats.org/drawingml/2006/main" xmlns:r="http://schemas.openxmlformats.org/officeDocument/2006/relationships" xmlns:p="http://schemas.openxmlformats.org/presentationml/2006/main">
+  <p:cSld>
+    <p:spTree>
+      <p:nvGrpSpPr>
+        <p:cNvPr id="1" name=""/>
+        <p:cNvGrpSpPr/>
+        <p:nvPr/>
+      </p:nvGrpSpPr>
+      <p:grpSpPr>
+        <a:xfrm>
+          <a:off x="0" y="0"/>
+          <a:ext cx="0" cy="0"/>
+          <a:chOff x="0" y="0"/>
+          <a:chExt cx="0" cy="0"/>
+        </a:xfrm>
+      </p:grpSpPr>
+      <p:sp>
+        <p:nvSpPr>
+          <p:cNvPr id="2" name="スライド イメージ プレースホルダー 1"/>
+          <p:cNvSpPr>
+            <a:spLocks noGrp="1" noRot="1" noChangeAspect="1"/>
+          </p:cNvSpPr>
+          <p:nvPr>
+            <p:ph type="sldImg"/>
+          </p:nvPr>
+        </p:nvSpPr>
+        <p:spPr/>
+      </p:sp>
+      <p:sp>
+        <p:nvSpPr>
+          <p:cNvPr id="3" name="ノート プレースホルダー 2"/>
+          <p:cNvSpPr>
+            <a:spLocks noGrp="1"/>
+          </p:cNvSpPr>
+          <p:nvPr>
+            <p:ph type="body" idx="1"/>
+          </p:nvPr>
+        </p:nvSpPr>
+        <p:spPr/>
+        <p:txBody>
+          <a:bodyPr/>
+          <a:lstStyle/>
+          <a:p>
+            <a:r>
+              <a:rPr kumimoji="1" lang="ja-JP" altLang="en-US"/>
+              <a:t>なんかここは、具体的な例を出して説明しないと伝わらなさそうな気がする。</a:t>
+            </a:r>
+            <a:endParaRPr kumimoji="1" lang="en-US" altLang="ja-JP" dirty="0"/>
+          </a:p>
+          <a:p>
+            <a:r>
+              <a:rPr kumimoji="1" lang="ja-JP" altLang="en-US"/>
+              <a:t>大事なのは、個別の係数を推定するのではなく、その係数の分散のみを推定すること、それによってモデルの自由度を絞って説明変数のいたずらな増加を防げること。</a:t>
+            </a:r>
+          </a:p>
+        </p:txBody>
+      </p:sp>
+      <p:sp>
+        <p:nvSpPr>
+          <p:cNvPr id="4" name="スライド番号プレースホルダー 3"/>
+          <p:cNvSpPr>
+            <a:spLocks noGrp="1"/>
+          </p:cNvSpPr>
+          <p:nvPr>
+            <p:ph type="sldNum" sz="quarter" idx="5"/>
+          </p:nvPr>
+        </p:nvSpPr>
+        <p:spPr/>
+        <p:txBody>
+          <a:bodyPr/>
+          <a:lstStyle/>
+          <a:p>
+            <a:fld id="{9639B2E0-7C4F-B341-AB89-E06623C928CE}" type="slidenum">
+              <a:rPr kumimoji="1" lang="ja-JP" altLang="en-US" smtClean="0"/>
               <a:t>3</a:t>
             </a:fld>
             <a:endParaRPr kumimoji="1" lang="ja-JP" altLang="en-US"/>
@@ -658,6 +765,90 @@
     <p:extLst>
       <p:ext uri="{BB962C8B-B14F-4D97-AF65-F5344CB8AC3E}">
         <p14:creationId xmlns:p14="http://schemas.microsoft.com/office/powerpoint/2010/main" val="3582969618"/>
+      </p:ext>
+    </p:extLst>
+  </p:cSld>
+  <p:clrMapOvr>
+    <a:masterClrMapping/>
+  </p:clrMapOvr>
+</p:notes>
+</file>
+
+<file path=ppt/notesSlides/notesSlide3.xml><?xml version="1.0" encoding="utf-8"?>
+<p:notes xmlns:a="http://schemas.openxmlformats.org/drawingml/2006/main" xmlns:r="http://schemas.openxmlformats.org/officeDocument/2006/relationships" xmlns:p="http://schemas.openxmlformats.org/presentationml/2006/main">
+  <p:cSld>
+    <p:spTree>
+      <p:nvGrpSpPr>
+        <p:cNvPr id="1" name=""/>
+        <p:cNvGrpSpPr/>
+        <p:nvPr/>
+      </p:nvGrpSpPr>
+      <p:grpSpPr>
+        <a:xfrm>
+          <a:off x="0" y="0"/>
+          <a:ext cx="0" cy="0"/>
+          <a:chOff x="0" y="0"/>
+          <a:chExt cx="0" cy="0"/>
+        </a:xfrm>
+      </p:grpSpPr>
+      <p:sp>
+        <p:nvSpPr>
+          <p:cNvPr id="2" name="スライド イメージ プレースホルダー 1"/>
+          <p:cNvSpPr>
+            <a:spLocks noGrp="1" noRot="1" noChangeAspect="1"/>
+          </p:cNvSpPr>
+          <p:nvPr>
+            <p:ph type="sldImg"/>
+          </p:nvPr>
+        </p:nvSpPr>
+        <p:spPr/>
+      </p:sp>
+      <p:sp>
+        <p:nvSpPr>
+          <p:cNvPr id="3" name="ノート プレースホルダー 2"/>
+          <p:cNvSpPr>
+            <a:spLocks noGrp="1"/>
+          </p:cNvSpPr>
+          <p:nvPr>
+            <p:ph type="body" idx="1"/>
+          </p:nvPr>
+        </p:nvSpPr>
+        <p:spPr/>
+        <p:txBody>
+          <a:bodyPr/>
+          <a:lstStyle/>
+          <a:p>
+            <a:endParaRPr kumimoji="1" lang="ja-JP" altLang="en-US"/>
+          </a:p>
+        </p:txBody>
+      </p:sp>
+      <p:sp>
+        <p:nvSpPr>
+          <p:cNvPr id="4" name="スライド番号プレースホルダー 3"/>
+          <p:cNvSpPr>
+            <a:spLocks noGrp="1"/>
+          </p:cNvSpPr>
+          <p:nvPr>
+            <p:ph type="sldNum" sz="quarter" idx="5"/>
+          </p:nvPr>
+        </p:nvSpPr>
+        <p:spPr/>
+        <p:txBody>
+          <a:bodyPr/>
+          <a:lstStyle/>
+          <a:p>
+            <a:fld id="{9639B2E0-7C4F-B341-AB89-E06623C928CE}" type="slidenum">
+              <a:rPr kumimoji="1" lang="ja-JP" altLang="en-US" smtClean="0"/>
+              <a:t>5</a:t>
+            </a:fld>
+            <a:endParaRPr kumimoji="1" lang="ja-JP" altLang="en-US"/>
+          </a:p>
+        </p:txBody>
+      </p:sp>
+    </p:spTree>
+    <p:extLst>
+      <p:ext uri="{BB962C8B-B14F-4D97-AF65-F5344CB8AC3E}">
+        <p14:creationId xmlns:p14="http://schemas.microsoft.com/office/powerpoint/2010/main" val="1257509647"/>
       </p:ext>
     </p:extLst>
   </p:cSld>
@@ -814,7 +1005,7 @@
           <a:p>
             <a:fld id="{E7AA294B-5299-B042-9CE8-0D364E0B4401}" type="datetimeFigureOut">
               <a:rPr kumimoji="1" lang="ja-JP" altLang="en-US" smtClean="0"/>
-              <a:t>2021/12/10</a:t>
+              <a:t>2022/10/25</a:t>
             </a:fld>
             <a:endParaRPr kumimoji="1" lang="ja-JP" altLang="en-US"/>
           </a:p>
@@ -1044,7 +1235,7 @@
           <a:p>
             <a:fld id="{E7AA294B-5299-B042-9CE8-0D364E0B4401}" type="datetimeFigureOut">
               <a:rPr kumimoji="1" lang="ja-JP" altLang="en-US" smtClean="0"/>
-              <a:t>2021/12/10</a:t>
+              <a:t>2022/10/25</a:t>
             </a:fld>
             <a:endParaRPr kumimoji="1" lang="ja-JP" altLang="en-US"/>
           </a:p>
@@ -1284,7 +1475,7 @@
           <a:p>
             <a:fld id="{E7AA294B-5299-B042-9CE8-0D364E0B4401}" type="datetimeFigureOut">
               <a:rPr kumimoji="1" lang="ja-JP" altLang="en-US" smtClean="0"/>
-              <a:t>2021/12/10</a:t>
+              <a:t>2022/10/25</a:t>
             </a:fld>
             <a:endParaRPr kumimoji="1" lang="ja-JP" altLang="en-US"/>
           </a:p>
@@ -1514,7 +1705,7 @@
           <a:p>
             <a:fld id="{E7AA294B-5299-B042-9CE8-0D364E0B4401}" type="datetimeFigureOut">
               <a:rPr kumimoji="1" lang="ja-JP" altLang="en-US" smtClean="0"/>
-              <a:t>2021/12/10</a:t>
+              <a:t>2022/10/25</a:t>
             </a:fld>
             <a:endParaRPr kumimoji="1" lang="ja-JP" altLang="en-US"/>
           </a:p>
@@ -1789,7 +1980,7 @@
           <a:p>
             <a:fld id="{E7AA294B-5299-B042-9CE8-0D364E0B4401}" type="datetimeFigureOut">
               <a:rPr kumimoji="1" lang="ja-JP" altLang="en-US" smtClean="0"/>
-              <a:t>2021/12/10</a:t>
+              <a:t>2022/10/25</a:t>
             </a:fld>
             <a:endParaRPr kumimoji="1" lang="ja-JP" altLang="en-US"/>
           </a:p>
@@ -2118,7 +2309,7 @@
           <a:p>
             <a:fld id="{E7AA294B-5299-B042-9CE8-0D364E0B4401}" type="datetimeFigureOut">
               <a:rPr kumimoji="1" lang="ja-JP" altLang="en-US" smtClean="0"/>
-              <a:t>2021/12/10</a:t>
+              <a:t>2022/10/25</a:t>
             </a:fld>
             <a:endParaRPr kumimoji="1" lang="ja-JP" altLang="en-US"/>
           </a:p>
@@ -2594,7 +2785,7 @@
           <a:p>
             <a:fld id="{E7AA294B-5299-B042-9CE8-0D364E0B4401}" type="datetimeFigureOut">
               <a:rPr kumimoji="1" lang="ja-JP" altLang="en-US" smtClean="0"/>
-              <a:t>2021/12/10</a:t>
+              <a:t>2022/10/25</a:t>
             </a:fld>
             <a:endParaRPr kumimoji="1" lang="ja-JP" altLang="en-US"/>
           </a:p>
@@ -2735,7 +2926,7 @@
           <a:p>
             <a:fld id="{E7AA294B-5299-B042-9CE8-0D364E0B4401}" type="datetimeFigureOut">
               <a:rPr kumimoji="1" lang="ja-JP" altLang="en-US" smtClean="0"/>
-              <a:t>2021/12/10</a:t>
+              <a:t>2022/10/25</a:t>
             </a:fld>
             <a:endParaRPr kumimoji="1" lang="ja-JP" altLang="en-US"/>
           </a:p>
@@ -2848,7 +3039,7 @@
           <a:p>
             <a:fld id="{E7AA294B-5299-B042-9CE8-0D364E0B4401}" type="datetimeFigureOut">
               <a:rPr kumimoji="1" lang="ja-JP" altLang="en-US" smtClean="0"/>
-              <a:t>2021/12/10</a:t>
+              <a:t>2022/10/25</a:t>
             </a:fld>
             <a:endParaRPr kumimoji="1" lang="ja-JP" altLang="en-US"/>
           </a:p>
@@ -3191,7 +3382,7 @@
           <a:p>
             <a:fld id="{E7AA294B-5299-B042-9CE8-0D364E0B4401}" type="datetimeFigureOut">
               <a:rPr kumimoji="1" lang="ja-JP" altLang="en-US" smtClean="0"/>
-              <a:t>2021/12/10</a:t>
+              <a:t>2022/10/25</a:t>
             </a:fld>
             <a:endParaRPr kumimoji="1" lang="ja-JP" altLang="en-US"/>
           </a:p>
@@ -3479,7 +3670,7 @@
           <a:p>
             <a:fld id="{E7AA294B-5299-B042-9CE8-0D364E0B4401}" type="datetimeFigureOut">
               <a:rPr kumimoji="1" lang="ja-JP" altLang="en-US" smtClean="0"/>
-              <a:t>2021/12/10</a:t>
+              <a:t>2022/10/25</a:t>
             </a:fld>
             <a:endParaRPr kumimoji="1" lang="ja-JP" altLang="en-US"/>
           </a:p>
@@ -3752,7 +3943,7 @@
           <a:p>
             <a:fld id="{E7AA294B-5299-B042-9CE8-0D364E0B4401}" type="datetimeFigureOut">
               <a:rPr kumimoji="1" lang="ja-JP" altLang="en-US" smtClean="0"/>
-              <a:t>2021/12/10</a:t>
+              <a:t>2022/10/25</a:t>
             </a:fld>
             <a:endParaRPr kumimoji="1" lang="ja-JP" altLang="en-US"/>
           </a:p>
@@ -9298,7 +9489,7 @@
         <p:spPr/>
         <p:txBody>
           <a:bodyPr>
-            <a:normAutofit fontScale="85000" lnSpcReduction="20000"/>
+            <a:normAutofit/>
           </a:bodyPr>
           <a:lstStyle/>
           <a:p>
@@ -9342,32 +9533,10 @@
           </a:p>
           <a:p>
             <a:pPr lvl="1"/>
-            <a:r>
-              <a:rPr lang="en-US" altLang="ja-JP" dirty="0" err="1"/>
-              <a:t>glmer</a:t>
-            </a:r>
-            <a:r>
-              <a:rPr lang="en-US" altLang="ja-JP" dirty="0"/>
-              <a:t> </a:t>
-            </a:r>
-            <a:r>
-              <a:rPr lang="ja-JP" altLang="en-US"/>
-              <a:t>     </a:t>
-            </a:r>
-            <a:r>
-              <a:rPr lang="en-US" altLang="ja-JP" dirty="0"/>
-              <a:t>(library lme4)</a:t>
-            </a:r>
-            <a:r>
-              <a:rPr lang="ja-JP" altLang="en-US"/>
-              <a:t>       正規分布、ガンマ分布、二項分布、ポアソン分布、</a:t>
-            </a:r>
-            <a:r>
-              <a:rPr lang="en-US" altLang="ja-JP" dirty="0"/>
-              <a:t>etc.</a:t>
-            </a:r>
-          </a:p>
-          <a:p>
+            <a:endParaRPr lang="en-US" altLang="ja-JP" dirty="0"/>
+          </a:p>
+          <a:p>
+            <a:pPr lvl="1"/>
             <a:endParaRPr lang="en-US" altLang="ja-JP" dirty="0"/>
           </a:p>
           <a:p>
@@ -9402,72 +9571,9 @@
             <a:endParaRPr lang="en-US" altLang="ja-JP" dirty="0"/>
           </a:p>
           <a:p>
-            <a:pPr lvl="1"/>
-            <a:r>
-              <a:rPr lang="ja-JP" altLang="en-US"/>
-              <a:t>ランダム効果の推定については最尤推定が難しくなるので、何らかの近似で計算する．</a:t>
-            </a:r>
-            <a:endParaRPr lang="en-US" altLang="ja-JP" dirty="0"/>
-          </a:p>
-          <a:p>
-            <a:endParaRPr lang="en-US" altLang="ja-JP" dirty="0"/>
-          </a:p>
-          <a:p>
-            <a:r>
-              <a:rPr kumimoji="1" lang="ja-JP" altLang="en-US"/>
-              <a:t>ランダム効果が階層的に入り込んだ複雑なモデルもたてられるが、パラメータの推定が難しくなるので</a:t>
-            </a:r>
-            <a:r>
-              <a:rPr kumimoji="1" lang="en-US" altLang="ja-JP" dirty="0"/>
-              <a:t>MCMC</a:t>
-            </a:r>
-            <a:r>
-              <a:rPr kumimoji="1" lang="ja-JP" altLang="en-US"/>
-              <a:t>などのシミュレーションを経て</a:t>
-            </a:r>
-            <a:r>
-              <a:rPr kumimoji="1" lang="en-US" altLang="ja-JP" dirty="0"/>
-              <a:t>(</a:t>
-            </a:r>
-            <a:r>
-              <a:rPr kumimoji="1" lang="en-US" altLang="ja-JP" dirty="0" err="1"/>
-              <a:t>MCMCglmm</a:t>
-            </a:r>
-            <a:r>
-              <a:rPr kumimoji="1" lang="en-US" altLang="ja-JP" dirty="0"/>
-              <a:t>)</a:t>
-            </a:r>
-            <a:r>
-              <a:rPr kumimoji="1" lang="ja-JP" altLang="en-US"/>
-              <a:t>、あるいは</a:t>
-            </a:r>
-            <a:r>
-              <a:rPr kumimoji="1" lang="en-US" altLang="ja-JP" dirty="0"/>
-              <a:t>TMB</a:t>
-            </a:r>
-            <a:r>
-              <a:rPr kumimoji="1" lang="ja-JP" altLang="en-US"/>
-              <a:t>という計算手法をもちいて</a:t>
-            </a:r>
-            <a:r>
-              <a:rPr kumimoji="1" lang="en-US" altLang="ja-JP" dirty="0"/>
-              <a:t>(</a:t>
-            </a:r>
-            <a:r>
-              <a:rPr kumimoji="1" lang="en-US" altLang="ja-JP" dirty="0" err="1"/>
-              <a:t>glmmTMB</a:t>
-            </a:r>
-            <a:r>
-              <a:rPr kumimoji="1" lang="en-US" altLang="ja-JP" dirty="0"/>
-              <a:t>)</a:t>
-            </a:r>
-            <a:r>
-              <a:rPr kumimoji="1" lang="ja-JP" altLang="en-US"/>
-              <a:t>パラメータを推定することとなる．</a:t>
-            </a:r>
-            <a:endParaRPr kumimoji="1" lang="en-US" altLang="ja-JP" dirty="0"/>
-          </a:p>
-          <a:p>
+            <a:pPr marL="0" indent="0">
+              <a:buNone/>
+            </a:pPr>
             <a:endParaRPr kumimoji="1" lang="ja-JP" altLang="en-US"/>
           </a:p>
         </p:txBody>
@@ -9596,6 +9702,16 @@
             <a:r>
               <a:rPr kumimoji="1" lang="ja-JP" altLang="en-US"/>
               <a:t>予測値は固定効果から求めるが、信頼区間は？</a:t>
+            </a:r>
+            <a:endParaRPr kumimoji="1" lang="en-US" altLang="ja-JP" dirty="0"/>
+          </a:p>
+          <a:p>
+            <a:pPr marL="457200" lvl="1" indent="0">
+              <a:buNone/>
+            </a:pPr>
+            <a:r>
+              <a:rPr kumimoji="1" lang="ja-JP" altLang="en-US"/>
+              <a:t>→ブートストラップ解析</a:t>
             </a:r>
           </a:p>
         </p:txBody>

</xml_diff>

<commit_message>
update R slides and scripts
</commit_message>
<xml_diff>
--- a/R/スライド/第30回.pptx
+++ b/R/スライド/第30回.pptx
@@ -5,7 +5,7 @@
     <p:sldMasterId id="2147483648" r:id="rId1"/>
   </p:sldMasterIdLst>
   <p:notesMasterIdLst>
-    <p:notesMasterId r:id="rId11"/>
+    <p:notesMasterId r:id="rId12"/>
   </p:notesMasterIdLst>
   <p:sldIdLst>
     <p:sldId id="256" r:id="rId2"/>
@@ -13,10 +13,11 @@
     <p:sldId id="272" r:id="rId4"/>
     <p:sldId id="273" r:id="rId5"/>
     <p:sldId id="268" r:id="rId6"/>
-    <p:sldId id="270" r:id="rId7"/>
-    <p:sldId id="274" r:id="rId8"/>
-    <p:sldId id="275" r:id="rId9"/>
-    <p:sldId id="271" r:id="rId10"/>
+    <p:sldId id="276" r:id="rId7"/>
+    <p:sldId id="270" r:id="rId8"/>
+    <p:sldId id="274" r:id="rId9"/>
+    <p:sldId id="275" r:id="rId10"/>
+    <p:sldId id="271" r:id="rId11"/>
   </p:sldIdLst>
   <p:sldSz cx="12192000" cy="6858000"/>
   <p:notesSz cx="6858000" cy="9144000"/>
@@ -121,6 +122,14 @@
     </p:ext>
   </p:extLst>
 </p:presentation>
+</file>
+
+<file path=ppt/revisionInfo.xml><?xml version="1.0" encoding="utf-8"?>
+<p1510:revInfo xmlns:a="http://schemas.openxmlformats.org/drawingml/2006/main" xmlns:r="http://schemas.openxmlformats.org/officeDocument/2006/relationships" xmlns:p1510="http://schemas.microsoft.com/office/powerpoint/2015/10/main">
+  <p1510:revLst>
+    <p1510:client id="{8985314D-7B59-794E-B714-B61B72E0EF33}" v="23" dt="2023-11-18T09:36:25.621"/>
+  </p1510:revLst>
+</p1510:revInfo>
 </file>
 
 <file path=ppt/changesInfos/changesInfo1.xml><?xml version="1.0" encoding="utf-8"?>
@@ -230,6 +239,588 @@
             <ac:spMk id="3" creationId="{2900A259-287C-8746-BCB8-549AD2ECEA48}"/>
           </ac:spMkLst>
         </pc:spChg>
+      </pc:sldChg>
+    </pc:docChg>
+  </pc:docChgLst>
+  <pc:docChgLst>
+    <pc:chgData name="Shin Fukui" userId="6902ee70c48ce296" providerId="LiveId" clId="{8985314D-7B59-794E-B714-B61B72E0EF33}"/>
+    <pc:docChg chg="undo custSel addSld delSld modSld sldOrd">
+      <pc:chgData name="Shin Fukui" userId="6902ee70c48ce296" providerId="LiveId" clId="{8985314D-7B59-794E-B714-B61B72E0EF33}" dt="2023-11-19T06:07:11.250" v="411" actId="20577"/>
+      <pc:docMkLst>
+        <pc:docMk/>
+      </pc:docMkLst>
+      <pc:sldChg chg="addSp delSp modSp new mod ord">
+        <pc:chgData name="Shin Fukui" userId="6902ee70c48ce296" providerId="LiveId" clId="{8985314D-7B59-794E-B714-B61B72E0EF33}" dt="2023-11-19T06:07:11.250" v="411" actId="20577"/>
+        <pc:sldMkLst>
+          <pc:docMk/>
+          <pc:sldMk cId="1784561452" sldId="276"/>
+        </pc:sldMkLst>
+        <pc:spChg chg="mod">
+          <ac:chgData name="Shin Fukui" userId="6902ee70c48ce296" providerId="LiveId" clId="{8985314D-7B59-794E-B714-B61B72E0EF33}" dt="2023-11-19T06:07:11.250" v="411" actId="20577"/>
+          <ac:spMkLst>
+            <pc:docMk/>
+            <pc:sldMk cId="1784561452" sldId="276"/>
+            <ac:spMk id="2" creationId="{2CAD1A31-AC48-4EEE-8DF4-871AE7581CC7}"/>
+          </ac:spMkLst>
+        </pc:spChg>
+        <pc:spChg chg="add del mod">
+          <ac:chgData name="Shin Fukui" userId="6902ee70c48ce296" providerId="LiveId" clId="{8985314D-7B59-794E-B714-B61B72E0EF33}" dt="2023-11-18T09:37:45.304" v="373" actId="478"/>
+          <ac:spMkLst>
+            <pc:docMk/>
+            <pc:sldMk cId="1784561452" sldId="276"/>
+            <ac:spMk id="3" creationId="{F128A1A1-6EDC-7BD1-E998-B792984BC087}"/>
+          </ac:spMkLst>
+        </pc:spChg>
+        <pc:spChg chg="add mod">
+          <ac:chgData name="Shin Fukui" userId="6902ee70c48ce296" providerId="LiveId" clId="{8985314D-7B59-794E-B714-B61B72E0EF33}" dt="2023-11-18T09:17:24.772" v="186" actId="1076"/>
+          <ac:spMkLst>
+            <pc:docMk/>
+            <pc:sldMk cId="1784561452" sldId="276"/>
+            <ac:spMk id="4" creationId="{676D3366-ED80-649F-8B5C-A5E32C59399B}"/>
+          </ac:spMkLst>
+        </pc:spChg>
+        <pc:spChg chg="add mod">
+          <ac:chgData name="Shin Fukui" userId="6902ee70c48ce296" providerId="LiveId" clId="{8985314D-7B59-794E-B714-B61B72E0EF33}" dt="2023-11-18T09:17:24.772" v="186" actId="1076"/>
+          <ac:spMkLst>
+            <pc:docMk/>
+            <pc:sldMk cId="1784561452" sldId="276"/>
+            <ac:spMk id="7" creationId="{F220D244-8830-1BB8-4C79-9ED033E1901D}"/>
+          </ac:spMkLst>
+        </pc:spChg>
+        <pc:spChg chg="add del mod">
+          <ac:chgData name="Shin Fukui" userId="6902ee70c48ce296" providerId="LiveId" clId="{8985314D-7B59-794E-B714-B61B72E0EF33}" dt="2023-11-18T09:06:02.437" v="158" actId="478"/>
+          <ac:spMkLst>
+            <pc:docMk/>
+            <pc:sldMk cId="1784561452" sldId="276"/>
+            <ac:spMk id="9" creationId="{75D0E27E-F255-CD31-B9D7-4CF883C6C545}"/>
+          </ac:spMkLst>
+        </pc:spChg>
+        <pc:spChg chg="add mod">
+          <ac:chgData name="Shin Fukui" userId="6902ee70c48ce296" providerId="LiveId" clId="{8985314D-7B59-794E-B714-B61B72E0EF33}" dt="2023-11-18T09:17:24.772" v="186" actId="1076"/>
+          <ac:spMkLst>
+            <pc:docMk/>
+            <pc:sldMk cId="1784561452" sldId="276"/>
+            <ac:spMk id="10" creationId="{840EC2DD-3CDF-A633-BDE9-2346EADEFC6B}"/>
+          </ac:spMkLst>
+        </pc:spChg>
+        <pc:spChg chg="add del mod">
+          <ac:chgData name="Shin Fukui" userId="6902ee70c48ce296" providerId="LiveId" clId="{8985314D-7B59-794E-B714-B61B72E0EF33}" dt="2023-11-18T09:04:22.161" v="113"/>
+          <ac:spMkLst>
+            <pc:docMk/>
+            <pc:sldMk cId="1784561452" sldId="276"/>
+            <ac:spMk id="15" creationId="{1892C2B3-3097-17A5-18EB-5357AE4CAD4D}"/>
+          </ac:spMkLst>
+        </pc:spChg>
+        <pc:spChg chg="add del mod">
+          <ac:chgData name="Shin Fukui" userId="6902ee70c48ce296" providerId="LiveId" clId="{8985314D-7B59-794E-B714-B61B72E0EF33}" dt="2023-11-18T09:04:24.356" v="115"/>
+          <ac:spMkLst>
+            <pc:docMk/>
+            <pc:sldMk cId="1784561452" sldId="276"/>
+            <ac:spMk id="16" creationId="{592E865F-F4D0-2A70-4720-DC145675D8D0}"/>
+          </ac:spMkLst>
+        </pc:spChg>
+        <pc:spChg chg="add del mod">
+          <ac:chgData name="Shin Fukui" userId="6902ee70c48ce296" providerId="LiveId" clId="{8985314D-7B59-794E-B714-B61B72E0EF33}" dt="2023-11-18T09:06:02.827" v="160"/>
+          <ac:spMkLst>
+            <pc:docMk/>
+            <pc:sldMk cId="1784561452" sldId="276"/>
+            <ac:spMk id="17" creationId="{4B2B6189-FC2F-6213-EC99-E29C17505856}"/>
+          </ac:spMkLst>
+        </pc:spChg>
+        <pc:spChg chg="add mod">
+          <ac:chgData name="Shin Fukui" userId="6902ee70c48ce296" providerId="LiveId" clId="{8985314D-7B59-794E-B714-B61B72E0EF33}" dt="2023-11-18T09:17:24.772" v="186" actId="1076"/>
+          <ac:spMkLst>
+            <pc:docMk/>
+            <pc:sldMk cId="1784561452" sldId="276"/>
+            <ac:spMk id="18" creationId="{CDC3D94F-5929-C7BF-BEE8-7A0A771BBACA}"/>
+          </ac:spMkLst>
+        </pc:spChg>
+        <pc:spChg chg="add mod">
+          <ac:chgData name="Shin Fukui" userId="6902ee70c48ce296" providerId="LiveId" clId="{8985314D-7B59-794E-B714-B61B72E0EF33}" dt="2023-11-18T09:17:24.772" v="186" actId="1076"/>
+          <ac:spMkLst>
+            <pc:docMk/>
+            <pc:sldMk cId="1784561452" sldId="276"/>
+            <ac:spMk id="19" creationId="{54D8EB49-04B9-CB2E-5C34-8FD562D3AF98}"/>
+          </ac:spMkLst>
+        </pc:spChg>
+        <pc:spChg chg="add mod">
+          <ac:chgData name="Shin Fukui" userId="6902ee70c48ce296" providerId="LiveId" clId="{8985314D-7B59-794E-B714-B61B72E0EF33}" dt="2023-11-18T09:17:24.772" v="186" actId="1076"/>
+          <ac:spMkLst>
+            <pc:docMk/>
+            <pc:sldMk cId="1784561452" sldId="276"/>
+            <ac:spMk id="20" creationId="{21789C65-A376-1772-B88F-14961E27DCDC}"/>
+          </ac:spMkLst>
+        </pc:spChg>
+        <pc:spChg chg="add mod">
+          <ac:chgData name="Shin Fukui" userId="6902ee70c48ce296" providerId="LiveId" clId="{8985314D-7B59-794E-B714-B61B72E0EF33}" dt="2023-11-18T09:17:24.772" v="186" actId="1076"/>
+          <ac:spMkLst>
+            <pc:docMk/>
+            <pc:sldMk cId="1784561452" sldId="276"/>
+            <ac:spMk id="21" creationId="{825E6553-E316-489C-FFB1-91371E9B8037}"/>
+          </ac:spMkLst>
+        </pc:spChg>
+        <pc:spChg chg="add mod">
+          <ac:chgData name="Shin Fukui" userId="6902ee70c48ce296" providerId="LiveId" clId="{8985314D-7B59-794E-B714-B61B72E0EF33}" dt="2023-11-18T09:34:55.887" v="340" actId="14100"/>
+          <ac:spMkLst>
+            <pc:docMk/>
+            <pc:sldMk cId="1784561452" sldId="276"/>
+            <ac:spMk id="38" creationId="{D7AD9CDF-5DC3-415E-D6FE-71CAC1D492EF}"/>
+          </ac:spMkLst>
+        </pc:spChg>
+        <pc:spChg chg="add mod">
+          <ac:chgData name="Shin Fukui" userId="6902ee70c48ce296" providerId="LiveId" clId="{8985314D-7B59-794E-B714-B61B72E0EF33}" dt="2023-11-18T09:35:39.872" v="345" actId="14100"/>
+          <ac:spMkLst>
+            <pc:docMk/>
+            <pc:sldMk cId="1784561452" sldId="276"/>
+            <ac:spMk id="39" creationId="{E7249381-9FCA-AF35-9CA4-33551F0D899B}"/>
+          </ac:spMkLst>
+        </pc:spChg>
+        <pc:spChg chg="add mod">
+          <ac:chgData name="Shin Fukui" userId="6902ee70c48ce296" providerId="LiveId" clId="{8985314D-7B59-794E-B714-B61B72E0EF33}" dt="2023-11-18T09:35:45.192" v="347" actId="1076"/>
+          <ac:spMkLst>
+            <pc:docMk/>
+            <pc:sldMk cId="1784561452" sldId="276"/>
+            <ac:spMk id="42" creationId="{D6B22C5E-148C-6A1A-3077-F0C2B6C23A04}"/>
+          </ac:spMkLst>
+        </pc:spChg>
+        <pc:spChg chg="add mod">
+          <ac:chgData name="Shin Fukui" userId="6902ee70c48ce296" providerId="LiveId" clId="{8985314D-7B59-794E-B714-B61B72E0EF33}" dt="2023-11-18T09:35:53.444" v="351" actId="1076"/>
+          <ac:spMkLst>
+            <pc:docMk/>
+            <pc:sldMk cId="1784561452" sldId="276"/>
+            <ac:spMk id="44" creationId="{D5560BAF-181A-3A02-C8F5-CE75102C741C}"/>
+          </ac:spMkLst>
+        </pc:spChg>
+        <pc:spChg chg="add mod">
+          <ac:chgData name="Shin Fukui" userId="6902ee70c48ce296" providerId="LiveId" clId="{8985314D-7B59-794E-B714-B61B72E0EF33}" dt="2023-11-18T09:35:49.631" v="349" actId="1076"/>
+          <ac:spMkLst>
+            <pc:docMk/>
+            <pc:sldMk cId="1784561452" sldId="276"/>
+            <ac:spMk id="45" creationId="{78B1DEDD-0DE1-8385-D89A-646A3DA80BA4}"/>
+          </ac:spMkLst>
+        </pc:spChg>
+        <pc:spChg chg="add del mod">
+          <ac:chgData name="Shin Fukui" userId="6902ee70c48ce296" providerId="LiveId" clId="{8985314D-7B59-794E-B714-B61B72E0EF33}" dt="2023-11-18T09:36:24.049" v="355"/>
+          <ac:spMkLst>
+            <pc:docMk/>
+            <pc:sldMk cId="1784561452" sldId="276"/>
+            <ac:spMk id="48" creationId="{5233AAD3-E4CC-9797-E4D2-B86E5B65724D}"/>
+          </ac:spMkLst>
+        </pc:spChg>
+        <pc:spChg chg="add del mod">
+          <ac:chgData name="Shin Fukui" userId="6902ee70c48ce296" providerId="LiveId" clId="{8985314D-7B59-794E-B714-B61B72E0EF33}" dt="2023-11-18T09:36:24.049" v="355"/>
+          <ac:spMkLst>
+            <pc:docMk/>
+            <pc:sldMk cId="1784561452" sldId="276"/>
+            <ac:spMk id="51" creationId="{E89730FD-8C31-A406-D569-154BE31621B7}"/>
+          </ac:spMkLst>
+        </pc:spChg>
+        <pc:spChg chg="add del mod">
+          <ac:chgData name="Shin Fukui" userId="6902ee70c48ce296" providerId="LiveId" clId="{8985314D-7B59-794E-B714-B61B72E0EF33}" dt="2023-11-18T09:36:24.049" v="355"/>
+          <ac:spMkLst>
+            <pc:docMk/>
+            <pc:sldMk cId="1784561452" sldId="276"/>
+            <ac:spMk id="53" creationId="{5F01CAC9-3CDD-1BCD-28F0-D5C1387189B6}"/>
+          </ac:spMkLst>
+        </pc:spChg>
+        <pc:spChg chg="add del mod">
+          <ac:chgData name="Shin Fukui" userId="6902ee70c48ce296" providerId="LiveId" clId="{8985314D-7B59-794E-B714-B61B72E0EF33}" dt="2023-11-18T09:36:24.049" v="355"/>
+          <ac:spMkLst>
+            <pc:docMk/>
+            <pc:sldMk cId="1784561452" sldId="276"/>
+            <ac:spMk id="54" creationId="{0890D0BE-780E-4726-E8CE-8E8D8C9BD221}"/>
+          </ac:spMkLst>
+        </pc:spChg>
+        <pc:spChg chg="add del mod">
+          <ac:chgData name="Shin Fukui" userId="6902ee70c48ce296" providerId="LiveId" clId="{8985314D-7B59-794E-B714-B61B72E0EF33}" dt="2023-11-18T09:36:24.049" v="355"/>
+          <ac:spMkLst>
+            <pc:docMk/>
+            <pc:sldMk cId="1784561452" sldId="276"/>
+            <ac:spMk id="64" creationId="{30A24B55-A50D-C0B3-05AB-14D4C40400E7}"/>
+          </ac:spMkLst>
+        </pc:spChg>
+        <pc:spChg chg="add del mod">
+          <ac:chgData name="Shin Fukui" userId="6902ee70c48ce296" providerId="LiveId" clId="{8985314D-7B59-794E-B714-B61B72E0EF33}" dt="2023-11-18T09:36:24.049" v="355"/>
+          <ac:spMkLst>
+            <pc:docMk/>
+            <pc:sldMk cId="1784561452" sldId="276"/>
+            <ac:spMk id="65" creationId="{D14C48F8-E7D5-7A08-A935-9AAF96852B6F}"/>
+          </ac:spMkLst>
+        </pc:spChg>
+        <pc:spChg chg="add del mod">
+          <ac:chgData name="Shin Fukui" userId="6902ee70c48ce296" providerId="LiveId" clId="{8985314D-7B59-794E-B714-B61B72E0EF33}" dt="2023-11-18T09:36:24.049" v="355"/>
+          <ac:spMkLst>
+            <pc:docMk/>
+            <pc:sldMk cId="1784561452" sldId="276"/>
+            <ac:spMk id="66" creationId="{CB8735AB-3C40-4239-85E4-44707F31802B}"/>
+          </ac:spMkLst>
+        </pc:spChg>
+        <pc:spChg chg="add mod">
+          <ac:chgData name="Shin Fukui" userId="6902ee70c48ce296" providerId="LiveId" clId="{8985314D-7B59-794E-B714-B61B72E0EF33}" dt="2023-11-18T09:37:10.188" v="365" actId="1076"/>
+          <ac:spMkLst>
+            <pc:docMk/>
+            <pc:sldMk cId="1784561452" sldId="276"/>
+            <ac:spMk id="67" creationId="{A8B68851-19F3-8716-67E1-AFA04AAF566D}"/>
+          </ac:spMkLst>
+        </pc:spChg>
+        <pc:spChg chg="add mod">
+          <ac:chgData name="Shin Fukui" userId="6902ee70c48ce296" providerId="LiveId" clId="{8985314D-7B59-794E-B714-B61B72E0EF33}" dt="2023-11-18T09:38:32.520" v="385" actId="1076"/>
+          <ac:spMkLst>
+            <pc:docMk/>
+            <pc:sldMk cId="1784561452" sldId="276"/>
+            <ac:spMk id="70" creationId="{AC0E9B8B-FDAB-5C94-3261-7C56910E3225}"/>
+          </ac:spMkLst>
+        </pc:spChg>
+        <pc:spChg chg="add mod">
+          <ac:chgData name="Shin Fukui" userId="6902ee70c48ce296" providerId="LiveId" clId="{8985314D-7B59-794E-B714-B61B72E0EF33}" dt="2023-11-18T09:36:48.266" v="360" actId="14100"/>
+          <ac:spMkLst>
+            <pc:docMk/>
+            <pc:sldMk cId="1784561452" sldId="276"/>
+            <ac:spMk id="72" creationId="{928FEB5D-D3E7-3AB9-6991-DEF23ADA0A4D}"/>
+          </ac:spMkLst>
+        </pc:spChg>
+        <pc:spChg chg="add mod">
+          <ac:chgData name="Shin Fukui" userId="6902ee70c48ce296" providerId="LiveId" clId="{8985314D-7B59-794E-B714-B61B72E0EF33}" dt="2023-11-18T09:36:59.899" v="364" actId="1076"/>
+          <ac:spMkLst>
+            <pc:docMk/>
+            <pc:sldMk cId="1784561452" sldId="276"/>
+            <ac:spMk id="73" creationId="{BE7AAE0D-DEBD-0795-961D-A4A9F9C9F87E}"/>
+          </ac:spMkLst>
+        </pc:spChg>
+        <pc:spChg chg="add mod">
+          <ac:chgData name="Shin Fukui" userId="6902ee70c48ce296" providerId="LiveId" clId="{8985314D-7B59-794E-B714-B61B72E0EF33}" dt="2023-11-18T09:38:03.732" v="376" actId="1076"/>
+          <ac:spMkLst>
+            <pc:docMk/>
+            <pc:sldMk cId="1784561452" sldId="276"/>
+            <ac:spMk id="83" creationId="{FAA8FA89-A5F9-BECC-B5CD-C0D1CB3C4F55}"/>
+          </ac:spMkLst>
+        </pc:spChg>
+        <pc:spChg chg="add mod">
+          <ac:chgData name="Shin Fukui" userId="6902ee70c48ce296" providerId="LiveId" clId="{8985314D-7B59-794E-B714-B61B72E0EF33}" dt="2023-11-19T03:35:11.481" v="392" actId="14100"/>
+          <ac:spMkLst>
+            <pc:docMk/>
+            <pc:sldMk cId="1784561452" sldId="276"/>
+            <ac:spMk id="84" creationId="{225EF47B-A8AD-FE46-FED8-0A1B108CA2E6}"/>
+          </ac:spMkLst>
+        </pc:spChg>
+        <pc:spChg chg="add mod">
+          <ac:chgData name="Shin Fukui" userId="6902ee70c48ce296" providerId="LiveId" clId="{8985314D-7B59-794E-B714-B61B72E0EF33}" dt="2023-11-18T09:36:32.777" v="357" actId="14100"/>
+          <ac:spMkLst>
+            <pc:docMk/>
+            <pc:sldMk cId="1784561452" sldId="276"/>
+            <ac:spMk id="85" creationId="{A4710B74-6353-D3B6-3DCE-AD7DD211256D}"/>
+          </ac:spMkLst>
+        </pc:spChg>
+        <pc:picChg chg="add mod">
+          <ac:chgData name="Shin Fukui" userId="6902ee70c48ce296" providerId="LiveId" clId="{8985314D-7B59-794E-B714-B61B72E0EF33}" dt="2023-11-18T09:17:24.772" v="186" actId="1076"/>
+          <ac:picMkLst>
+            <pc:docMk/>
+            <pc:sldMk cId="1784561452" sldId="276"/>
+            <ac:picMk id="6" creationId="{1115CBE8-F0F7-C9C1-FA3A-0B59908ED3A3}"/>
+          </ac:picMkLst>
+        </pc:picChg>
+        <pc:picChg chg="add mod">
+          <ac:chgData name="Shin Fukui" userId="6902ee70c48ce296" providerId="LiveId" clId="{8985314D-7B59-794E-B714-B61B72E0EF33}" dt="2023-11-18T09:17:24.772" v="186" actId="1076"/>
+          <ac:picMkLst>
+            <pc:docMk/>
+            <pc:sldMk cId="1784561452" sldId="276"/>
+            <ac:picMk id="12" creationId="{AC646A5C-DF1A-6622-3DF7-6FFD117EC72C}"/>
+          </ac:picMkLst>
+        </pc:picChg>
+        <pc:picChg chg="add mod">
+          <ac:chgData name="Shin Fukui" userId="6902ee70c48ce296" providerId="LiveId" clId="{8985314D-7B59-794E-B714-B61B72E0EF33}" dt="2023-11-18T09:17:24.772" v="186" actId="1076"/>
+          <ac:picMkLst>
+            <pc:docMk/>
+            <pc:sldMk cId="1784561452" sldId="276"/>
+            <ac:picMk id="13" creationId="{C869F5A7-7FF0-9701-E917-BD3C53B814CB}"/>
+          </ac:picMkLst>
+        </pc:picChg>
+        <pc:picChg chg="add mod">
+          <ac:chgData name="Shin Fukui" userId="6902ee70c48ce296" providerId="LiveId" clId="{8985314D-7B59-794E-B714-B61B72E0EF33}" dt="2023-11-18T09:17:24.772" v="186" actId="1076"/>
+          <ac:picMkLst>
+            <pc:docMk/>
+            <pc:sldMk cId="1784561452" sldId="276"/>
+            <ac:picMk id="14" creationId="{C991CD76-91FF-D109-C86D-1B49F57002C9}"/>
+          </ac:picMkLst>
+        </pc:picChg>
+        <pc:picChg chg="add del mod">
+          <ac:chgData name="Shin Fukui" userId="6902ee70c48ce296" providerId="LiveId" clId="{8985314D-7B59-794E-B714-B61B72E0EF33}" dt="2023-11-18T09:10:19.452" v="178" actId="478"/>
+          <ac:picMkLst>
+            <pc:docMk/>
+            <pc:sldMk cId="1784561452" sldId="276"/>
+            <ac:picMk id="24" creationId="{1C0333BA-A655-E7A0-690D-0B522EDAC309}"/>
+          </ac:picMkLst>
+        </pc:picChg>
+        <pc:picChg chg="add mod">
+          <ac:chgData name="Shin Fukui" userId="6902ee70c48ce296" providerId="LiveId" clId="{8985314D-7B59-794E-B714-B61B72E0EF33}" dt="2023-11-18T09:35:39.872" v="345" actId="14100"/>
+          <ac:picMkLst>
+            <pc:docMk/>
+            <pc:sldMk cId="1784561452" sldId="276"/>
+            <ac:picMk id="41" creationId="{9B8E6F2F-4C8F-85A2-0595-7DE2CE2F5D15}"/>
+          </ac:picMkLst>
+        </pc:picChg>
+        <pc:picChg chg="add del mod">
+          <ac:chgData name="Shin Fukui" userId="6902ee70c48ce296" providerId="LiveId" clId="{8985314D-7B59-794E-B714-B61B72E0EF33}" dt="2023-11-18T09:36:24.049" v="355"/>
+          <ac:picMkLst>
+            <pc:docMk/>
+            <pc:sldMk cId="1784561452" sldId="276"/>
+            <ac:picMk id="50" creationId="{BFD3471E-85E5-0A7A-4C12-14F94B520201}"/>
+          </ac:picMkLst>
+        </pc:picChg>
+        <pc:picChg chg="add del mod">
+          <ac:chgData name="Shin Fukui" userId="6902ee70c48ce296" providerId="LiveId" clId="{8985314D-7B59-794E-B714-B61B72E0EF33}" dt="2023-11-18T09:36:24.049" v="355"/>
+          <ac:picMkLst>
+            <pc:docMk/>
+            <pc:sldMk cId="1784561452" sldId="276"/>
+            <ac:picMk id="55" creationId="{9698764E-DE16-5ED9-0AC7-DB3C05311C19}"/>
+          </ac:picMkLst>
+        </pc:picChg>
+        <pc:picChg chg="add del mod">
+          <ac:chgData name="Shin Fukui" userId="6902ee70c48ce296" providerId="LiveId" clId="{8985314D-7B59-794E-B714-B61B72E0EF33}" dt="2023-11-18T09:36:24.049" v="355"/>
+          <ac:picMkLst>
+            <pc:docMk/>
+            <pc:sldMk cId="1784561452" sldId="276"/>
+            <ac:picMk id="56" creationId="{DF1EDA25-0E9C-54D3-6633-B2BABB9609F2}"/>
+          </ac:picMkLst>
+        </pc:picChg>
+        <pc:picChg chg="add del mod">
+          <ac:chgData name="Shin Fukui" userId="6902ee70c48ce296" providerId="LiveId" clId="{8985314D-7B59-794E-B714-B61B72E0EF33}" dt="2023-11-18T09:36:24.049" v="355"/>
+          <ac:picMkLst>
+            <pc:docMk/>
+            <pc:sldMk cId="1784561452" sldId="276"/>
+            <ac:picMk id="57" creationId="{7A4F119C-B00E-70E6-9813-16C8C10CB322}"/>
+          </ac:picMkLst>
+        </pc:picChg>
+        <pc:picChg chg="add del mod">
+          <ac:chgData name="Shin Fukui" userId="6902ee70c48ce296" providerId="LiveId" clId="{8985314D-7B59-794E-B714-B61B72E0EF33}" dt="2023-11-18T09:36:24.049" v="355"/>
+          <ac:picMkLst>
+            <pc:docMk/>
+            <pc:sldMk cId="1784561452" sldId="276"/>
+            <ac:picMk id="58" creationId="{66674A1F-D366-8914-A6D1-D0E19B1133B8}"/>
+          </ac:picMkLst>
+        </pc:picChg>
+        <pc:picChg chg="add mod">
+          <ac:chgData name="Shin Fukui" userId="6902ee70c48ce296" providerId="LiveId" clId="{8985314D-7B59-794E-B714-B61B72E0EF33}" dt="2023-11-18T09:36:32.777" v="357" actId="14100"/>
+          <ac:picMkLst>
+            <pc:docMk/>
+            <pc:sldMk cId="1784561452" sldId="276"/>
+            <ac:picMk id="69" creationId="{A2B8A285-1485-9BB9-B8BC-A14A9F441EC2}"/>
+          </ac:picMkLst>
+        </pc:picChg>
+        <pc:picChg chg="add mod">
+          <ac:chgData name="Shin Fukui" userId="6902ee70c48ce296" providerId="LiveId" clId="{8985314D-7B59-794E-B714-B61B72E0EF33}" dt="2023-11-18T09:36:32.777" v="357" actId="14100"/>
+          <ac:picMkLst>
+            <pc:docMk/>
+            <pc:sldMk cId="1784561452" sldId="276"/>
+            <ac:picMk id="74" creationId="{FC94FC9B-0B71-E35F-930F-1C946E79DCF6}"/>
+          </ac:picMkLst>
+        </pc:picChg>
+        <pc:picChg chg="add mod">
+          <ac:chgData name="Shin Fukui" userId="6902ee70c48ce296" providerId="LiveId" clId="{8985314D-7B59-794E-B714-B61B72E0EF33}" dt="2023-11-18T09:36:32.777" v="357" actId="14100"/>
+          <ac:picMkLst>
+            <pc:docMk/>
+            <pc:sldMk cId="1784561452" sldId="276"/>
+            <ac:picMk id="75" creationId="{9F2561F3-D96C-4463-9B7E-F8555CF255C1}"/>
+          </ac:picMkLst>
+        </pc:picChg>
+        <pc:picChg chg="add mod">
+          <ac:chgData name="Shin Fukui" userId="6902ee70c48ce296" providerId="LiveId" clId="{8985314D-7B59-794E-B714-B61B72E0EF33}" dt="2023-11-18T09:36:32.777" v="357" actId="14100"/>
+          <ac:picMkLst>
+            <pc:docMk/>
+            <pc:sldMk cId="1784561452" sldId="276"/>
+            <ac:picMk id="76" creationId="{75FF6B0B-EAC7-5518-A570-9BC2A57ED1D7}"/>
+          </ac:picMkLst>
+        </pc:picChg>
+        <pc:picChg chg="add mod">
+          <ac:chgData name="Shin Fukui" userId="6902ee70c48ce296" providerId="LiveId" clId="{8985314D-7B59-794E-B714-B61B72E0EF33}" dt="2023-11-18T09:36:32.777" v="357" actId="14100"/>
+          <ac:picMkLst>
+            <pc:docMk/>
+            <pc:sldMk cId="1784561452" sldId="276"/>
+            <ac:picMk id="77" creationId="{EA5A7757-D782-5549-8E33-69B17AD8485C}"/>
+          </ac:picMkLst>
+        </pc:picChg>
+        <pc:cxnChg chg="add mod">
+          <ac:chgData name="Shin Fukui" userId="6902ee70c48ce296" providerId="LiveId" clId="{8985314D-7B59-794E-B714-B61B72E0EF33}" dt="2023-11-18T09:17:24.772" v="186" actId="1076"/>
+          <ac:cxnSpMkLst>
+            <pc:docMk/>
+            <pc:sldMk cId="1784561452" sldId="276"/>
+            <ac:cxnSpMk id="5" creationId="{D1071CCB-FD3D-5E10-CFEA-9256638EF8C2}"/>
+          </ac:cxnSpMkLst>
+        </pc:cxnChg>
+        <pc:cxnChg chg="add del mod">
+          <ac:chgData name="Shin Fukui" userId="6902ee70c48ce296" providerId="LiveId" clId="{8985314D-7B59-794E-B714-B61B72E0EF33}" dt="2023-11-18T09:06:04.166" v="161" actId="478"/>
+          <ac:cxnSpMkLst>
+            <pc:docMk/>
+            <pc:sldMk cId="1784561452" sldId="276"/>
+            <ac:cxnSpMk id="8" creationId="{9257D849-5E18-C1AC-4DC6-201F46F23840}"/>
+          </ac:cxnSpMkLst>
+        </pc:cxnChg>
+        <pc:cxnChg chg="add mod">
+          <ac:chgData name="Shin Fukui" userId="6902ee70c48ce296" providerId="LiveId" clId="{8985314D-7B59-794E-B714-B61B72E0EF33}" dt="2023-11-18T09:17:24.772" v="186" actId="1076"/>
+          <ac:cxnSpMkLst>
+            <pc:docMk/>
+            <pc:sldMk cId="1784561452" sldId="276"/>
+            <ac:cxnSpMk id="25" creationId="{B1788ED2-3AB3-BFBA-AF7D-364A7E23C06E}"/>
+          </ac:cxnSpMkLst>
+        </pc:cxnChg>
+        <pc:cxnChg chg="add mod">
+          <ac:chgData name="Shin Fukui" userId="6902ee70c48ce296" providerId="LiveId" clId="{8985314D-7B59-794E-B714-B61B72E0EF33}" dt="2023-11-18T09:17:24.772" v="186" actId="1076"/>
+          <ac:cxnSpMkLst>
+            <pc:docMk/>
+            <pc:sldMk cId="1784561452" sldId="276"/>
+            <ac:cxnSpMk id="28" creationId="{5C45B6EC-F29E-E530-6758-AC8CF32E194D}"/>
+          </ac:cxnSpMkLst>
+        </pc:cxnChg>
+        <pc:cxnChg chg="add mod">
+          <ac:chgData name="Shin Fukui" userId="6902ee70c48ce296" providerId="LiveId" clId="{8985314D-7B59-794E-B714-B61B72E0EF33}" dt="2023-11-18T09:17:24.772" v="186" actId="1076"/>
+          <ac:cxnSpMkLst>
+            <pc:docMk/>
+            <pc:sldMk cId="1784561452" sldId="276"/>
+            <ac:cxnSpMk id="31" creationId="{7A41A149-FD40-6730-7A8D-38BEB8F97F20}"/>
+          </ac:cxnSpMkLst>
+        </pc:cxnChg>
+        <pc:cxnChg chg="add mod">
+          <ac:chgData name="Shin Fukui" userId="6902ee70c48ce296" providerId="LiveId" clId="{8985314D-7B59-794E-B714-B61B72E0EF33}" dt="2023-11-18T09:35:39.872" v="345" actId="14100"/>
+          <ac:cxnSpMkLst>
+            <pc:docMk/>
+            <pc:sldMk cId="1784561452" sldId="276"/>
+            <ac:cxnSpMk id="40" creationId="{6202473A-22D0-B71F-6305-D1DA226641A1}"/>
+          </ac:cxnSpMkLst>
+        </pc:cxnChg>
+        <pc:cxnChg chg="add mod">
+          <ac:chgData name="Shin Fukui" userId="6902ee70c48ce296" providerId="LiveId" clId="{8985314D-7B59-794E-B714-B61B72E0EF33}" dt="2023-11-18T09:35:39.872" v="345" actId="14100"/>
+          <ac:cxnSpMkLst>
+            <pc:docMk/>
+            <pc:sldMk cId="1784561452" sldId="276"/>
+            <ac:cxnSpMk id="43" creationId="{0487665C-961B-BB42-31F8-F3AF90D61099}"/>
+          </ac:cxnSpMkLst>
+        </pc:cxnChg>
+        <pc:cxnChg chg="add del mod">
+          <ac:chgData name="Shin Fukui" userId="6902ee70c48ce296" providerId="LiveId" clId="{8985314D-7B59-794E-B714-B61B72E0EF33}" dt="2023-11-18T09:36:24.049" v="355"/>
+          <ac:cxnSpMkLst>
+            <pc:docMk/>
+            <pc:sldMk cId="1784561452" sldId="276"/>
+            <ac:cxnSpMk id="49" creationId="{3324530E-9C1A-2D01-6FAB-3FFC13B9146E}"/>
+          </ac:cxnSpMkLst>
+        </pc:cxnChg>
+        <pc:cxnChg chg="add del mod">
+          <ac:chgData name="Shin Fukui" userId="6902ee70c48ce296" providerId="LiveId" clId="{8985314D-7B59-794E-B714-B61B72E0EF33}" dt="2023-11-18T09:36:24.049" v="355"/>
+          <ac:cxnSpMkLst>
+            <pc:docMk/>
+            <pc:sldMk cId="1784561452" sldId="276"/>
+            <ac:cxnSpMk id="52" creationId="{4593DC2A-3D35-4703-A5A3-FEC7B534A9A4}"/>
+          </ac:cxnSpMkLst>
+        </pc:cxnChg>
+        <pc:cxnChg chg="add del mod">
+          <ac:chgData name="Shin Fukui" userId="6902ee70c48ce296" providerId="LiveId" clId="{8985314D-7B59-794E-B714-B61B72E0EF33}" dt="2023-11-18T09:36:24.049" v="355"/>
+          <ac:cxnSpMkLst>
+            <pc:docMk/>
+            <pc:sldMk cId="1784561452" sldId="276"/>
+            <ac:cxnSpMk id="59" creationId="{6E8FACC8-A396-416B-ED65-785C1DA3657C}"/>
+          </ac:cxnSpMkLst>
+        </pc:cxnChg>
+        <pc:cxnChg chg="add del mod">
+          <ac:chgData name="Shin Fukui" userId="6902ee70c48ce296" providerId="LiveId" clId="{8985314D-7B59-794E-B714-B61B72E0EF33}" dt="2023-11-18T09:36:24.049" v="355"/>
+          <ac:cxnSpMkLst>
+            <pc:docMk/>
+            <pc:sldMk cId="1784561452" sldId="276"/>
+            <ac:cxnSpMk id="60" creationId="{66F4A2D4-5056-A9E8-A365-0BEBA3747B62}"/>
+          </ac:cxnSpMkLst>
+        </pc:cxnChg>
+        <pc:cxnChg chg="add del mod">
+          <ac:chgData name="Shin Fukui" userId="6902ee70c48ce296" providerId="LiveId" clId="{8985314D-7B59-794E-B714-B61B72E0EF33}" dt="2023-11-18T09:36:24.049" v="355"/>
+          <ac:cxnSpMkLst>
+            <pc:docMk/>
+            <pc:sldMk cId="1784561452" sldId="276"/>
+            <ac:cxnSpMk id="61" creationId="{A9D77C8A-EC02-30BE-B7EE-FAC857F020AF}"/>
+          </ac:cxnSpMkLst>
+        </pc:cxnChg>
+        <pc:cxnChg chg="add del mod">
+          <ac:chgData name="Shin Fukui" userId="6902ee70c48ce296" providerId="LiveId" clId="{8985314D-7B59-794E-B714-B61B72E0EF33}" dt="2023-11-18T09:36:24.049" v="355"/>
+          <ac:cxnSpMkLst>
+            <pc:docMk/>
+            <pc:sldMk cId="1784561452" sldId="276"/>
+            <ac:cxnSpMk id="62" creationId="{5792BBC7-418D-379B-3EA8-A345F0CFFD81}"/>
+          </ac:cxnSpMkLst>
+        </pc:cxnChg>
+        <pc:cxnChg chg="add del mod">
+          <ac:chgData name="Shin Fukui" userId="6902ee70c48ce296" providerId="LiveId" clId="{8985314D-7B59-794E-B714-B61B72E0EF33}" dt="2023-11-18T09:36:24.049" v="355"/>
+          <ac:cxnSpMkLst>
+            <pc:docMk/>
+            <pc:sldMk cId="1784561452" sldId="276"/>
+            <ac:cxnSpMk id="63" creationId="{BD0AC7C8-8A09-41F8-B0CB-028100D46CE9}"/>
+          </ac:cxnSpMkLst>
+        </pc:cxnChg>
+        <pc:cxnChg chg="add mod">
+          <ac:chgData name="Shin Fukui" userId="6902ee70c48ce296" providerId="LiveId" clId="{8985314D-7B59-794E-B714-B61B72E0EF33}" dt="2023-11-18T09:36:55.850" v="362" actId="14100"/>
+          <ac:cxnSpMkLst>
+            <pc:docMk/>
+            <pc:sldMk cId="1784561452" sldId="276"/>
+            <ac:cxnSpMk id="68" creationId="{43EA9386-CE93-4B8F-B06B-4F400B972CAD}"/>
+          </ac:cxnSpMkLst>
+        </pc:cxnChg>
+        <pc:cxnChg chg="add mod">
+          <ac:chgData name="Shin Fukui" userId="6902ee70c48ce296" providerId="LiveId" clId="{8985314D-7B59-794E-B714-B61B72E0EF33}" dt="2023-11-18T09:36:32.777" v="357" actId="14100"/>
+          <ac:cxnSpMkLst>
+            <pc:docMk/>
+            <pc:sldMk cId="1784561452" sldId="276"/>
+            <ac:cxnSpMk id="71" creationId="{DA25B7DC-95FA-D295-ADD2-85935978A445}"/>
+          </ac:cxnSpMkLst>
+        </pc:cxnChg>
+        <pc:cxnChg chg="add mod">
+          <ac:chgData name="Shin Fukui" userId="6902ee70c48ce296" providerId="LiveId" clId="{8985314D-7B59-794E-B714-B61B72E0EF33}" dt="2023-11-18T09:38:24.959" v="383" actId="14100"/>
+          <ac:cxnSpMkLst>
+            <pc:docMk/>
+            <pc:sldMk cId="1784561452" sldId="276"/>
+            <ac:cxnSpMk id="78" creationId="{F4B5CD08-96A0-DE48-5CEA-AC143FE4CC56}"/>
+          </ac:cxnSpMkLst>
+        </pc:cxnChg>
+        <pc:cxnChg chg="add mod">
+          <ac:chgData name="Shin Fukui" userId="6902ee70c48ce296" providerId="LiveId" clId="{8985314D-7B59-794E-B714-B61B72E0EF33}" dt="2023-11-18T09:38:20.340" v="381" actId="14100"/>
+          <ac:cxnSpMkLst>
+            <pc:docMk/>
+            <pc:sldMk cId="1784561452" sldId="276"/>
+            <ac:cxnSpMk id="79" creationId="{C0BD0EE7-C4F5-E9A6-19BF-CBE4FC418801}"/>
+          </ac:cxnSpMkLst>
+        </pc:cxnChg>
+        <pc:cxnChg chg="add mod">
+          <ac:chgData name="Shin Fukui" userId="6902ee70c48ce296" providerId="LiveId" clId="{8985314D-7B59-794E-B714-B61B72E0EF33}" dt="2023-11-18T09:38:18.254" v="380" actId="1076"/>
+          <ac:cxnSpMkLst>
+            <pc:docMk/>
+            <pc:sldMk cId="1784561452" sldId="276"/>
+            <ac:cxnSpMk id="80" creationId="{24D93E08-12F6-FA69-7F64-17F24D9D33B4}"/>
+          </ac:cxnSpMkLst>
+        </pc:cxnChg>
+        <pc:cxnChg chg="add mod">
+          <ac:chgData name="Shin Fukui" userId="6902ee70c48ce296" providerId="LiveId" clId="{8985314D-7B59-794E-B714-B61B72E0EF33}" dt="2023-11-18T09:38:16.963" v="379" actId="14100"/>
+          <ac:cxnSpMkLst>
+            <pc:docMk/>
+            <pc:sldMk cId="1784561452" sldId="276"/>
+            <ac:cxnSpMk id="81" creationId="{A22D4D9B-B71B-4CDD-E3E9-814AF9D2C246}"/>
+          </ac:cxnSpMkLst>
+        </pc:cxnChg>
+        <pc:cxnChg chg="add del mod">
+          <ac:chgData name="Shin Fukui" userId="6902ee70c48ce296" providerId="LiveId" clId="{8985314D-7B59-794E-B714-B61B72E0EF33}" dt="2023-11-18T09:38:13.686" v="378" actId="478"/>
+          <ac:cxnSpMkLst>
+            <pc:docMk/>
+            <pc:sldMk cId="1784561452" sldId="276"/>
+            <ac:cxnSpMk id="82" creationId="{2CE82207-2F83-4D0D-67EC-E20E2121A523}"/>
+          </ac:cxnSpMkLst>
+        </pc:cxnChg>
+      </pc:sldChg>
+      <pc:sldChg chg="add del">
+        <pc:chgData name="Shin Fukui" userId="6902ee70c48ce296" providerId="LiveId" clId="{8985314D-7B59-794E-B714-B61B72E0EF33}" dt="2023-11-18T09:38:55.548" v="386" actId="2696"/>
+        <pc:sldMkLst>
+          <pc:docMk/>
+          <pc:sldMk cId="686349826" sldId="347"/>
+        </pc:sldMkLst>
+      </pc:sldChg>
+      <pc:sldChg chg="add del">
+        <pc:chgData name="Shin Fukui" userId="6902ee70c48ce296" providerId="LiveId" clId="{8985314D-7B59-794E-B714-B61B72E0EF33}" dt="2023-11-18T09:04:16.670" v="111"/>
+        <pc:sldMkLst>
+          <pc:docMk/>
+          <pc:sldMk cId="2531338325" sldId="348"/>
+        </pc:sldMkLst>
       </pc:sldChg>
     </pc:docChg>
   </pc:docChgLst>
@@ -527,7 +1118,7 @@
           <a:p>
             <a:fld id="{F41C2A34-CE68-FD4E-BC01-FE443B276CDB}" type="datetimeFigureOut">
               <a:rPr kumimoji="1" lang="ja-JP" altLang="en-US" smtClean="0"/>
-              <a:t>2023/9/27</a:t>
+              <a:t>2023/11/26</a:t>
             </a:fld>
             <a:endParaRPr kumimoji="1" lang="ja-JP" altLang="en-US"/>
           </a:p>
@@ -954,69 +1545,6 @@
           <a:bodyPr/>
           <a:lstStyle/>
           <a:p>
-            <a:r>
-              <a:rPr kumimoji="1" lang="ja-JP" altLang="en-US"/>
-              <a:t>このスライドはわかりにくいな．</a:t>
-            </a:r>
-            <a:endParaRPr kumimoji="1" lang="en-US" altLang="ja-JP" dirty="0"/>
-          </a:p>
-          <a:p>
-            <a:endParaRPr kumimoji="1" lang="en-US" altLang="ja-JP" dirty="0"/>
-          </a:p>
-          <a:p>
-            <a:r>
-              <a:rPr kumimoji="1" lang="ja-JP" altLang="en-US"/>
-              <a:t>そもそも，得られたデータは偶然の産物．仮に同じ条件でサンプリングを繰り返したら別のデータ，別の推定結果が得られる．</a:t>
-            </a:r>
-            <a:endParaRPr kumimoji="1" lang="en-US" altLang="ja-JP" dirty="0"/>
-          </a:p>
-          <a:p>
-            <a:r>
-              <a:rPr kumimoji="1" lang="ja-JP" altLang="en-US"/>
-              <a:t>→　信頼区間てのは，そういう仮想サンプリングを繰り返した場合に推定値はこの範囲に収まりますよ，という区間．</a:t>
-            </a:r>
-            <a:endParaRPr kumimoji="1" lang="en-US" altLang="ja-JP" dirty="0"/>
-          </a:p>
-          <a:p>
-            <a:r>
-              <a:rPr kumimoji="1" lang="ja-JP" altLang="en-US"/>
-              <a:t>→　</a:t>
-            </a:r>
-            <a:r>
-              <a:rPr kumimoji="1" lang="en-US" altLang="ja-JP" dirty="0"/>
-              <a:t>Bootstrapping</a:t>
-            </a:r>
-            <a:r>
-              <a:rPr kumimoji="1" lang="ja-JP" altLang="en-US"/>
-              <a:t>てのは，そういうまだ見ぬデータを仮想サンプリングによって大量に生成する方法．</a:t>
-            </a:r>
-            <a:endParaRPr kumimoji="1" lang="en-US" altLang="ja-JP" dirty="0"/>
-          </a:p>
-          <a:p>
-            <a:r>
-              <a:rPr kumimoji="1" lang="ja-JP" altLang="en-US"/>
-              <a:t>→　大量に生成した仮想データ一つ一つで推定を行うことにより，それぞれのパラメタの推定値がこのくらいの範囲におさまるよ，てのがわかる</a:t>
-            </a:r>
-            <a:endParaRPr kumimoji="1" lang="en-US" altLang="ja-JP" dirty="0"/>
-          </a:p>
-          <a:p>
-            <a:r>
-              <a:rPr kumimoji="1" lang="ja-JP" altLang="en-US"/>
-              <a:t>→　その仮想サンプリングの方法にはいくつかあって．．．次スライドに続く</a:t>
-            </a:r>
-            <a:endParaRPr kumimoji="1" lang="en-US" altLang="ja-JP" dirty="0"/>
-          </a:p>
-          <a:p>
-            <a:endParaRPr kumimoji="1" lang="en-US" altLang="ja-JP" dirty="0"/>
-          </a:p>
-          <a:p>
-            <a:endParaRPr kumimoji="1" lang="en-US" altLang="ja-JP" dirty="0"/>
-          </a:p>
-          <a:p>
-            <a:r>
-              <a:rPr kumimoji="1" lang="ja-JP" altLang="en-US"/>
-              <a:t>文言をだいぶ変えた。これでどうかな？</a:t>
-            </a:r>
             <a:endParaRPr kumimoji="1" lang="en-US" altLang="ja-JP" dirty="0"/>
           </a:p>
         </p:txBody>
@@ -1131,7 +1659,7 @@
     </p:spTree>
     <p:extLst>
       <p:ext uri="{BB962C8B-B14F-4D97-AF65-F5344CB8AC3E}">
-        <p14:creationId xmlns:p14="http://schemas.microsoft.com/office/powerpoint/2010/main" val="305334063"/>
+        <p14:creationId xmlns:p14="http://schemas.microsoft.com/office/powerpoint/2010/main" val="345390368"/>
       </p:ext>
     </p:extLst>
   </p:cSld>
@@ -1215,7 +1743,7 @@
     </p:spTree>
     <p:extLst>
       <p:ext uri="{BB962C8B-B14F-4D97-AF65-F5344CB8AC3E}">
-        <p14:creationId xmlns:p14="http://schemas.microsoft.com/office/powerpoint/2010/main" val="1869690690"/>
+        <p14:creationId xmlns:p14="http://schemas.microsoft.com/office/powerpoint/2010/main" val="305334063"/>
       </p:ext>
     </p:extLst>
   </p:cSld>
@@ -1291,6 +1819,90 @@
             <a:fld id="{4F78AA7F-8E32-9F43-88CC-02DD02F6000E}" type="slidenum">
               <a:rPr kumimoji="1" lang="ja-JP" altLang="en-US" smtClean="0"/>
               <a:t>8</a:t>
+            </a:fld>
+            <a:endParaRPr kumimoji="1" lang="ja-JP" altLang="en-US"/>
+          </a:p>
+        </p:txBody>
+      </p:sp>
+    </p:spTree>
+    <p:extLst>
+      <p:ext uri="{BB962C8B-B14F-4D97-AF65-F5344CB8AC3E}">
+        <p14:creationId xmlns:p14="http://schemas.microsoft.com/office/powerpoint/2010/main" val="1869690690"/>
+      </p:ext>
+    </p:extLst>
+  </p:cSld>
+  <p:clrMapOvr>
+    <a:masterClrMapping/>
+  </p:clrMapOvr>
+</p:notes>
+</file>
+
+<file path=ppt/notesSlides/notesSlide6.xml><?xml version="1.0" encoding="utf-8"?>
+<p:notes xmlns:a="http://schemas.openxmlformats.org/drawingml/2006/main" xmlns:r="http://schemas.openxmlformats.org/officeDocument/2006/relationships" xmlns:p="http://schemas.openxmlformats.org/presentationml/2006/main">
+  <p:cSld>
+    <p:spTree>
+      <p:nvGrpSpPr>
+        <p:cNvPr id="1" name=""/>
+        <p:cNvGrpSpPr/>
+        <p:nvPr/>
+      </p:nvGrpSpPr>
+      <p:grpSpPr>
+        <a:xfrm>
+          <a:off x="0" y="0"/>
+          <a:ext cx="0" cy="0"/>
+          <a:chOff x="0" y="0"/>
+          <a:chExt cx="0" cy="0"/>
+        </a:xfrm>
+      </p:grpSpPr>
+      <p:sp>
+        <p:nvSpPr>
+          <p:cNvPr id="2" name="スライド イメージ プレースホルダー 1"/>
+          <p:cNvSpPr>
+            <a:spLocks noGrp="1" noRot="1" noChangeAspect="1"/>
+          </p:cNvSpPr>
+          <p:nvPr>
+            <p:ph type="sldImg"/>
+          </p:nvPr>
+        </p:nvSpPr>
+        <p:spPr/>
+      </p:sp>
+      <p:sp>
+        <p:nvSpPr>
+          <p:cNvPr id="3" name="ノート プレースホルダー 2"/>
+          <p:cNvSpPr>
+            <a:spLocks noGrp="1"/>
+          </p:cNvSpPr>
+          <p:nvPr>
+            <p:ph type="body" idx="1"/>
+          </p:nvPr>
+        </p:nvSpPr>
+        <p:spPr/>
+        <p:txBody>
+          <a:bodyPr/>
+          <a:lstStyle/>
+          <a:p>
+            <a:endParaRPr kumimoji="1" lang="ja-JP" altLang="en-US"/>
+          </a:p>
+        </p:txBody>
+      </p:sp>
+      <p:sp>
+        <p:nvSpPr>
+          <p:cNvPr id="4" name="スライド番号プレースホルダー 3"/>
+          <p:cNvSpPr>
+            <a:spLocks noGrp="1"/>
+          </p:cNvSpPr>
+          <p:nvPr>
+            <p:ph type="sldNum" sz="quarter" idx="5"/>
+          </p:nvPr>
+        </p:nvSpPr>
+        <p:spPr/>
+        <p:txBody>
+          <a:bodyPr/>
+          <a:lstStyle/>
+          <a:p>
+            <a:fld id="{4F78AA7F-8E32-9F43-88CC-02DD02F6000E}" type="slidenum">
+              <a:rPr kumimoji="1" lang="ja-JP" altLang="en-US" smtClean="0"/>
+              <a:t>9</a:t>
             </a:fld>
             <a:endParaRPr kumimoji="1" lang="ja-JP" altLang="en-US"/>
           </a:p>
@@ -1456,7 +2068,7 @@
           <a:p>
             <a:fld id="{E7AA294B-5299-B042-9CE8-0D364E0B4401}" type="datetimeFigureOut">
               <a:rPr kumimoji="1" lang="ja-JP" altLang="en-US" smtClean="0"/>
-              <a:t>2023/9/27</a:t>
+              <a:t>2023/11/26</a:t>
             </a:fld>
             <a:endParaRPr kumimoji="1" lang="ja-JP" altLang="en-US"/>
           </a:p>
@@ -1686,7 +2298,7 @@
           <a:p>
             <a:fld id="{E7AA294B-5299-B042-9CE8-0D364E0B4401}" type="datetimeFigureOut">
               <a:rPr kumimoji="1" lang="ja-JP" altLang="en-US" smtClean="0"/>
-              <a:t>2023/9/27</a:t>
+              <a:t>2023/11/26</a:t>
             </a:fld>
             <a:endParaRPr kumimoji="1" lang="ja-JP" altLang="en-US"/>
           </a:p>
@@ -1926,7 +2538,7 @@
           <a:p>
             <a:fld id="{E7AA294B-5299-B042-9CE8-0D364E0B4401}" type="datetimeFigureOut">
               <a:rPr kumimoji="1" lang="ja-JP" altLang="en-US" smtClean="0"/>
-              <a:t>2023/9/27</a:t>
+              <a:t>2023/11/26</a:t>
             </a:fld>
             <a:endParaRPr kumimoji="1" lang="ja-JP" altLang="en-US"/>
           </a:p>
@@ -2156,7 +2768,7 @@
           <a:p>
             <a:fld id="{E7AA294B-5299-B042-9CE8-0D364E0B4401}" type="datetimeFigureOut">
               <a:rPr kumimoji="1" lang="ja-JP" altLang="en-US" smtClean="0"/>
-              <a:t>2023/9/27</a:t>
+              <a:t>2023/11/26</a:t>
             </a:fld>
             <a:endParaRPr kumimoji="1" lang="ja-JP" altLang="en-US"/>
           </a:p>
@@ -2431,7 +3043,7 @@
           <a:p>
             <a:fld id="{E7AA294B-5299-B042-9CE8-0D364E0B4401}" type="datetimeFigureOut">
               <a:rPr kumimoji="1" lang="ja-JP" altLang="en-US" smtClean="0"/>
-              <a:t>2023/9/27</a:t>
+              <a:t>2023/11/26</a:t>
             </a:fld>
             <a:endParaRPr kumimoji="1" lang="ja-JP" altLang="en-US"/>
           </a:p>
@@ -2760,7 +3372,7 @@
           <a:p>
             <a:fld id="{E7AA294B-5299-B042-9CE8-0D364E0B4401}" type="datetimeFigureOut">
               <a:rPr kumimoji="1" lang="ja-JP" altLang="en-US" smtClean="0"/>
-              <a:t>2023/9/27</a:t>
+              <a:t>2023/11/26</a:t>
             </a:fld>
             <a:endParaRPr kumimoji="1" lang="ja-JP" altLang="en-US"/>
           </a:p>
@@ -3236,7 +3848,7 @@
           <a:p>
             <a:fld id="{E7AA294B-5299-B042-9CE8-0D364E0B4401}" type="datetimeFigureOut">
               <a:rPr kumimoji="1" lang="ja-JP" altLang="en-US" smtClean="0"/>
-              <a:t>2023/9/27</a:t>
+              <a:t>2023/11/26</a:t>
             </a:fld>
             <a:endParaRPr kumimoji="1" lang="ja-JP" altLang="en-US"/>
           </a:p>
@@ -3377,7 +3989,7 @@
           <a:p>
             <a:fld id="{E7AA294B-5299-B042-9CE8-0D364E0B4401}" type="datetimeFigureOut">
               <a:rPr kumimoji="1" lang="ja-JP" altLang="en-US" smtClean="0"/>
-              <a:t>2023/9/27</a:t>
+              <a:t>2023/11/26</a:t>
             </a:fld>
             <a:endParaRPr kumimoji="1" lang="ja-JP" altLang="en-US"/>
           </a:p>
@@ -3490,7 +4102,7 @@
           <a:p>
             <a:fld id="{E7AA294B-5299-B042-9CE8-0D364E0B4401}" type="datetimeFigureOut">
               <a:rPr kumimoji="1" lang="ja-JP" altLang="en-US" smtClean="0"/>
-              <a:t>2023/9/27</a:t>
+              <a:t>2023/11/26</a:t>
             </a:fld>
             <a:endParaRPr kumimoji="1" lang="ja-JP" altLang="en-US"/>
           </a:p>
@@ -3833,7 +4445,7 @@
           <a:p>
             <a:fld id="{E7AA294B-5299-B042-9CE8-0D364E0B4401}" type="datetimeFigureOut">
               <a:rPr kumimoji="1" lang="ja-JP" altLang="en-US" smtClean="0"/>
-              <a:t>2023/9/27</a:t>
+              <a:t>2023/11/26</a:t>
             </a:fld>
             <a:endParaRPr kumimoji="1" lang="ja-JP" altLang="en-US"/>
           </a:p>
@@ -4121,7 +4733,7 @@
           <a:p>
             <a:fld id="{E7AA294B-5299-B042-9CE8-0D364E0B4401}" type="datetimeFigureOut">
               <a:rPr kumimoji="1" lang="ja-JP" altLang="en-US" smtClean="0"/>
-              <a:t>2023/9/27</a:t>
+              <a:t>2023/11/26</a:t>
             </a:fld>
             <a:endParaRPr kumimoji="1" lang="ja-JP" altLang="en-US"/>
           </a:p>
@@ -4394,7 +5006,7 @@
           <a:p>
             <a:fld id="{E7AA294B-5299-B042-9CE8-0D364E0B4401}" type="datetimeFigureOut">
               <a:rPr kumimoji="1" lang="ja-JP" altLang="en-US" smtClean="0"/>
-              <a:t>2023/9/27</a:t>
+              <a:t>2023/11/26</a:t>
             </a:fld>
             <a:endParaRPr kumimoji="1" lang="ja-JP" altLang="en-US"/>
           </a:p>
@@ -4901,6 +5513,187 @@
 </p:sld>
 </file>
 
+<file path=ppt/slides/slide10.xml><?xml version="1.0" encoding="utf-8"?>
+<p:sld xmlns:a="http://schemas.openxmlformats.org/drawingml/2006/main" xmlns:r="http://schemas.openxmlformats.org/officeDocument/2006/relationships" xmlns:p="http://schemas.openxmlformats.org/presentationml/2006/main">
+  <p:cSld>
+    <p:spTree>
+      <p:nvGrpSpPr>
+        <p:cNvPr id="1" name=""/>
+        <p:cNvGrpSpPr/>
+        <p:nvPr/>
+      </p:nvGrpSpPr>
+      <p:grpSpPr>
+        <a:xfrm>
+          <a:off x="0" y="0"/>
+          <a:ext cx="0" cy="0"/>
+          <a:chOff x="0" y="0"/>
+          <a:chExt cx="0" cy="0"/>
+        </a:xfrm>
+      </p:grpSpPr>
+      <p:sp>
+        <p:nvSpPr>
+          <p:cNvPr id="2" name="タイトル 1">
+            <a:extLst>
+              <a:ext uri="{FF2B5EF4-FFF2-40B4-BE49-F238E27FC236}">
+                <a16:creationId xmlns:a16="http://schemas.microsoft.com/office/drawing/2014/main" id="{40FC6021-826A-0942-A300-5E874250BDDB}"/>
+              </a:ext>
+            </a:extLst>
+          </p:cNvPr>
+          <p:cNvSpPr>
+            <a:spLocks noGrp="1"/>
+          </p:cNvSpPr>
+          <p:nvPr>
+            <p:ph type="title"/>
+          </p:nvPr>
+        </p:nvSpPr>
+        <p:spPr/>
+        <p:txBody>
+          <a:bodyPr/>
+          <a:lstStyle/>
+          <a:p>
+            <a:r>
+              <a:rPr lang="en-US" altLang="ja-JP" dirty="0"/>
+              <a:t>95</a:t>
+            </a:r>
+            <a:r>
+              <a:rPr lang="ja-JP" altLang="en-US"/>
+              <a:t>％</a:t>
+            </a:r>
+            <a:r>
+              <a:rPr lang="en-US" altLang="ja-JP" dirty="0"/>
+              <a:t>CI</a:t>
+            </a:r>
+            <a:r>
+              <a:rPr lang="ja-JP" altLang="en-US"/>
+              <a:t>を求める</a:t>
+            </a:r>
+            <a:endParaRPr kumimoji="1" lang="ja-JP" altLang="en-US"/>
+          </a:p>
+        </p:txBody>
+      </p:sp>
+      <p:sp>
+        <p:nvSpPr>
+          <p:cNvPr id="3" name="コンテンツ プレースホルダー 2">
+            <a:extLst>
+              <a:ext uri="{FF2B5EF4-FFF2-40B4-BE49-F238E27FC236}">
+                <a16:creationId xmlns:a16="http://schemas.microsoft.com/office/drawing/2014/main" id="{CDC8DD76-78D5-2C49-B9E9-B68EB5D157E7}"/>
+              </a:ext>
+            </a:extLst>
+          </p:cNvPr>
+          <p:cNvSpPr>
+            <a:spLocks noGrp="1"/>
+          </p:cNvSpPr>
+          <p:nvPr>
+            <p:ph idx="1"/>
+          </p:nvPr>
+        </p:nvSpPr>
+        <p:spPr/>
+        <p:txBody>
+          <a:bodyPr/>
+          <a:lstStyle/>
+          <a:p>
+            <a:r>
+              <a:rPr kumimoji="1" lang="ja-JP" altLang="en-US"/>
+              <a:t>まずは</a:t>
+            </a:r>
+            <a:r>
+              <a:rPr kumimoji="1" lang="en-US" altLang="ja-JP" dirty="0"/>
+              <a:t>cpuestandardize2.csv</a:t>
+            </a:r>
+            <a:r>
+              <a:rPr lang="ja-JP" altLang="en-US"/>
+              <a:t>データを読み込んで</a:t>
+            </a:r>
+            <a:r>
+              <a:rPr lang="en-US" altLang="ja-JP" dirty="0"/>
+              <a:t>CPUE</a:t>
+            </a:r>
+            <a:r>
+              <a:rPr lang="ja-JP" altLang="en-US"/>
+              <a:t>の標準化を行う．</a:t>
+            </a:r>
+            <a:endParaRPr lang="en-US" altLang="ja-JP" dirty="0"/>
+          </a:p>
+          <a:p>
+            <a:pPr lvl="1"/>
+            <a:r>
+              <a:rPr kumimoji="1" lang="ja-JP" altLang="en-US"/>
+              <a:t>今回は</a:t>
+            </a:r>
+            <a:r>
+              <a:rPr kumimoji="1" lang="en-US" altLang="ja-JP" dirty="0"/>
+              <a:t>vessel</a:t>
+            </a:r>
+            <a:r>
+              <a:rPr kumimoji="1" lang="ja-JP" altLang="en-US"/>
+              <a:t>の数が多い→ランダム効果にして</a:t>
+            </a:r>
+            <a:r>
+              <a:rPr lang="en-US" altLang="ja-JP" dirty="0"/>
+              <a:t>GLMM</a:t>
+            </a:r>
+            <a:r>
+              <a:rPr lang="ja-JP" altLang="en-US"/>
+              <a:t>を実行</a:t>
+            </a:r>
+            <a:endParaRPr kumimoji="1" lang="en-US" altLang="ja-JP" dirty="0"/>
+          </a:p>
+          <a:p>
+            <a:pPr marL="0" indent="0">
+              <a:buNone/>
+            </a:pPr>
+            <a:endParaRPr kumimoji="1" lang="en-US" altLang="ja-JP" dirty="0"/>
+          </a:p>
+          <a:p>
+            <a:r>
+              <a:rPr lang="en-US" altLang="ja-JP" dirty="0"/>
+              <a:t>100</a:t>
+            </a:r>
+            <a:r>
+              <a:rPr lang="ja-JP" altLang="en-US"/>
+              <a:t>個のデータセットを作成して標準化</a:t>
+            </a:r>
+            <a:r>
+              <a:rPr lang="en-US" altLang="ja-JP" dirty="0"/>
+              <a:t>CPUE</a:t>
+            </a:r>
+            <a:r>
+              <a:rPr lang="ja-JP" altLang="en-US"/>
+              <a:t>の</a:t>
+            </a:r>
+            <a:r>
+              <a:rPr lang="en-US" altLang="ja-JP" dirty="0"/>
+              <a:t>95</a:t>
+            </a:r>
+            <a:r>
+              <a:rPr lang="ja-JP" altLang="en-US"/>
+              <a:t>％</a:t>
+            </a:r>
+            <a:r>
+              <a:rPr lang="en-US" altLang="ja-JP" dirty="0"/>
+              <a:t>CI</a:t>
+            </a:r>
+            <a:r>
+              <a:rPr lang="ja-JP" altLang="en-US"/>
+              <a:t>を求めてみよう．</a:t>
+            </a:r>
+            <a:endParaRPr kumimoji="1" lang="ja-JP" altLang="en-US"/>
+          </a:p>
+        </p:txBody>
+      </p:sp>
+    </p:spTree>
+    <p:extLst>
+      <p:ext uri="{BB962C8B-B14F-4D97-AF65-F5344CB8AC3E}">
+        <p14:creationId xmlns:p14="http://schemas.microsoft.com/office/powerpoint/2010/main" val="1629263179"/>
+      </p:ext>
+    </p:extLst>
+  </p:cSld>
+  <p:clrMapOvr>
+    <a:masterClrMapping/>
+  </p:clrMapOvr>
+</p:sld>
+</file>
+
 <file path=ppt/slides/slide2.xml><?xml version="1.0" encoding="utf-8"?>
 <p:sld xmlns:a="http://schemas.openxmlformats.org/drawingml/2006/main" xmlns:r="http://schemas.openxmlformats.org/officeDocument/2006/relationships" xmlns:p="http://schemas.openxmlformats.org/presentationml/2006/main">
   <p:cSld>
@@ -7133,7 +7926,7 @@
           <p:cNvPr id="2" name="タイトル 1">
             <a:extLst>
               <a:ext uri="{FF2B5EF4-FFF2-40B4-BE49-F238E27FC236}">
-                <a16:creationId xmlns:a16="http://schemas.microsoft.com/office/drawing/2014/main" id="{5D7BDEE0-CCBA-7B41-AA94-850779A2743E}"/>
+                <a16:creationId xmlns:a16="http://schemas.microsoft.com/office/drawing/2014/main" id="{2CAD1A31-AC48-4EEE-8DF4-871AE7581CC7}"/>
               </a:ext>
             </a:extLst>
           </p:cNvPr>
@@ -7150,169 +7943,1642 @@
           <a:lstStyle/>
           <a:p>
             <a:r>
-              <a:rPr kumimoji="1" lang="ja-JP" altLang="en-US"/>
-              <a:t>ブートストラップの方法</a:t>
-            </a:r>
-          </a:p>
-        </p:txBody>
-      </p:sp>
-      <p:sp>
-        <p:nvSpPr>
-          <p:cNvPr id="3" name="コンテンツ プレースホルダー 2">
-            <a:extLst>
-              <a:ext uri="{FF2B5EF4-FFF2-40B4-BE49-F238E27FC236}">
-                <a16:creationId xmlns:a16="http://schemas.microsoft.com/office/drawing/2014/main" id="{D222E444-4FE7-FF48-85C5-193FD23C9F85}"/>
-              </a:ext>
-            </a:extLst>
-          </p:cNvPr>
-          <p:cNvSpPr>
-            <a:spLocks noGrp="1"/>
-          </p:cNvSpPr>
-          <p:nvPr>
-            <p:ph idx="1"/>
-          </p:nvPr>
+              <a:rPr lang="ja-JP" altLang="en-US"/>
+              <a:t>大数の法則と母平均の推定誤差</a:t>
+            </a:r>
+            <a:endParaRPr kumimoji="1" lang="ja-JP" altLang="en-US"/>
+          </a:p>
+        </p:txBody>
+      </p:sp>
+      <p:sp>
+        <p:nvSpPr>
+          <p:cNvPr id="4" name="円/楕円 3">
+            <a:extLst>
+              <a:ext uri="{FF2B5EF4-FFF2-40B4-BE49-F238E27FC236}">
+                <a16:creationId xmlns:a16="http://schemas.microsoft.com/office/drawing/2014/main" id="{676D3366-ED80-649F-8B5C-A5E32C59399B}"/>
+              </a:ext>
+            </a:extLst>
+          </p:cNvPr>
+          <p:cNvSpPr/>
+          <p:nvPr/>
         </p:nvSpPr>
         <p:spPr>
           <a:xfrm>
-            <a:off x="838200" y="1825624"/>
-            <a:ext cx="10515600" cy="4667251"/>
+            <a:off x="140900" y="2553715"/>
+            <a:ext cx="1614055" cy="1614055"/>
           </a:xfrm>
+          <a:prstGeom prst="ellipse">
+            <a:avLst/>
+          </a:prstGeom>
+          <a:solidFill>
+            <a:srgbClr val="002060"/>
+          </a:solidFill>
         </p:spPr>
-        <p:txBody>
-          <a:bodyPr>
-            <a:normAutofit fontScale="85000" lnSpcReduction="20000"/>
+        <p:style>
+          <a:lnRef idx="2">
+            <a:schemeClr val="accent1">
+              <a:shade val="50000"/>
+            </a:schemeClr>
+          </a:lnRef>
+          <a:fillRef idx="1">
+            <a:schemeClr val="accent1"/>
+          </a:fillRef>
+          <a:effectRef idx="0">
+            <a:schemeClr val="accent1"/>
+          </a:effectRef>
+          <a:fontRef idx="minor">
+            <a:schemeClr val="lt1"/>
+          </a:fontRef>
+        </p:style>
+        <p:txBody>
+          <a:bodyPr rtlCol="0" anchor="ctr"/>
+          <a:lstStyle/>
+          <a:p>
+            <a:pPr algn="ctr"/>
+            <a:r>
+              <a:rPr kumimoji="1" lang="ja-JP" altLang="en-US"/>
+              <a:t>母集団</a:t>
+            </a:r>
+          </a:p>
+        </p:txBody>
+      </p:sp>
+      <p:cxnSp>
+        <p:nvCxnSpPr>
+          <p:cNvPr id="5" name="直線矢印コネクタ 4">
+            <a:extLst>
+              <a:ext uri="{FF2B5EF4-FFF2-40B4-BE49-F238E27FC236}">
+                <a16:creationId xmlns:a16="http://schemas.microsoft.com/office/drawing/2014/main" id="{D1071CCB-FD3D-5E10-CFEA-9256638EF8C2}"/>
+              </a:ext>
+            </a:extLst>
+          </p:cNvPr>
+          <p:cNvCxnSpPr>
+            <a:cxnSpLocks/>
+          </p:cNvCxnSpPr>
+          <p:nvPr/>
+        </p:nvCxnSpPr>
+        <p:spPr>
+          <a:xfrm flipV="1">
+            <a:off x="1754955" y="2792704"/>
+            <a:ext cx="1705400" cy="671393"/>
+          </a:xfrm>
+          <a:prstGeom prst="straightConnector1">
+            <a:avLst/>
+          </a:prstGeom>
+          <a:ln>
+            <a:tailEnd type="triangle"/>
+          </a:ln>
+        </p:spPr>
+        <p:style>
+          <a:lnRef idx="1">
+            <a:schemeClr val="accent1"/>
+          </a:lnRef>
+          <a:fillRef idx="0">
+            <a:schemeClr val="accent1"/>
+          </a:fillRef>
+          <a:effectRef idx="0">
+            <a:schemeClr val="accent1"/>
+          </a:effectRef>
+          <a:fontRef idx="minor">
+            <a:schemeClr val="tx1"/>
+          </a:fontRef>
+        </p:style>
+      </p:cxnSp>
+      <p:pic>
+        <p:nvPicPr>
+          <p:cNvPr id="6" name="図 5">
+            <a:extLst>
+              <a:ext uri="{FF2B5EF4-FFF2-40B4-BE49-F238E27FC236}">
+                <a16:creationId xmlns:a16="http://schemas.microsoft.com/office/drawing/2014/main" id="{1115CBE8-F0F7-C9C1-FA3A-0B59908ED3A3}"/>
+              </a:ext>
+            </a:extLst>
+          </p:cNvPr>
+          <p:cNvPicPr>
+            <a:picLocks noChangeAspect="1"/>
+          </p:cNvPicPr>
+          <p:nvPr/>
+        </p:nvPicPr>
+        <p:blipFill>
+          <a:blip r:embed="rId3"/>
+          <a:stretch>
+            <a:fillRect/>
+          </a:stretch>
+        </p:blipFill>
+        <p:spPr>
+          <a:xfrm>
+            <a:off x="3426343" y="1414356"/>
+            <a:ext cx="1580341" cy="1914804"/>
+          </a:xfrm>
+          <a:prstGeom prst="rect">
+            <a:avLst/>
+          </a:prstGeom>
+        </p:spPr>
+      </p:pic>
+      <p:sp>
+        <p:nvSpPr>
+          <p:cNvPr id="7" name="テキスト ボックス 6">
+            <a:extLst>
+              <a:ext uri="{FF2B5EF4-FFF2-40B4-BE49-F238E27FC236}">
+                <a16:creationId xmlns:a16="http://schemas.microsoft.com/office/drawing/2014/main" id="{F220D244-8830-1BB8-4C79-9ED033E1901D}"/>
+              </a:ext>
+            </a:extLst>
+          </p:cNvPr>
+          <p:cNvSpPr txBox="1"/>
+          <p:nvPr/>
+        </p:nvSpPr>
+        <p:spPr>
+          <a:xfrm>
+            <a:off x="4504687" y="1908531"/>
+            <a:ext cx="1101584" cy="369332"/>
+          </a:xfrm>
+          <a:prstGeom prst="rect">
+            <a:avLst/>
+          </a:prstGeom>
+          <a:noFill/>
+        </p:spPr>
+        <p:txBody>
+          <a:bodyPr wrap="none" rtlCol="0">
+            <a:spAutoFit/>
           </a:bodyPr>
           <a:lstStyle/>
           <a:p>
             <a:r>
+              <a:rPr kumimoji="1" lang="en-US" altLang="ja-JP" dirty="0" err="1"/>
+              <a:t>sampleA</a:t>
+            </a:r>
+            <a:endParaRPr kumimoji="1" lang="ja-JP" altLang="en-US"/>
+          </a:p>
+        </p:txBody>
+      </p:sp>
+      <p:sp>
+        <p:nvSpPr>
+          <p:cNvPr id="10" name="テキスト ボックス 9">
+            <a:extLst>
+              <a:ext uri="{FF2B5EF4-FFF2-40B4-BE49-F238E27FC236}">
+                <a16:creationId xmlns:a16="http://schemas.microsoft.com/office/drawing/2014/main" id="{840EC2DD-3CDF-A633-BDE9-2346EADEFC6B}"/>
+              </a:ext>
+            </a:extLst>
+          </p:cNvPr>
+          <p:cNvSpPr txBox="1"/>
+          <p:nvPr/>
+        </p:nvSpPr>
+        <p:spPr>
+          <a:xfrm>
+            <a:off x="1717116" y="2343628"/>
+            <a:ext cx="1569660" cy="646331"/>
+          </a:xfrm>
+          <a:prstGeom prst="rect">
+            <a:avLst/>
+          </a:prstGeom>
+          <a:noFill/>
+        </p:spPr>
+        <p:txBody>
+          <a:bodyPr wrap="none" rtlCol="0">
+            <a:spAutoFit/>
+          </a:bodyPr>
+          <a:lstStyle/>
+          <a:p>
+            <a:r>
+              <a:rPr kumimoji="1" lang="ja-JP" altLang="en-US"/>
+              <a:t>ランダム</a:t>
+            </a:r>
+            <a:endParaRPr kumimoji="1" lang="en-US" altLang="ja-JP" dirty="0"/>
+          </a:p>
+          <a:p>
+            <a:r>
+              <a:rPr kumimoji="1" lang="ja-JP" altLang="en-US"/>
+              <a:t>サンプリング</a:t>
+            </a:r>
+          </a:p>
+        </p:txBody>
+      </p:sp>
+      <p:pic>
+        <p:nvPicPr>
+          <p:cNvPr id="12" name="図 11">
+            <a:extLst>
+              <a:ext uri="{FF2B5EF4-FFF2-40B4-BE49-F238E27FC236}">
+                <a16:creationId xmlns:a16="http://schemas.microsoft.com/office/drawing/2014/main" id="{AC646A5C-DF1A-6622-3DF7-6FFD117EC72C}"/>
+              </a:ext>
+            </a:extLst>
+          </p:cNvPr>
+          <p:cNvPicPr>
+            <a:picLocks noChangeAspect="1"/>
+          </p:cNvPicPr>
+          <p:nvPr/>
+        </p:nvPicPr>
+        <p:blipFill>
+          <a:blip r:embed="rId4"/>
+          <a:stretch>
+            <a:fillRect/>
+          </a:stretch>
+        </p:blipFill>
+        <p:spPr>
+          <a:xfrm>
+            <a:off x="3960135" y="3700450"/>
+            <a:ext cx="1484018" cy="1798096"/>
+          </a:xfrm>
+          <a:prstGeom prst="rect">
+            <a:avLst/>
+          </a:prstGeom>
+        </p:spPr>
+      </p:pic>
+      <p:pic>
+        <p:nvPicPr>
+          <p:cNvPr id="13" name="図 12">
+            <a:extLst>
+              <a:ext uri="{FF2B5EF4-FFF2-40B4-BE49-F238E27FC236}">
+                <a16:creationId xmlns:a16="http://schemas.microsoft.com/office/drawing/2014/main" id="{C869F5A7-7FF0-9701-E917-BD3C53B814CB}"/>
+              </a:ext>
+            </a:extLst>
+          </p:cNvPr>
+          <p:cNvPicPr>
+            <a:picLocks noChangeAspect="1"/>
+          </p:cNvPicPr>
+          <p:nvPr/>
+        </p:nvPicPr>
+        <p:blipFill>
+          <a:blip r:embed="rId3"/>
+          <a:stretch>
+            <a:fillRect/>
+          </a:stretch>
+        </p:blipFill>
+        <p:spPr>
+          <a:xfrm>
+            <a:off x="2558862" y="3365075"/>
+            <a:ext cx="1572276" cy="1860268"/>
+          </a:xfrm>
+          <a:prstGeom prst="rect">
+            <a:avLst/>
+          </a:prstGeom>
+        </p:spPr>
+      </p:pic>
+      <p:pic>
+        <p:nvPicPr>
+          <p:cNvPr id="14" name="図 13">
+            <a:extLst>
+              <a:ext uri="{FF2B5EF4-FFF2-40B4-BE49-F238E27FC236}">
+                <a16:creationId xmlns:a16="http://schemas.microsoft.com/office/drawing/2014/main" id="{C991CD76-91FF-D109-C86D-1B49F57002C9}"/>
+              </a:ext>
+            </a:extLst>
+          </p:cNvPr>
+          <p:cNvPicPr>
+            <a:picLocks noChangeAspect="1"/>
+          </p:cNvPicPr>
+          <p:nvPr/>
+        </p:nvPicPr>
+        <p:blipFill>
+          <a:blip r:embed="rId3"/>
+          <a:stretch>
+            <a:fillRect/>
+          </a:stretch>
+        </p:blipFill>
+        <p:spPr>
+          <a:xfrm>
+            <a:off x="5699706" y="4095867"/>
+            <a:ext cx="1572276" cy="1905033"/>
+          </a:xfrm>
+          <a:prstGeom prst="rect">
+            <a:avLst/>
+          </a:prstGeom>
+        </p:spPr>
+      </p:pic>
+      <p:sp>
+        <p:nvSpPr>
+          <p:cNvPr id="18" name="テキスト ボックス 17">
+            <a:extLst>
+              <a:ext uri="{FF2B5EF4-FFF2-40B4-BE49-F238E27FC236}">
+                <a16:creationId xmlns:a16="http://schemas.microsoft.com/office/drawing/2014/main" id="{CDC3D94F-5929-C7BF-BEE8-7A0A771BBACA}"/>
+              </a:ext>
+            </a:extLst>
+          </p:cNvPr>
+          <p:cNvSpPr txBox="1"/>
+          <p:nvPr/>
+        </p:nvSpPr>
+        <p:spPr>
+          <a:xfrm>
+            <a:off x="2495057" y="3167737"/>
+            <a:ext cx="1101584" cy="369332"/>
+          </a:xfrm>
+          <a:prstGeom prst="rect">
+            <a:avLst/>
+          </a:prstGeom>
+          <a:noFill/>
+        </p:spPr>
+        <p:txBody>
+          <a:bodyPr wrap="none" rtlCol="0">
+            <a:spAutoFit/>
+          </a:bodyPr>
+          <a:lstStyle/>
+          <a:p>
+            <a:r>
+              <a:rPr kumimoji="1" lang="en-US" altLang="ja-JP" dirty="0" err="1"/>
+              <a:t>sampleB</a:t>
+            </a:r>
+            <a:endParaRPr kumimoji="1" lang="ja-JP" altLang="en-US"/>
+          </a:p>
+        </p:txBody>
+      </p:sp>
+      <p:sp>
+        <p:nvSpPr>
+          <p:cNvPr id="19" name="テキスト ボックス 18">
+            <a:extLst>
+              <a:ext uri="{FF2B5EF4-FFF2-40B4-BE49-F238E27FC236}">
+                <a16:creationId xmlns:a16="http://schemas.microsoft.com/office/drawing/2014/main" id="{54D8EB49-04B9-CB2E-5C34-8FD562D3AF98}"/>
+              </a:ext>
+            </a:extLst>
+          </p:cNvPr>
+          <p:cNvSpPr txBox="1"/>
+          <p:nvPr/>
+        </p:nvSpPr>
+        <p:spPr>
+          <a:xfrm>
+            <a:off x="3965328" y="3464097"/>
+            <a:ext cx="1109599" cy="369332"/>
+          </a:xfrm>
+          <a:prstGeom prst="rect">
+            <a:avLst/>
+          </a:prstGeom>
+          <a:noFill/>
+        </p:spPr>
+        <p:txBody>
+          <a:bodyPr wrap="none" rtlCol="0">
+            <a:spAutoFit/>
+          </a:bodyPr>
+          <a:lstStyle/>
+          <a:p>
+            <a:r>
+              <a:rPr kumimoji="1" lang="en-US" altLang="ja-JP" dirty="0" err="1"/>
+              <a:t>sampleC</a:t>
+            </a:r>
+            <a:endParaRPr kumimoji="1" lang="ja-JP" altLang="en-US"/>
+          </a:p>
+        </p:txBody>
+      </p:sp>
+      <p:sp>
+        <p:nvSpPr>
+          <p:cNvPr id="20" name="テキスト ボックス 19">
+            <a:extLst>
+              <a:ext uri="{FF2B5EF4-FFF2-40B4-BE49-F238E27FC236}">
+                <a16:creationId xmlns:a16="http://schemas.microsoft.com/office/drawing/2014/main" id="{21789C65-A376-1772-B88F-14961E27DCDC}"/>
+              </a:ext>
+            </a:extLst>
+          </p:cNvPr>
+          <p:cNvSpPr txBox="1"/>
+          <p:nvPr/>
+        </p:nvSpPr>
+        <p:spPr>
+          <a:xfrm>
+            <a:off x="5699706" y="3854443"/>
+            <a:ext cx="1101584" cy="369332"/>
+          </a:xfrm>
+          <a:prstGeom prst="rect">
+            <a:avLst/>
+          </a:prstGeom>
+          <a:noFill/>
+        </p:spPr>
+        <p:txBody>
+          <a:bodyPr wrap="none" rtlCol="0">
+            <a:spAutoFit/>
+          </a:bodyPr>
+          <a:lstStyle/>
+          <a:p>
+            <a:r>
+              <a:rPr kumimoji="1" lang="en-US" altLang="ja-JP" dirty="0" err="1"/>
+              <a:t>sampleX</a:t>
+            </a:r>
+            <a:endParaRPr kumimoji="1" lang="ja-JP" altLang="en-US"/>
+          </a:p>
+        </p:txBody>
+      </p:sp>
+      <p:sp>
+        <p:nvSpPr>
+          <p:cNvPr id="21" name="テキスト ボックス 20">
+            <a:extLst>
+              <a:ext uri="{FF2B5EF4-FFF2-40B4-BE49-F238E27FC236}">
+                <a16:creationId xmlns:a16="http://schemas.microsoft.com/office/drawing/2014/main" id="{825E6553-E316-489C-FFB1-91371E9B8037}"/>
+              </a:ext>
+            </a:extLst>
+          </p:cNvPr>
+          <p:cNvSpPr txBox="1"/>
+          <p:nvPr/>
+        </p:nvSpPr>
+        <p:spPr>
+          <a:xfrm>
+            <a:off x="5284208" y="4460128"/>
+            <a:ext cx="415498" cy="369332"/>
+          </a:xfrm>
+          <a:prstGeom prst="rect">
+            <a:avLst/>
+          </a:prstGeom>
+          <a:noFill/>
+        </p:spPr>
+        <p:txBody>
+          <a:bodyPr wrap="none" rtlCol="0">
+            <a:spAutoFit/>
+          </a:bodyPr>
+          <a:lstStyle/>
+          <a:p>
+            <a:r>
+              <a:rPr lang="en-US" altLang="ja-JP" dirty="0"/>
+              <a:t>…</a:t>
+            </a:r>
+            <a:endParaRPr kumimoji="1" lang="ja-JP" altLang="en-US"/>
+          </a:p>
+        </p:txBody>
+      </p:sp>
+      <p:cxnSp>
+        <p:nvCxnSpPr>
+          <p:cNvPr id="25" name="直線矢印コネクタ 24">
+            <a:extLst>
+              <a:ext uri="{FF2B5EF4-FFF2-40B4-BE49-F238E27FC236}">
+                <a16:creationId xmlns:a16="http://schemas.microsoft.com/office/drawing/2014/main" id="{B1788ED2-3AB3-BFBA-AF7D-364A7E23C06E}"/>
+              </a:ext>
+            </a:extLst>
+          </p:cNvPr>
+          <p:cNvCxnSpPr>
+            <a:cxnSpLocks/>
+          </p:cNvCxnSpPr>
+          <p:nvPr/>
+        </p:nvCxnSpPr>
+        <p:spPr>
+          <a:xfrm>
+            <a:off x="1754955" y="3464097"/>
+            <a:ext cx="667551" cy="631770"/>
+          </a:xfrm>
+          <a:prstGeom prst="straightConnector1">
+            <a:avLst/>
+          </a:prstGeom>
+          <a:ln>
+            <a:tailEnd type="triangle"/>
+          </a:ln>
+        </p:spPr>
+        <p:style>
+          <a:lnRef idx="1">
+            <a:schemeClr val="accent1"/>
+          </a:lnRef>
+          <a:fillRef idx="0">
+            <a:schemeClr val="accent1"/>
+          </a:fillRef>
+          <a:effectRef idx="0">
+            <a:schemeClr val="accent1"/>
+          </a:effectRef>
+          <a:fontRef idx="minor">
+            <a:schemeClr val="tx1"/>
+          </a:fontRef>
+        </p:style>
+      </p:cxnSp>
+      <p:cxnSp>
+        <p:nvCxnSpPr>
+          <p:cNvPr id="28" name="直線矢印コネクタ 27">
+            <a:extLst>
+              <a:ext uri="{FF2B5EF4-FFF2-40B4-BE49-F238E27FC236}">
+                <a16:creationId xmlns:a16="http://schemas.microsoft.com/office/drawing/2014/main" id="{5C45B6EC-F29E-E530-6758-AC8CF32E194D}"/>
+              </a:ext>
+            </a:extLst>
+          </p:cNvPr>
+          <p:cNvCxnSpPr>
+            <a:cxnSpLocks/>
+          </p:cNvCxnSpPr>
+          <p:nvPr/>
+        </p:nvCxnSpPr>
+        <p:spPr>
+          <a:xfrm>
+            <a:off x="1754955" y="3464097"/>
+            <a:ext cx="2205180" cy="855734"/>
+          </a:xfrm>
+          <a:prstGeom prst="straightConnector1">
+            <a:avLst/>
+          </a:prstGeom>
+          <a:ln>
+            <a:tailEnd type="triangle"/>
+          </a:ln>
+        </p:spPr>
+        <p:style>
+          <a:lnRef idx="1">
+            <a:schemeClr val="accent1"/>
+          </a:lnRef>
+          <a:fillRef idx="0">
+            <a:schemeClr val="accent1"/>
+          </a:fillRef>
+          <a:effectRef idx="0">
+            <a:schemeClr val="accent1"/>
+          </a:effectRef>
+          <a:fontRef idx="minor">
+            <a:schemeClr val="tx1"/>
+          </a:fontRef>
+        </p:style>
+      </p:cxnSp>
+      <p:cxnSp>
+        <p:nvCxnSpPr>
+          <p:cNvPr id="31" name="直線矢印コネクタ 30">
+            <a:extLst>
+              <a:ext uri="{FF2B5EF4-FFF2-40B4-BE49-F238E27FC236}">
+                <a16:creationId xmlns:a16="http://schemas.microsoft.com/office/drawing/2014/main" id="{7A41A149-FD40-6730-7A8D-38BEB8F97F20}"/>
+              </a:ext>
+            </a:extLst>
+          </p:cNvPr>
+          <p:cNvCxnSpPr>
+            <a:cxnSpLocks/>
+          </p:cNvCxnSpPr>
+          <p:nvPr/>
+        </p:nvCxnSpPr>
+        <p:spPr>
+          <a:xfrm>
+            <a:off x="1754955" y="3464097"/>
+            <a:ext cx="3851316" cy="1761246"/>
+          </a:xfrm>
+          <a:prstGeom prst="straightConnector1">
+            <a:avLst/>
+          </a:prstGeom>
+          <a:ln>
+            <a:tailEnd type="triangle"/>
+          </a:ln>
+        </p:spPr>
+        <p:style>
+          <a:lnRef idx="1">
+            <a:schemeClr val="accent1"/>
+          </a:lnRef>
+          <a:fillRef idx="0">
+            <a:schemeClr val="accent1"/>
+          </a:fillRef>
+          <a:effectRef idx="0">
+            <a:schemeClr val="accent1"/>
+          </a:effectRef>
+          <a:fontRef idx="minor">
+            <a:schemeClr val="tx1"/>
+          </a:fontRef>
+        </p:style>
+      </p:cxnSp>
+      <p:sp>
+        <p:nvSpPr>
+          <p:cNvPr id="38" name="テキスト ボックス 37">
+            <a:extLst>
+              <a:ext uri="{FF2B5EF4-FFF2-40B4-BE49-F238E27FC236}">
+                <a16:creationId xmlns:a16="http://schemas.microsoft.com/office/drawing/2014/main" id="{D7AD9CDF-5DC3-415E-D6FE-71CAC1D492EF}"/>
+              </a:ext>
+            </a:extLst>
+          </p:cNvPr>
+          <p:cNvSpPr txBox="1"/>
+          <p:nvPr/>
+        </p:nvSpPr>
+        <p:spPr>
+          <a:xfrm>
+            <a:off x="64245" y="5562354"/>
+            <a:ext cx="4942439" cy="1200329"/>
+          </a:xfrm>
+          <a:prstGeom prst="rect">
+            <a:avLst/>
+          </a:prstGeom>
+          <a:noFill/>
+        </p:spPr>
+        <p:txBody>
+          <a:bodyPr wrap="square" rtlCol="0">
+            <a:spAutoFit/>
+          </a:bodyPr>
+          <a:lstStyle/>
+          <a:p>
+            <a:r>
+              <a:rPr kumimoji="1" lang="ja-JP" altLang="en-US"/>
+              <a:t>標本平均を多数集めると、その平均は母平均に一致するようになる（大数の法則）。</a:t>
+            </a:r>
+            <a:endParaRPr kumimoji="1" lang="en-US" altLang="ja-JP" dirty="0"/>
+          </a:p>
+          <a:p>
+            <a:r>
+              <a:rPr kumimoji="1" lang="ja-JP" altLang="en-US"/>
+              <a:t>標本平均を多数集めるとその分布は母平均を中心とした正規分布になる。</a:t>
+            </a:r>
+            <a:endParaRPr kumimoji="1" lang="en-US" altLang="ja-JP" dirty="0"/>
+          </a:p>
+        </p:txBody>
+      </p:sp>
+      <p:sp>
+        <p:nvSpPr>
+          <p:cNvPr id="39" name="円/楕円 38">
+            <a:extLst>
+              <a:ext uri="{FF2B5EF4-FFF2-40B4-BE49-F238E27FC236}">
+                <a16:creationId xmlns:a16="http://schemas.microsoft.com/office/drawing/2014/main" id="{E7249381-9FCA-AF35-9CA4-33551F0D899B}"/>
+              </a:ext>
+            </a:extLst>
+          </p:cNvPr>
+          <p:cNvSpPr/>
+          <p:nvPr/>
+        </p:nvSpPr>
+        <p:spPr>
+          <a:xfrm>
+            <a:off x="6920912" y="1712546"/>
+            <a:ext cx="1325563" cy="1325563"/>
+          </a:xfrm>
+          <a:prstGeom prst="ellipse">
+            <a:avLst/>
+          </a:prstGeom>
+          <a:solidFill>
+            <a:srgbClr val="002060"/>
+          </a:solidFill>
+        </p:spPr>
+        <p:style>
+          <a:lnRef idx="2">
+            <a:schemeClr val="accent1">
+              <a:shade val="50000"/>
+            </a:schemeClr>
+          </a:lnRef>
+          <a:fillRef idx="1">
+            <a:schemeClr val="accent1"/>
+          </a:fillRef>
+          <a:effectRef idx="0">
+            <a:schemeClr val="accent1"/>
+          </a:effectRef>
+          <a:fontRef idx="minor">
+            <a:schemeClr val="lt1"/>
+          </a:fontRef>
+        </p:style>
+        <p:txBody>
+          <a:bodyPr rtlCol="0" anchor="ctr"/>
+          <a:lstStyle/>
+          <a:p>
+            <a:pPr algn="ctr"/>
+            <a:r>
+              <a:rPr kumimoji="1" lang="ja-JP" altLang="en-US"/>
+              <a:t>母集団</a:t>
+            </a:r>
+          </a:p>
+        </p:txBody>
+      </p:sp>
+      <p:cxnSp>
+        <p:nvCxnSpPr>
+          <p:cNvPr id="40" name="直線矢印コネクタ 39">
+            <a:extLst>
+              <a:ext uri="{FF2B5EF4-FFF2-40B4-BE49-F238E27FC236}">
+                <a16:creationId xmlns:a16="http://schemas.microsoft.com/office/drawing/2014/main" id="{6202473A-22D0-B71F-6305-D1DA226641A1}"/>
+              </a:ext>
+            </a:extLst>
+          </p:cNvPr>
+          <p:cNvCxnSpPr>
+            <a:cxnSpLocks/>
+          </p:cNvCxnSpPr>
+          <p:nvPr/>
+        </p:nvCxnSpPr>
+        <p:spPr>
+          <a:xfrm flipV="1">
+            <a:off x="8246475" y="1951535"/>
+            <a:ext cx="1705400" cy="568040"/>
+          </a:xfrm>
+          <a:prstGeom prst="straightConnector1">
+            <a:avLst/>
+          </a:prstGeom>
+          <a:ln>
+            <a:tailEnd type="triangle"/>
+          </a:ln>
+        </p:spPr>
+        <p:style>
+          <a:lnRef idx="1">
+            <a:schemeClr val="accent1"/>
+          </a:lnRef>
+          <a:fillRef idx="0">
+            <a:schemeClr val="accent1"/>
+          </a:fillRef>
+          <a:effectRef idx="0">
+            <a:schemeClr val="accent1"/>
+          </a:effectRef>
+          <a:fontRef idx="minor">
+            <a:schemeClr val="tx1"/>
+          </a:fontRef>
+        </p:style>
+      </p:cxnSp>
+      <p:pic>
+        <p:nvPicPr>
+          <p:cNvPr id="41" name="図 40">
+            <a:extLst>
+              <a:ext uri="{FF2B5EF4-FFF2-40B4-BE49-F238E27FC236}">
+                <a16:creationId xmlns:a16="http://schemas.microsoft.com/office/drawing/2014/main" id="{9B8E6F2F-4C8F-85A2-0595-7DE2CE2F5D15}"/>
+              </a:ext>
+            </a:extLst>
+          </p:cNvPr>
+          <p:cNvPicPr>
+            <a:picLocks noChangeAspect="1"/>
+          </p:cNvPicPr>
+          <p:nvPr/>
+        </p:nvPicPr>
+        <p:blipFill>
+          <a:blip r:embed="rId3"/>
+          <a:stretch>
+            <a:fillRect/>
+          </a:stretch>
+        </p:blipFill>
+        <p:spPr>
+          <a:xfrm>
+            <a:off x="10403230" y="1413084"/>
+            <a:ext cx="1481202" cy="1794684"/>
+          </a:xfrm>
+          <a:prstGeom prst="rect">
+            <a:avLst/>
+          </a:prstGeom>
+        </p:spPr>
+      </p:pic>
+      <p:sp>
+        <p:nvSpPr>
+          <p:cNvPr id="42" name="テキスト ボックス 41">
+            <a:extLst>
+              <a:ext uri="{FF2B5EF4-FFF2-40B4-BE49-F238E27FC236}">
+                <a16:creationId xmlns:a16="http://schemas.microsoft.com/office/drawing/2014/main" id="{D6B22C5E-148C-6A1A-3077-F0C2B6C23A04}"/>
+              </a:ext>
+            </a:extLst>
+          </p:cNvPr>
+          <p:cNvSpPr txBox="1"/>
+          <p:nvPr/>
+        </p:nvSpPr>
+        <p:spPr>
+          <a:xfrm>
+            <a:off x="10345376" y="1204159"/>
+            <a:ext cx="1251143" cy="369332"/>
+          </a:xfrm>
+          <a:prstGeom prst="rect">
+            <a:avLst/>
+          </a:prstGeom>
+          <a:noFill/>
+        </p:spPr>
+        <p:txBody>
+          <a:bodyPr wrap="square" rtlCol="0">
+            <a:spAutoFit/>
+          </a:bodyPr>
+          <a:lstStyle/>
+          <a:p>
+            <a:r>
+              <a:rPr kumimoji="1" lang="en-US" altLang="ja-JP" dirty="0" err="1"/>
+              <a:t>sampleA</a:t>
+            </a:r>
+            <a:endParaRPr kumimoji="1" lang="ja-JP" altLang="en-US"/>
+          </a:p>
+        </p:txBody>
+      </p:sp>
+      <p:cxnSp>
+        <p:nvCxnSpPr>
+          <p:cNvPr id="43" name="直線矢印コネクタ 42">
+            <a:extLst>
+              <a:ext uri="{FF2B5EF4-FFF2-40B4-BE49-F238E27FC236}">
+                <a16:creationId xmlns:a16="http://schemas.microsoft.com/office/drawing/2014/main" id="{0487665C-961B-BB42-31F8-F3AF90D61099}"/>
+              </a:ext>
+            </a:extLst>
+          </p:cNvPr>
+          <p:cNvCxnSpPr>
+            <a:cxnSpLocks/>
+            <a:stCxn id="41" idx="1"/>
+          </p:cNvCxnSpPr>
+          <p:nvPr/>
+        </p:nvCxnSpPr>
+        <p:spPr>
+          <a:xfrm flipH="1">
+            <a:off x="8246475" y="2310426"/>
+            <a:ext cx="2156755" cy="345026"/>
+          </a:xfrm>
+          <a:prstGeom prst="straightConnector1">
+            <a:avLst/>
+          </a:prstGeom>
+          <a:ln w="47625">
+            <a:solidFill>
+              <a:srgbClr val="C00000"/>
+            </a:solidFill>
+            <a:prstDash val="sysDash"/>
+            <a:tailEnd type="triangle"/>
+          </a:ln>
+        </p:spPr>
+        <p:style>
+          <a:lnRef idx="1">
+            <a:schemeClr val="accent1"/>
+          </a:lnRef>
+          <a:fillRef idx="0">
+            <a:schemeClr val="accent1"/>
+          </a:fillRef>
+          <a:effectRef idx="0">
+            <a:schemeClr val="accent1"/>
+          </a:effectRef>
+          <a:fontRef idx="minor">
+            <a:schemeClr val="tx1"/>
+          </a:fontRef>
+        </p:style>
+      </p:cxnSp>
+      <p:sp>
+        <p:nvSpPr>
+          <p:cNvPr id="44" name="テキスト ボックス 43">
+            <a:extLst>
+              <a:ext uri="{FF2B5EF4-FFF2-40B4-BE49-F238E27FC236}">
+                <a16:creationId xmlns:a16="http://schemas.microsoft.com/office/drawing/2014/main" id="{D5560BAF-181A-3A02-C8F5-CE75102C741C}"/>
+              </a:ext>
+            </a:extLst>
+          </p:cNvPr>
+          <p:cNvSpPr txBox="1"/>
+          <p:nvPr/>
+        </p:nvSpPr>
+        <p:spPr>
+          <a:xfrm>
+            <a:off x="8473585" y="2590271"/>
+            <a:ext cx="1835312" cy="923330"/>
+          </a:xfrm>
+          <a:prstGeom prst="rect">
+            <a:avLst/>
+          </a:prstGeom>
+          <a:noFill/>
+        </p:spPr>
+        <p:txBody>
+          <a:bodyPr wrap="square" rtlCol="0">
+            <a:spAutoFit/>
+          </a:bodyPr>
+          <a:lstStyle/>
+          <a:p>
+            <a:r>
               <a:rPr lang="ja-JP" altLang="en-US"/>
-              <a:t>母数やモデルの推定のみならず、統計</a:t>
-            </a:r>
-            <a:r>
-              <a:rPr kumimoji="1" lang="ja-JP" altLang="en-US"/>
-              <a:t>モデルのモデル診断に用いる場合も．</a:t>
+              <a:t>標準誤差を</a:t>
+            </a:r>
+            <a:endParaRPr lang="en-US" altLang="ja-JP" dirty="0"/>
+          </a:p>
+          <a:p>
+            <a:r>
+              <a:rPr lang="ja-JP" altLang="en-US"/>
+              <a:t>つかって</a:t>
+            </a:r>
+            <a:endParaRPr lang="en-US" altLang="ja-JP" dirty="0"/>
+          </a:p>
+          <a:p>
+            <a:r>
+              <a:rPr lang="ja-JP" altLang="en-US"/>
+              <a:t>不確実性を算出</a:t>
+            </a:r>
+            <a:endParaRPr lang="en-US" altLang="ja-JP" dirty="0"/>
+          </a:p>
+        </p:txBody>
+      </p:sp>
+      <p:sp>
+        <p:nvSpPr>
+          <p:cNvPr id="45" name="テキスト ボックス 44">
+            <a:extLst>
+              <a:ext uri="{FF2B5EF4-FFF2-40B4-BE49-F238E27FC236}">
+                <a16:creationId xmlns:a16="http://schemas.microsoft.com/office/drawing/2014/main" id="{78B1DEDD-0DE1-8385-D89A-646A3DA80BA4}"/>
+              </a:ext>
+            </a:extLst>
+          </p:cNvPr>
+          <p:cNvSpPr txBox="1"/>
+          <p:nvPr/>
+        </p:nvSpPr>
+        <p:spPr>
+          <a:xfrm>
+            <a:off x="8396266" y="1502459"/>
+            <a:ext cx="1613463" cy="646331"/>
+          </a:xfrm>
+          <a:prstGeom prst="rect">
+            <a:avLst/>
+          </a:prstGeom>
+          <a:noFill/>
+        </p:spPr>
+        <p:txBody>
+          <a:bodyPr wrap="square" rtlCol="0">
+            <a:spAutoFit/>
+          </a:bodyPr>
+          <a:lstStyle/>
+          <a:p>
+            <a:r>
+              <a:rPr kumimoji="1" lang="ja-JP" altLang="en-US"/>
+              <a:t>ランダム</a:t>
             </a:r>
             <a:endParaRPr kumimoji="1" lang="en-US" altLang="ja-JP" dirty="0"/>
           </a:p>
           <a:p>
-            <a:pPr marL="0" indent="0">
-              <a:buNone/>
-            </a:pPr>
+            <a:r>
+              <a:rPr kumimoji="1" lang="ja-JP" altLang="en-US"/>
+              <a:t>サンプリング</a:t>
+            </a:r>
+          </a:p>
+        </p:txBody>
+      </p:sp>
+      <p:sp>
+        <p:nvSpPr>
+          <p:cNvPr id="67" name="円/楕円 66">
+            <a:extLst>
+              <a:ext uri="{FF2B5EF4-FFF2-40B4-BE49-F238E27FC236}">
+                <a16:creationId xmlns:a16="http://schemas.microsoft.com/office/drawing/2014/main" id="{A8B68851-19F3-8716-67E1-AFA04AAF566D}"/>
+              </a:ext>
+            </a:extLst>
+          </p:cNvPr>
+          <p:cNvSpPr/>
+          <p:nvPr/>
+        </p:nvSpPr>
+        <p:spPr>
+          <a:xfrm>
+            <a:off x="6981175" y="4204808"/>
+            <a:ext cx="1249303" cy="1249303"/>
+          </a:xfrm>
+          <a:prstGeom prst="ellipse">
+            <a:avLst/>
+          </a:prstGeom>
+          <a:solidFill>
+            <a:srgbClr val="002060"/>
+          </a:solidFill>
+        </p:spPr>
+        <p:style>
+          <a:lnRef idx="2">
+            <a:schemeClr val="accent1">
+              <a:shade val="50000"/>
+            </a:schemeClr>
+          </a:lnRef>
+          <a:fillRef idx="1">
+            <a:schemeClr val="accent1"/>
+          </a:fillRef>
+          <a:effectRef idx="0">
+            <a:schemeClr val="accent1"/>
+          </a:effectRef>
+          <a:fontRef idx="minor">
+            <a:schemeClr val="lt1"/>
+          </a:fontRef>
+        </p:style>
+        <p:txBody>
+          <a:bodyPr rtlCol="0" anchor="ctr"/>
+          <a:lstStyle/>
+          <a:p>
+            <a:pPr algn="ctr"/>
+            <a:r>
+              <a:rPr kumimoji="1" lang="ja-JP" altLang="en-US"/>
+              <a:t>母集団</a:t>
+            </a:r>
+          </a:p>
+        </p:txBody>
+      </p:sp>
+      <p:cxnSp>
+        <p:nvCxnSpPr>
+          <p:cNvPr id="68" name="直線矢印コネクタ 67">
+            <a:extLst>
+              <a:ext uri="{FF2B5EF4-FFF2-40B4-BE49-F238E27FC236}">
+                <a16:creationId xmlns:a16="http://schemas.microsoft.com/office/drawing/2014/main" id="{43EA9386-CE93-4B8F-B06B-4F400B972CAD}"/>
+              </a:ext>
+            </a:extLst>
+          </p:cNvPr>
+          <p:cNvCxnSpPr>
+            <a:cxnSpLocks/>
+          </p:cNvCxnSpPr>
+          <p:nvPr/>
+        </p:nvCxnSpPr>
+        <p:spPr>
+          <a:xfrm flipV="1">
+            <a:off x="8189293" y="4262718"/>
+            <a:ext cx="1760928" cy="404557"/>
+          </a:xfrm>
+          <a:prstGeom prst="straightConnector1">
+            <a:avLst/>
+          </a:prstGeom>
+          <a:ln>
+            <a:tailEnd type="triangle"/>
+          </a:ln>
+        </p:spPr>
+        <p:style>
+          <a:lnRef idx="1">
+            <a:schemeClr val="accent1"/>
+          </a:lnRef>
+          <a:fillRef idx="0">
+            <a:schemeClr val="accent1"/>
+          </a:fillRef>
+          <a:effectRef idx="0">
+            <a:schemeClr val="accent1"/>
+          </a:effectRef>
+          <a:fontRef idx="minor">
+            <a:schemeClr val="tx1"/>
+          </a:fontRef>
+        </p:style>
+      </p:cxnSp>
+      <p:pic>
+        <p:nvPicPr>
+          <p:cNvPr id="69" name="図 68">
+            <a:extLst>
+              <a:ext uri="{FF2B5EF4-FFF2-40B4-BE49-F238E27FC236}">
+                <a16:creationId xmlns:a16="http://schemas.microsoft.com/office/drawing/2014/main" id="{A2B8A285-1485-9BB9-B8BC-A14A9F441EC2}"/>
+              </a:ext>
+            </a:extLst>
+          </p:cNvPr>
+          <p:cNvPicPr>
+            <a:picLocks noChangeAspect="1"/>
+          </p:cNvPicPr>
+          <p:nvPr/>
+        </p:nvPicPr>
+        <p:blipFill>
+          <a:blip r:embed="rId3"/>
+          <a:stretch>
+            <a:fillRect/>
+          </a:stretch>
+        </p:blipFill>
+        <p:spPr>
+          <a:xfrm>
+            <a:off x="9946467" y="3672052"/>
+            <a:ext cx="1202142" cy="1456564"/>
+          </a:xfrm>
+          <a:prstGeom prst="rect">
+            <a:avLst/>
+          </a:prstGeom>
+        </p:spPr>
+      </p:pic>
+      <p:sp>
+        <p:nvSpPr>
+          <p:cNvPr id="70" name="テキスト ボックス 69">
+            <a:extLst>
+              <a:ext uri="{FF2B5EF4-FFF2-40B4-BE49-F238E27FC236}">
+                <a16:creationId xmlns:a16="http://schemas.microsoft.com/office/drawing/2014/main" id="{AC0E9B8B-FDAB-5C94-3261-7C56910E3225}"/>
+              </a:ext>
+            </a:extLst>
+          </p:cNvPr>
+          <p:cNvSpPr txBox="1"/>
+          <p:nvPr/>
+        </p:nvSpPr>
+        <p:spPr>
+          <a:xfrm>
+            <a:off x="10646022" y="3641396"/>
+            <a:ext cx="1147401" cy="369332"/>
+          </a:xfrm>
+          <a:prstGeom prst="rect">
+            <a:avLst/>
+          </a:prstGeom>
+          <a:noFill/>
+        </p:spPr>
+        <p:txBody>
+          <a:bodyPr wrap="square" rtlCol="0">
+            <a:spAutoFit/>
+          </a:bodyPr>
+          <a:lstStyle/>
+          <a:p>
+            <a:r>
+              <a:rPr kumimoji="1" lang="en-US" altLang="ja-JP" dirty="0" err="1"/>
+              <a:t>sampleA</a:t>
+            </a:r>
+            <a:endParaRPr kumimoji="1" lang="ja-JP" altLang="en-US"/>
+          </a:p>
+        </p:txBody>
+      </p:sp>
+      <p:cxnSp>
+        <p:nvCxnSpPr>
+          <p:cNvPr id="71" name="直線矢印コネクタ 70">
+            <a:extLst>
+              <a:ext uri="{FF2B5EF4-FFF2-40B4-BE49-F238E27FC236}">
+                <a16:creationId xmlns:a16="http://schemas.microsoft.com/office/drawing/2014/main" id="{DA25B7DC-95FA-D295-ADD2-85935978A445}"/>
+              </a:ext>
+            </a:extLst>
+          </p:cNvPr>
+          <p:cNvCxnSpPr>
+            <a:cxnSpLocks/>
+            <a:stCxn id="69" idx="1"/>
+          </p:cNvCxnSpPr>
+          <p:nvPr/>
+        </p:nvCxnSpPr>
+        <p:spPr>
+          <a:xfrm flipH="1">
+            <a:off x="8523162" y="4400334"/>
+            <a:ext cx="1423305" cy="641051"/>
+          </a:xfrm>
+          <a:prstGeom prst="straightConnector1">
+            <a:avLst/>
+          </a:prstGeom>
+          <a:ln w="12700">
+            <a:solidFill>
+              <a:srgbClr val="C00000"/>
+            </a:solidFill>
+            <a:prstDash val="sysDash"/>
+            <a:tailEnd type="triangle"/>
+          </a:ln>
+        </p:spPr>
+        <p:style>
+          <a:lnRef idx="1">
+            <a:schemeClr val="accent1"/>
+          </a:lnRef>
+          <a:fillRef idx="0">
+            <a:schemeClr val="accent1"/>
+          </a:fillRef>
+          <a:effectRef idx="0">
+            <a:schemeClr val="accent1"/>
+          </a:effectRef>
+          <a:fontRef idx="minor">
+            <a:schemeClr val="tx1"/>
+          </a:fontRef>
+        </p:style>
+      </p:cxnSp>
+      <p:sp>
+        <p:nvSpPr>
+          <p:cNvPr id="72" name="テキスト ボックス 71">
+            <a:extLst>
+              <a:ext uri="{FF2B5EF4-FFF2-40B4-BE49-F238E27FC236}">
+                <a16:creationId xmlns:a16="http://schemas.microsoft.com/office/drawing/2014/main" id="{928FEB5D-D3E7-3AB9-6991-DEF23ADA0A4D}"/>
+              </a:ext>
+            </a:extLst>
+          </p:cNvPr>
+          <p:cNvSpPr txBox="1"/>
+          <p:nvPr/>
+        </p:nvSpPr>
+        <p:spPr>
+          <a:xfrm>
+            <a:off x="8402619" y="3610464"/>
+            <a:ext cx="1568428" cy="646331"/>
+          </a:xfrm>
+          <a:prstGeom prst="rect">
+            <a:avLst/>
+          </a:prstGeom>
+          <a:noFill/>
+        </p:spPr>
+        <p:txBody>
+          <a:bodyPr wrap="square" rtlCol="0">
+            <a:spAutoFit/>
+          </a:bodyPr>
+          <a:lstStyle/>
+          <a:p>
+            <a:r>
+              <a:rPr kumimoji="1" lang="ja-JP" altLang="en-US"/>
+              <a:t>ランダム</a:t>
+            </a:r>
+            <a:endParaRPr kumimoji="1" lang="en-US" altLang="ja-JP" dirty="0"/>
+          </a:p>
+          <a:p>
+            <a:r>
+              <a:rPr kumimoji="1" lang="ja-JP" altLang="en-US"/>
+              <a:t>サンプリング</a:t>
+            </a:r>
+          </a:p>
+        </p:txBody>
+      </p:sp>
+      <p:sp>
+        <p:nvSpPr>
+          <p:cNvPr id="73" name="テキスト ボックス 72">
+            <a:extLst>
+              <a:ext uri="{FF2B5EF4-FFF2-40B4-BE49-F238E27FC236}">
+                <a16:creationId xmlns:a16="http://schemas.microsoft.com/office/drawing/2014/main" id="{BE7AAE0D-DEBD-0795-961D-A4A9F9C9F87E}"/>
+              </a:ext>
+            </a:extLst>
+          </p:cNvPr>
+          <p:cNvSpPr txBox="1"/>
+          <p:nvPr/>
+        </p:nvSpPr>
+        <p:spPr>
+          <a:xfrm>
+            <a:off x="8301562" y="4604373"/>
+            <a:ext cx="2136045" cy="923330"/>
+          </a:xfrm>
+          <a:prstGeom prst="rect">
+            <a:avLst/>
+          </a:prstGeom>
+          <a:noFill/>
+        </p:spPr>
+        <p:txBody>
+          <a:bodyPr wrap="square" rtlCol="0">
+            <a:spAutoFit/>
+          </a:bodyPr>
+          <a:lstStyle/>
+          <a:p>
+            <a:r>
+              <a:rPr lang="ja-JP" altLang="en-US"/>
+              <a:t>不確実性評価に</a:t>
+            </a:r>
             <a:endParaRPr lang="en-US" altLang="ja-JP" dirty="0"/>
           </a:p>
           <a:p>
             <a:r>
               <a:rPr lang="ja-JP" altLang="en-US"/>
-              <a:t>ブートストラップの種類</a:t>
+              <a:t>標準誤差が</a:t>
             </a:r>
             <a:endParaRPr lang="en-US" altLang="ja-JP" dirty="0"/>
           </a:p>
           <a:p>
-            <a:pPr lvl="1"/>
-            <a:r>
-              <a:rPr kumimoji="1" lang="ja-JP" altLang="en-US"/>
-              <a:t>パラメトリックブートストラップ</a:t>
-            </a:r>
-            <a:endParaRPr kumimoji="1" lang="en-US" altLang="ja-JP" dirty="0"/>
-          </a:p>
-          <a:p>
-            <a:pPr lvl="2"/>
-            <a:r>
-              <a:rPr kumimoji="1" lang="ja-JP" altLang="en-US"/>
-              <a:t>仮定したモデル（パラメトリック）をデータに当てはめて係数を推定し、モデルからランダムサンプリングで擬似サンプルを作る方法</a:t>
-            </a:r>
-            <a:endParaRPr kumimoji="1" lang="en-US" altLang="ja-JP" dirty="0"/>
-          </a:p>
-          <a:p>
-            <a:pPr lvl="2"/>
-            <a:endParaRPr kumimoji="1" lang="en-US" altLang="ja-JP" dirty="0"/>
-          </a:p>
-          <a:p>
-            <a:pPr lvl="1"/>
-            <a:r>
-              <a:rPr kumimoji="1" lang="ja-JP" altLang="en-US"/>
-              <a:t>残差のパラメトリックブートストラップ</a:t>
-            </a:r>
-            <a:endParaRPr kumimoji="1" lang="en-US" altLang="ja-JP" dirty="0"/>
-          </a:p>
-          <a:p>
-            <a:pPr lvl="2"/>
             <a:r>
               <a:rPr lang="ja-JP" altLang="en-US"/>
-              <a:t>サンプルが従う誤差構造を仮定の上、モデルから得られる残差（逸脱度）分布について標準誤差を利用し、乱数をつかって生成した残差を予測値に足して擬似サンプルを作る方法</a:t>
+              <a:t>つかえない</a:t>
             </a:r>
             <a:endParaRPr lang="en-US" altLang="ja-JP" dirty="0"/>
           </a:p>
-          <a:p>
-            <a:pPr lvl="2"/>
+        </p:txBody>
+      </p:sp>
+      <p:pic>
+        <p:nvPicPr>
+          <p:cNvPr id="74" name="図 73">
+            <a:extLst>
+              <a:ext uri="{FF2B5EF4-FFF2-40B4-BE49-F238E27FC236}">
+                <a16:creationId xmlns:a16="http://schemas.microsoft.com/office/drawing/2014/main" id="{FC94FC9B-0B71-E35F-930F-1C946E79DCF6}"/>
+              </a:ext>
+            </a:extLst>
+          </p:cNvPr>
+          <p:cNvPicPr>
+            <a:picLocks noChangeAspect="1"/>
+          </p:cNvPicPr>
+          <p:nvPr/>
+        </p:nvPicPr>
+        <p:blipFill>
+          <a:blip r:embed="rId4"/>
+          <a:stretch>
+            <a:fillRect/>
+          </a:stretch>
+        </p:blipFill>
+        <p:spPr>
+          <a:xfrm>
+            <a:off x="9285815" y="5752270"/>
+            <a:ext cx="775752" cy="939932"/>
+          </a:xfrm>
+          <a:prstGeom prst="rect">
+            <a:avLst/>
+          </a:prstGeom>
+        </p:spPr>
+      </p:pic>
+      <p:pic>
+        <p:nvPicPr>
+          <p:cNvPr id="75" name="図 74">
+            <a:extLst>
+              <a:ext uri="{FF2B5EF4-FFF2-40B4-BE49-F238E27FC236}">
+                <a16:creationId xmlns:a16="http://schemas.microsoft.com/office/drawing/2014/main" id="{9F2561F3-D96C-4463-9B7E-F8555CF255C1}"/>
+              </a:ext>
+            </a:extLst>
+          </p:cNvPr>
+          <p:cNvPicPr>
+            <a:picLocks noChangeAspect="1"/>
+          </p:cNvPicPr>
+          <p:nvPr/>
+        </p:nvPicPr>
+        <p:blipFill>
+          <a:blip r:embed="rId3"/>
+          <a:stretch>
+            <a:fillRect/>
+          </a:stretch>
+        </p:blipFill>
+        <p:spPr>
+          <a:xfrm>
+            <a:off x="8292458" y="5697796"/>
+            <a:ext cx="821888" cy="972432"/>
+          </a:xfrm>
+          <a:prstGeom prst="rect">
+            <a:avLst/>
+          </a:prstGeom>
+        </p:spPr>
+      </p:pic>
+      <p:pic>
+        <p:nvPicPr>
+          <p:cNvPr id="76" name="図 75">
+            <a:extLst>
+              <a:ext uri="{FF2B5EF4-FFF2-40B4-BE49-F238E27FC236}">
+                <a16:creationId xmlns:a16="http://schemas.microsoft.com/office/drawing/2014/main" id="{75FF6B0B-EAC7-5518-A570-9BC2A57ED1D7}"/>
+              </a:ext>
+            </a:extLst>
+          </p:cNvPr>
+          <p:cNvPicPr>
+            <a:picLocks noChangeAspect="1"/>
+          </p:cNvPicPr>
+          <p:nvPr/>
+        </p:nvPicPr>
+        <p:blipFill>
+          <a:blip r:embed="rId3"/>
+          <a:stretch>
+            <a:fillRect/>
+          </a:stretch>
+        </p:blipFill>
+        <p:spPr>
+          <a:xfrm>
+            <a:off x="10170059" y="5697796"/>
+            <a:ext cx="821888" cy="995832"/>
+          </a:xfrm>
+          <a:prstGeom prst="rect">
+            <a:avLst/>
+          </a:prstGeom>
+        </p:spPr>
+      </p:pic>
+      <p:pic>
+        <p:nvPicPr>
+          <p:cNvPr id="77" name="図 76">
+            <a:extLst>
+              <a:ext uri="{FF2B5EF4-FFF2-40B4-BE49-F238E27FC236}">
+                <a16:creationId xmlns:a16="http://schemas.microsoft.com/office/drawing/2014/main" id="{EA5A7757-D782-5549-8E33-69B17AD8485C}"/>
+              </a:ext>
+            </a:extLst>
+          </p:cNvPr>
+          <p:cNvPicPr>
+            <a:picLocks noChangeAspect="1"/>
+          </p:cNvPicPr>
+          <p:nvPr/>
+        </p:nvPicPr>
+        <p:blipFill>
+          <a:blip r:embed="rId3"/>
+          <a:stretch>
+            <a:fillRect/>
+          </a:stretch>
+        </p:blipFill>
+        <p:spPr>
+          <a:xfrm>
+            <a:off x="11070162" y="5697796"/>
+            <a:ext cx="821888" cy="995832"/>
+          </a:xfrm>
+          <a:prstGeom prst="rect">
+            <a:avLst/>
+          </a:prstGeom>
+        </p:spPr>
+      </p:pic>
+      <p:cxnSp>
+        <p:nvCxnSpPr>
+          <p:cNvPr id="78" name="直線矢印コネクタ 77">
+            <a:extLst>
+              <a:ext uri="{FF2B5EF4-FFF2-40B4-BE49-F238E27FC236}">
+                <a16:creationId xmlns:a16="http://schemas.microsoft.com/office/drawing/2014/main" id="{F4B5CD08-96A0-DE48-5CEA-AC143FE4CC56}"/>
+              </a:ext>
+            </a:extLst>
+          </p:cNvPr>
+          <p:cNvCxnSpPr>
+            <a:cxnSpLocks/>
+          </p:cNvCxnSpPr>
+          <p:nvPr/>
+        </p:nvCxnSpPr>
+        <p:spPr>
+          <a:xfrm flipH="1">
+            <a:off x="8808218" y="5093513"/>
+            <a:ext cx="1253349" cy="529132"/>
+          </a:xfrm>
+          <a:prstGeom prst="straightConnector1">
+            <a:avLst/>
+          </a:prstGeom>
+          <a:ln w="31750">
+            <a:solidFill>
+              <a:schemeClr val="accent6">
+                <a:lumMod val="75000"/>
+              </a:schemeClr>
+            </a:solidFill>
+            <a:prstDash val="solid"/>
+            <a:tailEnd type="triangle"/>
+          </a:ln>
+        </p:spPr>
+        <p:style>
+          <a:lnRef idx="1">
+            <a:schemeClr val="accent1"/>
+          </a:lnRef>
+          <a:fillRef idx="0">
+            <a:schemeClr val="accent1"/>
+          </a:fillRef>
+          <a:effectRef idx="0">
+            <a:schemeClr val="accent1"/>
+          </a:effectRef>
+          <a:fontRef idx="minor">
+            <a:schemeClr val="tx1"/>
+          </a:fontRef>
+        </p:style>
+      </p:cxnSp>
+      <p:cxnSp>
+        <p:nvCxnSpPr>
+          <p:cNvPr id="79" name="直線矢印コネクタ 78">
+            <a:extLst>
+              <a:ext uri="{FF2B5EF4-FFF2-40B4-BE49-F238E27FC236}">
+                <a16:creationId xmlns:a16="http://schemas.microsoft.com/office/drawing/2014/main" id="{C0BD0EE7-C4F5-E9A6-19BF-CBE4FC418801}"/>
+              </a:ext>
+            </a:extLst>
+          </p:cNvPr>
+          <p:cNvCxnSpPr>
+            <a:cxnSpLocks/>
+          </p:cNvCxnSpPr>
+          <p:nvPr/>
+        </p:nvCxnSpPr>
+        <p:spPr>
+          <a:xfrm flipH="1">
+            <a:off x="9648513" y="5222629"/>
+            <a:ext cx="644560" cy="466293"/>
+          </a:xfrm>
+          <a:prstGeom prst="straightConnector1">
+            <a:avLst/>
+          </a:prstGeom>
+          <a:ln w="31750">
+            <a:solidFill>
+              <a:schemeClr val="accent6">
+                <a:lumMod val="75000"/>
+              </a:schemeClr>
+            </a:solidFill>
+            <a:prstDash val="solid"/>
+            <a:tailEnd type="triangle"/>
+          </a:ln>
+        </p:spPr>
+        <p:style>
+          <a:lnRef idx="1">
+            <a:schemeClr val="accent1"/>
+          </a:lnRef>
+          <a:fillRef idx="0">
+            <a:schemeClr val="accent1"/>
+          </a:fillRef>
+          <a:effectRef idx="0">
+            <a:schemeClr val="accent1"/>
+          </a:effectRef>
+          <a:fontRef idx="minor">
+            <a:schemeClr val="tx1"/>
+          </a:fontRef>
+        </p:style>
+      </p:cxnSp>
+      <p:cxnSp>
+        <p:nvCxnSpPr>
+          <p:cNvPr id="80" name="直線矢印コネクタ 79">
+            <a:extLst>
+              <a:ext uri="{FF2B5EF4-FFF2-40B4-BE49-F238E27FC236}">
+                <a16:creationId xmlns:a16="http://schemas.microsoft.com/office/drawing/2014/main" id="{24D93E08-12F6-FA69-7F64-17F24D9D33B4}"/>
+              </a:ext>
+            </a:extLst>
+          </p:cNvPr>
+          <p:cNvCxnSpPr>
+            <a:cxnSpLocks/>
+          </p:cNvCxnSpPr>
+          <p:nvPr/>
+        </p:nvCxnSpPr>
+        <p:spPr>
+          <a:xfrm flipH="1">
+            <a:off x="10560595" y="5148685"/>
+            <a:ext cx="58458" cy="540237"/>
+          </a:xfrm>
+          <a:prstGeom prst="straightConnector1">
+            <a:avLst/>
+          </a:prstGeom>
+          <a:ln w="31750">
+            <a:solidFill>
+              <a:schemeClr val="accent6">
+                <a:lumMod val="75000"/>
+              </a:schemeClr>
+            </a:solidFill>
+            <a:prstDash val="solid"/>
+            <a:tailEnd type="triangle"/>
+          </a:ln>
+        </p:spPr>
+        <p:style>
+          <a:lnRef idx="1">
+            <a:schemeClr val="accent1"/>
+          </a:lnRef>
+          <a:fillRef idx="0">
+            <a:schemeClr val="accent1"/>
+          </a:fillRef>
+          <a:effectRef idx="0">
+            <a:schemeClr val="accent1"/>
+          </a:effectRef>
+          <a:fontRef idx="minor">
+            <a:schemeClr val="tx1"/>
+          </a:fontRef>
+        </p:style>
+      </p:cxnSp>
+      <p:cxnSp>
+        <p:nvCxnSpPr>
+          <p:cNvPr id="81" name="直線矢印コネクタ 80">
+            <a:extLst>
+              <a:ext uri="{FF2B5EF4-FFF2-40B4-BE49-F238E27FC236}">
+                <a16:creationId xmlns:a16="http://schemas.microsoft.com/office/drawing/2014/main" id="{A22D4D9B-B71B-4CDD-E3E9-814AF9D2C246}"/>
+              </a:ext>
+            </a:extLst>
+          </p:cNvPr>
+          <p:cNvCxnSpPr>
+            <a:cxnSpLocks/>
+            <a:endCxn id="77" idx="0"/>
+          </p:cNvCxnSpPr>
+          <p:nvPr/>
+        </p:nvCxnSpPr>
+        <p:spPr>
+          <a:xfrm>
+            <a:off x="10955640" y="5253499"/>
+            <a:ext cx="525466" cy="444297"/>
+          </a:xfrm>
+          <a:prstGeom prst="straightConnector1">
+            <a:avLst/>
+          </a:prstGeom>
+          <a:ln w="31750">
+            <a:solidFill>
+              <a:schemeClr val="accent6">
+                <a:lumMod val="75000"/>
+              </a:schemeClr>
+            </a:solidFill>
+            <a:prstDash val="solid"/>
+            <a:tailEnd type="triangle"/>
+          </a:ln>
+        </p:spPr>
+        <p:style>
+          <a:lnRef idx="1">
+            <a:schemeClr val="accent1"/>
+          </a:lnRef>
+          <a:fillRef idx="0">
+            <a:schemeClr val="accent1"/>
+          </a:fillRef>
+          <a:effectRef idx="0">
+            <a:schemeClr val="accent1"/>
+          </a:effectRef>
+          <a:fontRef idx="minor">
+            <a:schemeClr val="tx1"/>
+          </a:fontRef>
+        </p:style>
+      </p:cxnSp>
+      <p:sp>
+        <p:nvSpPr>
+          <p:cNvPr id="83" name="左中かっこ 82">
+            <a:extLst>
+              <a:ext uri="{FF2B5EF4-FFF2-40B4-BE49-F238E27FC236}">
+                <a16:creationId xmlns:a16="http://schemas.microsoft.com/office/drawing/2014/main" id="{FAA8FA89-A5F9-BECC-B5CD-C0D1CB3C4F55}"/>
+              </a:ext>
+            </a:extLst>
+          </p:cNvPr>
+          <p:cNvSpPr/>
+          <p:nvPr/>
+        </p:nvSpPr>
+        <p:spPr>
+          <a:xfrm>
+            <a:off x="7853723" y="5813472"/>
+            <a:ext cx="298630" cy="764479"/>
+          </a:xfrm>
+          <a:prstGeom prst="leftBrace">
+            <a:avLst/>
+          </a:prstGeom>
+        </p:spPr>
+        <p:style>
+          <a:lnRef idx="1">
+            <a:schemeClr val="accent1"/>
+          </a:lnRef>
+          <a:fillRef idx="0">
+            <a:schemeClr val="accent1"/>
+          </a:fillRef>
+          <a:effectRef idx="0">
+            <a:schemeClr val="accent1"/>
+          </a:effectRef>
+          <a:fontRef idx="minor">
+            <a:schemeClr val="tx1"/>
+          </a:fontRef>
+        </p:style>
+        <p:txBody>
+          <a:bodyPr rtlCol="0" anchor="ctr"/>
+          <a:lstStyle/>
+          <a:p>
+            <a:pPr algn="ctr"/>
+            <a:endParaRPr kumimoji="1" lang="ja-JP" altLang="en-US"/>
+          </a:p>
+        </p:txBody>
+      </p:sp>
+      <p:sp>
+        <p:nvSpPr>
+          <p:cNvPr id="84" name="テキスト ボックス 83">
+            <a:extLst>
+              <a:ext uri="{FF2B5EF4-FFF2-40B4-BE49-F238E27FC236}">
+                <a16:creationId xmlns:a16="http://schemas.microsoft.com/office/drawing/2014/main" id="{225EF47B-A8AD-FE46-FED8-0A1B108CA2E6}"/>
+              </a:ext>
+            </a:extLst>
+          </p:cNvPr>
+          <p:cNvSpPr txBox="1"/>
+          <p:nvPr/>
+        </p:nvSpPr>
+        <p:spPr>
+          <a:xfrm>
+            <a:off x="7007702" y="6578017"/>
+            <a:ext cx="3638319" cy="369332"/>
+          </a:xfrm>
+          <a:prstGeom prst="rect">
+            <a:avLst/>
+          </a:prstGeom>
+          <a:noFill/>
+        </p:spPr>
+        <p:txBody>
+          <a:bodyPr wrap="square" rtlCol="0">
+            <a:spAutoFit/>
+          </a:bodyPr>
+          <a:lstStyle/>
+          <a:p>
+            <a:r>
+              <a:rPr lang="ja-JP" altLang="en-US"/>
+              <a:t>擬似サンプルから不確実性を算出</a:t>
+            </a:r>
             <a:endParaRPr lang="en-US" altLang="ja-JP" dirty="0"/>
           </a:p>
-          <a:p>
-            <a:pPr lvl="1"/>
-            <a:r>
-              <a:rPr kumimoji="1" lang="ja-JP" altLang="en-US"/>
-              <a:t>残差のノンパラメトリックブートストラップ</a:t>
-            </a:r>
-            <a:r>
-              <a:rPr lang="en-US" altLang="ja-JP" dirty="0"/>
-              <a:t>(</a:t>
-            </a:r>
-            <a:r>
-              <a:rPr lang="ja-JP" altLang="en-US"/>
-              <a:t>最小絶対誤差、最小二乗誤差</a:t>
-            </a:r>
-            <a:r>
-              <a:rPr lang="en-US" altLang="ja-JP" dirty="0"/>
-              <a:t>)</a:t>
-            </a:r>
-            <a:endParaRPr kumimoji="1" lang="en-US" altLang="ja-JP" dirty="0"/>
-          </a:p>
-          <a:p>
-            <a:pPr lvl="2"/>
-            <a:r>
-              <a:rPr kumimoji="1" lang="ja-JP" altLang="en-US"/>
-              <a:t>サンプルの残差を重複を許してランダムリサンプリングし、擬似サンプルを生成する方法</a:t>
-            </a:r>
-            <a:endParaRPr kumimoji="1" lang="en-US" altLang="ja-JP" dirty="0"/>
-          </a:p>
-          <a:p>
-            <a:pPr lvl="2"/>
-            <a:endParaRPr kumimoji="1" lang="en-US" altLang="ja-JP" dirty="0"/>
-          </a:p>
-          <a:p>
-            <a:pPr lvl="1"/>
-            <a:r>
-              <a:rPr kumimoji="1" lang="ja-JP" altLang="en-US"/>
-              <a:t>データブートストラップ</a:t>
-            </a:r>
-            <a:endParaRPr kumimoji="1" lang="en-US" altLang="ja-JP" dirty="0"/>
-          </a:p>
-          <a:p>
-            <a:pPr lvl="2"/>
-            <a:r>
-              <a:rPr kumimoji="1" lang="ja-JP" altLang="en-US"/>
-              <a:t>サンプルのデータそのものを重複を許してランダムリサンプルし、擬似サンプルを生成する方法</a:t>
-            </a:r>
-            <a:endParaRPr kumimoji="1" lang="en-US" altLang="ja-JP" dirty="0"/>
-          </a:p>
-          <a:p>
-            <a:pPr lvl="2"/>
-            <a:endParaRPr lang="en-US" altLang="ja-JP" dirty="0"/>
-          </a:p>
-          <a:p>
-            <a:pPr lvl="2"/>
-            <a:endParaRPr kumimoji="1" lang="en-US" altLang="ja-JP" dirty="0"/>
-          </a:p>
-          <a:p>
-            <a:pPr lvl="1"/>
-            <a:endParaRPr kumimoji="1" lang="ja-JP" altLang="en-US"/>
+        </p:txBody>
+      </p:sp>
+      <p:sp>
+        <p:nvSpPr>
+          <p:cNvPr id="85" name="テキスト ボックス 84">
+            <a:extLst>
+              <a:ext uri="{FF2B5EF4-FFF2-40B4-BE49-F238E27FC236}">
+                <a16:creationId xmlns:a16="http://schemas.microsoft.com/office/drawing/2014/main" id="{A4710B74-6353-D3B6-3DCE-AD7DD211256D}"/>
+              </a:ext>
+            </a:extLst>
+          </p:cNvPr>
+          <p:cNvSpPr txBox="1"/>
+          <p:nvPr/>
+        </p:nvSpPr>
+        <p:spPr>
+          <a:xfrm>
+            <a:off x="11286067" y="4930334"/>
+            <a:ext cx="857606" cy="646331"/>
+          </a:xfrm>
+          <a:prstGeom prst="rect">
+            <a:avLst/>
+          </a:prstGeom>
+          <a:noFill/>
+        </p:spPr>
+        <p:txBody>
+          <a:bodyPr wrap="square" rtlCol="0">
+            <a:spAutoFit/>
+          </a:bodyPr>
+          <a:lstStyle/>
+          <a:p>
+            <a:r>
+              <a:rPr kumimoji="1" lang="ja-JP" altLang="en-US">
+                <a:solidFill>
+                  <a:schemeClr val="accent6">
+                    <a:lumMod val="50000"/>
+                  </a:schemeClr>
+                </a:solidFill>
+              </a:rPr>
+              <a:t>復元抽出</a:t>
+            </a:r>
           </a:p>
         </p:txBody>
       </p:sp>
     </p:spTree>
     <p:extLst>
       <p:ext uri="{BB962C8B-B14F-4D97-AF65-F5344CB8AC3E}">
-        <p14:creationId xmlns:p14="http://schemas.microsoft.com/office/powerpoint/2010/main" val="1289750521"/>
+        <p14:creationId xmlns:p14="http://schemas.microsoft.com/office/powerpoint/2010/main" val="1784561452"/>
       </p:ext>
     </p:extLst>
   </p:cSld>
@@ -7344,7 +9610,7 @@
           <p:cNvPr id="2" name="タイトル 1">
             <a:extLst>
               <a:ext uri="{FF2B5EF4-FFF2-40B4-BE49-F238E27FC236}">
-                <a16:creationId xmlns:a16="http://schemas.microsoft.com/office/drawing/2014/main" id="{8C97190D-EE09-B5DE-69DB-78CD5F02C04D}"/>
+                <a16:creationId xmlns:a16="http://schemas.microsoft.com/office/drawing/2014/main" id="{5D7BDEE0-CCBA-7B41-AA94-850779A2743E}"/>
               </a:ext>
             </a:extLst>
           </p:cNvPr>
@@ -7361,16 +9627,8 @@
           <a:lstStyle/>
           <a:p>
             <a:r>
-              <a:rPr kumimoji="1" lang="en-US" altLang="ja-JP" dirty="0"/>
-              <a:t>GLMM</a:t>
-            </a:r>
-            <a:r>
-              <a:rPr lang="ja-JP" altLang="en-US"/>
-              <a:t>での信頼区間</a:t>
-            </a:r>
-            <a:r>
-              <a:rPr kumimoji="1" lang="ja-JP" altLang="en-US"/>
-              <a:t>の算出</a:t>
+              <a:rPr kumimoji="1" lang="ja-JP" altLang="en-US"/>
+              <a:t>ブートストラップの方法</a:t>
             </a:r>
           </a:p>
         </p:txBody>
@@ -7380,7 +9638,7 @@
           <p:cNvPr id="3" name="コンテンツ プレースホルダー 2">
             <a:extLst>
               <a:ext uri="{FF2B5EF4-FFF2-40B4-BE49-F238E27FC236}">
-                <a16:creationId xmlns:a16="http://schemas.microsoft.com/office/drawing/2014/main" id="{2F4A5721-C364-2A49-4CD4-D4692357BC2E}"/>
+                <a16:creationId xmlns:a16="http://schemas.microsoft.com/office/drawing/2014/main" id="{D222E444-4FE7-FF48-85C5-193FD23C9F85}"/>
               </a:ext>
             </a:extLst>
           </p:cNvPr>
@@ -7391,34 +9649,27 @@
             <p:ph idx="1"/>
           </p:nvPr>
         </p:nvSpPr>
-        <p:spPr/>
+        <p:spPr>
+          <a:xfrm>
+            <a:off x="838200" y="1825624"/>
+            <a:ext cx="10515600" cy="4667251"/>
+          </a:xfrm>
+        </p:spPr>
         <p:txBody>
           <a:bodyPr>
-            <a:normAutofit/>
+            <a:normAutofit fontScale="85000" lnSpcReduction="20000"/>
           </a:bodyPr>
           <a:lstStyle/>
           <a:p>
             <a:r>
-              <a:rPr kumimoji="1" lang="en-US" altLang="ja-JP" dirty="0"/>
-              <a:t>GLMM</a:t>
-            </a:r>
-            <a:r>
-              <a:rPr kumimoji="1" lang="ja-JP" altLang="en-US"/>
-              <a:t>による</a:t>
-            </a:r>
-            <a:r>
-              <a:rPr kumimoji="1" lang="en-US" altLang="ja-JP" dirty="0"/>
-              <a:t>CPUE</a:t>
-            </a:r>
-            <a:r>
-              <a:rPr kumimoji="1" lang="ja-JP" altLang="en-US"/>
-              <a:t>標準化の推定結果に対する不確実性として信頼区間</a:t>
-            </a:r>
-            <a:r>
               <a:rPr lang="ja-JP" altLang="en-US"/>
-              <a:t>を算出してみる．</a:t>
-            </a:r>
-            <a:endParaRPr lang="en-US" altLang="ja-JP" dirty="0"/>
+              <a:t>母数やモデルの推定のみならず、統計</a:t>
+            </a:r>
+            <a:r>
+              <a:rPr kumimoji="1" lang="ja-JP" altLang="en-US"/>
+              <a:t>モデルのモデル診断に用いる場合も．</a:t>
+            </a:r>
+            <a:endParaRPr kumimoji="1" lang="en-US" altLang="ja-JP" dirty="0"/>
           </a:p>
           <a:p>
             <a:pPr marL="0" indent="0">
@@ -7429,59 +9680,108 @@
           <a:p>
             <a:r>
               <a:rPr lang="ja-JP" altLang="en-US"/>
-              <a:t>第</a:t>
+              <a:t>ブートストラップの種類</a:t>
+            </a:r>
+            <a:endParaRPr lang="en-US" altLang="ja-JP" dirty="0"/>
+          </a:p>
+          <a:p>
+            <a:pPr lvl="1"/>
+            <a:r>
+              <a:rPr kumimoji="1" lang="ja-JP" altLang="en-US"/>
+              <a:t>パラメトリックブートストラップ</a:t>
+            </a:r>
+            <a:endParaRPr kumimoji="1" lang="en-US" altLang="ja-JP" dirty="0"/>
+          </a:p>
+          <a:p>
+            <a:pPr lvl="2"/>
+            <a:r>
+              <a:rPr kumimoji="1" lang="ja-JP" altLang="en-US"/>
+              <a:t>仮定したモデル（パラメトリック）をデータに当てはめて係数を推定し、モデルからランダムサンプリングで擬似サンプルを作る方法</a:t>
+            </a:r>
+            <a:endParaRPr kumimoji="1" lang="en-US" altLang="ja-JP" dirty="0"/>
+          </a:p>
+          <a:p>
+            <a:pPr lvl="2"/>
+            <a:endParaRPr kumimoji="1" lang="en-US" altLang="ja-JP" dirty="0"/>
+          </a:p>
+          <a:p>
+            <a:pPr lvl="1"/>
+            <a:r>
+              <a:rPr kumimoji="1" lang="ja-JP" altLang="en-US"/>
+              <a:t>残差のパラメトリックブートストラップ</a:t>
+            </a:r>
+            <a:endParaRPr kumimoji="1" lang="en-US" altLang="ja-JP" dirty="0"/>
+          </a:p>
+          <a:p>
+            <a:pPr lvl="2"/>
+            <a:r>
+              <a:rPr lang="ja-JP" altLang="en-US"/>
+              <a:t>サンプルが従う誤差構造を仮定の上、モデルから得られる残差（逸脱度）分布について標準誤差を利用し、乱数をつかって生成した残差を予測値に足して擬似サンプルを作る方法</a:t>
+            </a:r>
+            <a:endParaRPr lang="en-US" altLang="ja-JP" dirty="0"/>
+          </a:p>
+          <a:p>
+            <a:pPr lvl="2"/>
+            <a:endParaRPr lang="en-US" altLang="ja-JP" dirty="0"/>
+          </a:p>
+          <a:p>
+            <a:pPr lvl="1"/>
+            <a:r>
+              <a:rPr kumimoji="1" lang="ja-JP" altLang="en-US"/>
+              <a:t>残差のノンパラメトリックブートストラップ</a:t>
             </a:r>
             <a:r>
               <a:rPr lang="en-US" altLang="ja-JP" dirty="0"/>
-              <a:t>24</a:t>
+              <a:t>(</a:t>
             </a:r>
             <a:r>
               <a:rPr lang="ja-JP" altLang="en-US"/>
-              <a:t>回と同様、</a:t>
+              <a:t>最小絶対誤差、最小二乗誤差</a:t>
             </a:r>
             <a:r>
               <a:rPr lang="en-US" altLang="ja-JP" dirty="0"/>
-              <a:t>simulate</a:t>
-            </a:r>
-            <a:r>
-              <a:rPr lang="ja-JP" altLang="en-US"/>
-              <a:t>関数を用いる．</a:t>
-            </a:r>
+              <a:t>)</a:t>
+            </a:r>
+            <a:endParaRPr kumimoji="1" lang="en-US" altLang="ja-JP" dirty="0"/>
+          </a:p>
+          <a:p>
+            <a:pPr lvl="2"/>
+            <a:r>
+              <a:rPr kumimoji="1" lang="ja-JP" altLang="en-US"/>
+              <a:t>サンプルの残差を重複を許してランダムリサンプリングし、擬似サンプルを生成する方法</a:t>
+            </a:r>
+            <a:endParaRPr kumimoji="1" lang="en-US" altLang="ja-JP" dirty="0"/>
+          </a:p>
+          <a:p>
+            <a:pPr lvl="2"/>
+            <a:endParaRPr kumimoji="1" lang="en-US" altLang="ja-JP" dirty="0"/>
+          </a:p>
+          <a:p>
+            <a:pPr lvl="1"/>
+            <a:r>
+              <a:rPr kumimoji="1" lang="ja-JP" altLang="en-US"/>
+              <a:t>データブートストラップ</a:t>
+            </a:r>
+            <a:endParaRPr kumimoji="1" lang="en-US" altLang="ja-JP" dirty="0"/>
+          </a:p>
+          <a:p>
+            <a:pPr lvl="2"/>
+            <a:r>
+              <a:rPr kumimoji="1" lang="ja-JP" altLang="en-US"/>
+              <a:t>サンプルのデータそのものを重複を許してランダムリサンプルし、擬似サンプルを生成する方法</a:t>
+            </a:r>
+            <a:endParaRPr kumimoji="1" lang="en-US" altLang="ja-JP" dirty="0"/>
+          </a:p>
+          <a:p>
+            <a:pPr lvl="2"/>
             <a:endParaRPr lang="en-US" altLang="ja-JP" dirty="0"/>
           </a:p>
           <a:p>
+            <a:pPr lvl="2"/>
+            <a:endParaRPr kumimoji="1" lang="en-US" altLang="ja-JP" dirty="0"/>
+          </a:p>
+          <a:p>
             <a:pPr lvl="1"/>
-            <a:r>
-              <a:rPr lang="ja-JP" altLang="en-US"/>
-              <a:t>ただし、</a:t>
-            </a:r>
-            <a:r>
-              <a:rPr lang="en-US" altLang="ja-JP" dirty="0" err="1"/>
-              <a:t>glmmML</a:t>
-            </a:r>
-            <a:r>
-              <a:rPr lang="ja-JP" altLang="en-US"/>
-              <a:t>の結果オブジェクトでは計算できないので、</a:t>
-            </a:r>
-            <a:r>
-              <a:rPr lang="en-US" altLang="ja-JP" dirty="0"/>
-              <a:t>GLMM</a:t>
-            </a:r>
-            <a:r>
-              <a:rPr lang="ja-JP" altLang="en-US"/>
-              <a:t>の推定に今回は</a:t>
-            </a:r>
-            <a:r>
-              <a:rPr lang="en-US" altLang="ja-JP" dirty="0" err="1"/>
-              <a:t>glmmTMB</a:t>
-            </a:r>
-            <a:r>
-              <a:rPr lang="ja-JP" altLang="en-US"/>
-              <a:t>をつかう．</a:t>
-            </a:r>
-            <a:endParaRPr lang="en-US" altLang="ja-JP" dirty="0"/>
-          </a:p>
-          <a:p>
             <a:endParaRPr kumimoji="1" lang="ja-JP" altLang="en-US"/>
           </a:p>
         </p:txBody>
@@ -7489,7 +9789,7 @@
     </p:spTree>
     <p:extLst>
       <p:ext uri="{BB962C8B-B14F-4D97-AF65-F5344CB8AC3E}">
-        <p14:creationId xmlns:p14="http://schemas.microsoft.com/office/powerpoint/2010/main" val="3189072716"/>
+        <p14:creationId xmlns:p14="http://schemas.microsoft.com/office/powerpoint/2010/main" val="1289750521"/>
       </p:ext>
     </p:extLst>
   </p:cSld>
@@ -7521,7 +9821,7 @@
           <p:cNvPr id="2" name="タイトル 1">
             <a:extLst>
               <a:ext uri="{FF2B5EF4-FFF2-40B4-BE49-F238E27FC236}">
-                <a16:creationId xmlns:a16="http://schemas.microsoft.com/office/drawing/2014/main" id="{757773AF-48D0-EA1A-57E2-880F9B4331AF}"/>
+                <a16:creationId xmlns:a16="http://schemas.microsoft.com/office/drawing/2014/main" id="{8C97190D-EE09-B5DE-69DB-78CD5F02C04D}"/>
               </a:ext>
             </a:extLst>
           </p:cNvPr>
@@ -7538,8 +9838,16 @@
           <a:lstStyle/>
           <a:p>
             <a:r>
-              <a:rPr kumimoji="1" lang="ja-JP" altLang="en-US"/>
-              <a:t>パラメータ推定法</a:t>
+              <a:rPr kumimoji="1" lang="en-US" altLang="ja-JP" dirty="0"/>
+              <a:t>GLMM</a:t>
+            </a:r>
+            <a:r>
+              <a:rPr lang="ja-JP" altLang="en-US"/>
+              <a:t>での信頼区間</a:t>
+            </a:r>
+            <a:r>
+              <a:rPr kumimoji="1" lang="ja-JP" altLang="en-US"/>
+              <a:t>の算出</a:t>
             </a:r>
           </a:p>
         </p:txBody>
@@ -7549,7 +9857,7 @@
           <p:cNvPr id="3" name="コンテンツ プレースホルダー 2">
             <a:extLst>
               <a:ext uri="{FF2B5EF4-FFF2-40B4-BE49-F238E27FC236}">
-                <a16:creationId xmlns:a16="http://schemas.microsoft.com/office/drawing/2014/main" id="{F3B5F435-E4B3-64FE-00B2-7FDB56B433E1}"/>
+                <a16:creationId xmlns:a16="http://schemas.microsoft.com/office/drawing/2014/main" id="{2F4A5721-C364-2A49-4CD4-D4692357BC2E}"/>
               </a:ext>
             </a:extLst>
           </p:cNvPr>
@@ -7560,12 +9868,7 @@
             <p:ph idx="1"/>
           </p:nvPr>
         </p:nvSpPr>
-        <p:spPr>
-          <a:xfrm>
-            <a:off x="838200" y="1825625"/>
-            <a:ext cx="11035748" cy="4667250"/>
-          </a:xfrm>
-        </p:spPr>
+        <p:spPr/>
         <p:txBody>
           <a:bodyPr>
             <a:normAutofit/>
@@ -7573,229 +9876,24 @@
           <a:lstStyle/>
           <a:p>
             <a:r>
-              <a:rPr kumimoji="1" lang="ja-JP" altLang="en-US"/>
-              <a:t>係数の推定では、観測値へのフィット具合を尤度で表現し、</a:t>
-            </a:r>
-            <a:r>
-              <a:rPr lang="en-US" altLang="ja-JP" dirty="0"/>
-              <a:t>    </a:t>
-            </a:r>
-            <a:r>
-              <a:rPr kumimoji="1" lang="ja-JP" altLang="en-US"/>
-              <a:t>（対数）尤度関数が最大になるように推定</a:t>
-            </a:r>
-            <a:endParaRPr kumimoji="1" lang="en-US" altLang="ja-JP" dirty="0"/>
-          </a:p>
-          <a:p>
-            <a:pPr lvl="1"/>
-            <a:r>
-              <a:rPr kumimoji="1" lang="ja-JP" altLang="en-US"/>
-              <a:t>→（対数）尤度関数に</a:t>
-            </a:r>
-            <a:r>
               <a:rPr kumimoji="1" lang="en-US" altLang="ja-JP" dirty="0"/>
-              <a:t>-1</a:t>
-            </a:r>
-            <a:r>
-              <a:rPr kumimoji="1" lang="ja-JP" altLang="en-US"/>
-              <a:t>をかけたものを最小化</a:t>
-            </a:r>
-            <a:endParaRPr kumimoji="1" lang="en-US" altLang="ja-JP" dirty="0"/>
-          </a:p>
-          <a:p>
-            <a:endParaRPr lang="en-US" altLang="ja-JP" dirty="0"/>
-          </a:p>
-          <a:p>
+              <a:t>GLMM</a:t>
+            </a:r>
+            <a:r>
+              <a:rPr kumimoji="1" lang="ja-JP" altLang="en-US"/>
+              <a:t>による</a:t>
+            </a:r>
+            <a:r>
+              <a:rPr kumimoji="1" lang="en-US" altLang="ja-JP" dirty="0"/>
+              <a:t>CPUE</a:t>
+            </a:r>
+            <a:r>
+              <a:rPr kumimoji="1" lang="ja-JP" altLang="en-US"/>
+              <a:t>標準化の推定結果に対する不確実性として信頼区間</a:t>
+            </a:r>
             <a:r>
               <a:rPr lang="ja-JP" altLang="en-US"/>
-              <a:t>関数の最小値を求める方法</a:t>
-            </a:r>
-            <a:endParaRPr lang="en-US" altLang="ja-JP" dirty="0"/>
-          </a:p>
-          <a:p>
-            <a:pPr lvl="1"/>
-            <a:r>
-              <a:rPr lang="en-US" altLang="ja-JP" dirty="0" err="1"/>
-              <a:t>Nelder</a:t>
-            </a:r>
-            <a:r>
-              <a:rPr lang="en-US" altLang="ja-JP" dirty="0"/>
-              <a:t>-Mead</a:t>
-            </a:r>
-            <a:r>
-              <a:rPr lang="ja-JP" altLang="en-US"/>
-              <a:t>（滑降シンプレックス）法（</a:t>
-            </a:r>
-            <a:r>
-              <a:rPr lang="en-US" altLang="ja-JP" dirty="0" err="1"/>
-              <a:t>optim</a:t>
-            </a:r>
-            <a:r>
-              <a:rPr lang="ja-JP" altLang="en-US"/>
-              <a:t>関数のデフォルト）</a:t>
-            </a:r>
-            <a:endParaRPr lang="en-US" altLang="ja-JP" dirty="0"/>
-          </a:p>
-          <a:p>
-            <a:pPr lvl="1"/>
-            <a:r>
-              <a:rPr lang="en-US" altLang="ja-JP" dirty="0"/>
-              <a:t>BFGF</a:t>
-            </a:r>
-            <a:r>
-              <a:rPr lang="ja-JP" altLang="en-US"/>
-              <a:t>（</a:t>
-            </a:r>
-            <a:r>
-              <a:rPr lang="en" altLang="ja-JP" b="0" i="0" dirty="0" err="1">
-                <a:solidFill>
-                  <a:srgbClr val="202122"/>
-                </a:solidFill>
-                <a:effectLst/>
-              </a:rPr>
-              <a:t>Broyden</a:t>
-            </a:r>
-            <a:r>
-              <a:rPr lang="en" altLang="ja-JP" b="0" i="0" dirty="0">
-                <a:solidFill>
-                  <a:srgbClr val="202122"/>
-                </a:solidFill>
-                <a:effectLst/>
-              </a:rPr>
-              <a:t>, Fletcher, Goldfarb, </a:t>
-            </a:r>
-            <a:r>
-              <a:rPr lang="en" altLang="ja-JP" b="0" i="0" dirty="0" err="1">
-                <a:solidFill>
-                  <a:srgbClr val="202122"/>
-                </a:solidFill>
-                <a:effectLst/>
-              </a:rPr>
-              <a:t>Shanno</a:t>
-            </a:r>
-            <a:r>
-              <a:rPr lang="ja-JP" altLang="en-US" b="0" i="0">
-                <a:solidFill>
-                  <a:srgbClr val="202122"/>
-                </a:solidFill>
-                <a:effectLst/>
-                <a:latin typeface="Arial" panose="020B0604020202020204" pitchFamily="34" charset="0"/>
-              </a:rPr>
-              <a:t>の頭文字</a:t>
-            </a:r>
-            <a:r>
-              <a:rPr lang="ja-JP" altLang="en-US"/>
-              <a:t>、準ニュートン）法</a:t>
-            </a:r>
-            <a:endParaRPr lang="en-US" altLang="ja-JP" dirty="0"/>
-          </a:p>
-          <a:p>
-            <a:pPr lvl="1"/>
-            <a:r>
-              <a:rPr lang="en-US" altLang="ja-JP" dirty="0"/>
-              <a:t>CG</a:t>
-            </a:r>
-            <a:r>
-              <a:rPr lang="ja-JP" altLang="en-US"/>
-              <a:t>（</a:t>
-            </a:r>
-            <a:r>
-              <a:rPr lang="en-US" altLang="ja-JP" dirty="0"/>
-              <a:t>Conjugate</a:t>
-            </a:r>
-            <a:r>
-              <a:rPr lang="ja-JP" altLang="en-US"/>
-              <a:t> </a:t>
-            </a:r>
-            <a:r>
-              <a:rPr lang="en-US" altLang="ja-JP" dirty="0"/>
-              <a:t>Gradient</a:t>
-            </a:r>
-            <a:r>
-              <a:rPr lang="ja-JP" altLang="en-US"/>
-              <a:t>、共役勾配）法</a:t>
-            </a:r>
-            <a:endParaRPr lang="en-US" altLang="ja-JP" dirty="0"/>
-          </a:p>
-          <a:p>
-            <a:pPr lvl="1"/>
-            <a:r>
-              <a:rPr lang="en-US" altLang="ja-JP" dirty="0"/>
-              <a:t>MCMC</a:t>
-            </a:r>
-            <a:r>
-              <a:rPr lang="ja-JP" altLang="en-US"/>
-              <a:t>（</a:t>
-            </a:r>
-            <a:r>
-              <a:rPr lang="en-US" altLang="ja-JP" dirty="0" err="1"/>
-              <a:t>Malkov</a:t>
-            </a:r>
-            <a:r>
-              <a:rPr lang="en-US" altLang="ja-JP" dirty="0"/>
-              <a:t> Chain Monte </a:t>
-            </a:r>
-            <a:r>
-              <a:rPr lang="en-US" altLang="ja-JP" dirty="0" err="1"/>
-              <a:t>Calro</a:t>
-            </a:r>
-            <a:r>
-              <a:rPr lang="ja-JP" altLang="en-US"/>
-              <a:t>）法</a:t>
-            </a:r>
-            <a:endParaRPr lang="en-US" altLang="ja-JP" dirty="0"/>
-          </a:p>
-          <a:p>
-            <a:pPr lvl="1"/>
-            <a:r>
-              <a:rPr lang="ja-JP" altLang="en-US"/>
-              <a:t>自動微分法、</a:t>
-            </a:r>
-            <a:r>
-              <a:rPr lang="en-US" altLang="ja-JP" dirty="0"/>
-              <a:t>R</a:t>
-            </a:r>
-            <a:r>
-              <a:rPr lang="ja-JP" altLang="en-US"/>
-              <a:t>では</a:t>
-            </a:r>
-            <a:r>
-              <a:rPr lang="en-US" altLang="ja-JP" dirty="0"/>
-              <a:t>TMB</a:t>
-            </a:r>
-            <a:r>
-              <a:rPr lang="ja-JP" altLang="en-US"/>
-              <a:t>（</a:t>
-            </a:r>
-            <a:r>
-              <a:rPr lang="en-US" altLang="ja-JP" dirty="0"/>
-              <a:t>Template Model Builder</a:t>
-            </a:r>
-            <a:r>
-              <a:rPr lang="ja-JP" altLang="en-US"/>
-              <a:t>）パッケージで実装</a:t>
-            </a:r>
-            <a:endParaRPr lang="en-US" altLang="ja-JP" dirty="0"/>
-          </a:p>
-          <a:p>
-            <a:pPr marL="457200" lvl="1" indent="0">
-              <a:buNone/>
-            </a:pPr>
-            <a:r>
-              <a:rPr lang="en-US" altLang="ja-JP" dirty="0"/>
-              <a:t>	</a:t>
-            </a:r>
-            <a:r>
-              <a:rPr lang="ja-JP" altLang="en-US"/>
-              <a:t>→</a:t>
-            </a:r>
-            <a:r>
-              <a:rPr lang="en-US" altLang="ja-JP" dirty="0" err="1"/>
-              <a:t>glmmTMB</a:t>
-            </a:r>
-            <a:r>
-              <a:rPr lang="ja-JP" altLang="en-US"/>
-              <a:t>ではこれを利用</a:t>
+              <a:t>を算出してみる．</a:t>
             </a:r>
             <a:endParaRPr lang="en-US" altLang="ja-JP" dirty="0"/>
           </a:p>
@@ -7803,6 +9901,64 @@
             <a:pPr marL="0" indent="0">
               <a:buNone/>
             </a:pPr>
+            <a:endParaRPr lang="en-US" altLang="ja-JP" dirty="0"/>
+          </a:p>
+          <a:p>
+            <a:r>
+              <a:rPr lang="ja-JP" altLang="en-US"/>
+              <a:t>第</a:t>
+            </a:r>
+            <a:r>
+              <a:rPr lang="en-US" altLang="ja-JP" dirty="0"/>
+              <a:t>24</a:t>
+            </a:r>
+            <a:r>
+              <a:rPr lang="ja-JP" altLang="en-US"/>
+              <a:t>回と同様、</a:t>
+            </a:r>
+            <a:r>
+              <a:rPr lang="en-US" altLang="ja-JP" dirty="0"/>
+              <a:t>simulate</a:t>
+            </a:r>
+            <a:r>
+              <a:rPr lang="ja-JP" altLang="en-US"/>
+              <a:t>関数を用いる．</a:t>
+            </a:r>
+            <a:endParaRPr lang="en-US" altLang="ja-JP" dirty="0"/>
+          </a:p>
+          <a:p>
+            <a:pPr lvl="1"/>
+            <a:r>
+              <a:rPr lang="ja-JP" altLang="en-US"/>
+              <a:t>ただし、</a:t>
+            </a:r>
+            <a:r>
+              <a:rPr lang="en-US" altLang="ja-JP" dirty="0" err="1"/>
+              <a:t>glmmML</a:t>
+            </a:r>
+            <a:r>
+              <a:rPr lang="ja-JP" altLang="en-US"/>
+              <a:t>の結果オブジェクトでは計算できないので、</a:t>
+            </a:r>
+            <a:r>
+              <a:rPr lang="en-US" altLang="ja-JP" dirty="0"/>
+              <a:t>GLMM</a:t>
+            </a:r>
+            <a:r>
+              <a:rPr lang="ja-JP" altLang="en-US"/>
+              <a:t>の推定に今回は</a:t>
+            </a:r>
+            <a:r>
+              <a:rPr lang="en-US" altLang="ja-JP" dirty="0" err="1"/>
+              <a:t>glmmTMB</a:t>
+            </a:r>
+            <a:r>
+              <a:rPr lang="ja-JP" altLang="en-US"/>
+              <a:t>をつかう．</a:t>
+            </a:r>
+            <a:endParaRPr lang="en-US" altLang="ja-JP" dirty="0"/>
+          </a:p>
+          <a:p>
             <a:endParaRPr kumimoji="1" lang="ja-JP" altLang="en-US"/>
           </a:p>
         </p:txBody>
@@ -7810,7 +9966,7 @@
     </p:spTree>
     <p:extLst>
       <p:ext uri="{BB962C8B-B14F-4D97-AF65-F5344CB8AC3E}">
-        <p14:creationId xmlns:p14="http://schemas.microsoft.com/office/powerpoint/2010/main" val="1032548093"/>
+        <p14:creationId xmlns:p14="http://schemas.microsoft.com/office/powerpoint/2010/main" val="3189072716"/>
       </p:ext>
     </p:extLst>
   </p:cSld>
@@ -7842,7 +9998,7 @@
           <p:cNvPr id="2" name="タイトル 1">
             <a:extLst>
               <a:ext uri="{FF2B5EF4-FFF2-40B4-BE49-F238E27FC236}">
-                <a16:creationId xmlns:a16="http://schemas.microsoft.com/office/drawing/2014/main" id="{40FC6021-826A-0942-A300-5E874250BDDB}"/>
+                <a16:creationId xmlns:a16="http://schemas.microsoft.com/office/drawing/2014/main" id="{757773AF-48D0-EA1A-57E2-880F9B4331AF}"/>
               </a:ext>
             </a:extLst>
           </p:cNvPr>
@@ -7859,22 +10015,9 @@
           <a:lstStyle/>
           <a:p>
             <a:r>
-              <a:rPr lang="en-US" altLang="ja-JP" dirty="0"/>
-              <a:t>95</a:t>
-            </a:r>
-            <a:r>
-              <a:rPr lang="ja-JP" altLang="en-US"/>
-              <a:t>％</a:t>
-            </a:r>
-            <a:r>
-              <a:rPr lang="en-US" altLang="ja-JP" dirty="0"/>
-              <a:t>CI</a:t>
-            </a:r>
-            <a:r>
-              <a:rPr lang="ja-JP" altLang="en-US"/>
-              <a:t>を求める</a:t>
-            </a:r>
-            <a:endParaRPr kumimoji="1" lang="ja-JP" altLang="en-US"/>
+              <a:rPr kumimoji="1" lang="ja-JP" altLang="en-US"/>
+              <a:t>パラメータ推定法</a:t>
+            </a:r>
           </a:p>
         </p:txBody>
       </p:sp>
@@ -7883,7 +10026,7 @@
           <p:cNvPr id="3" name="コンテンツ プレースホルダー 2">
             <a:extLst>
               <a:ext uri="{FF2B5EF4-FFF2-40B4-BE49-F238E27FC236}">
-                <a16:creationId xmlns:a16="http://schemas.microsoft.com/office/drawing/2014/main" id="{CDC8DD76-78D5-2C49-B9E9-B68EB5D157E7}"/>
+                <a16:creationId xmlns:a16="http://schemas.microsoft.com/office/drawing/2014/main" id="{F3B5F435-E4B3-64FE-00B2-7FDB56B433E1}"/>
               </a:ext>
             </a:extLst>
           </p:cNvPr>
@@ -7894,100 +10037,249 @@
             <p:ph idx="1"/>
           </p:nvPr>
         </p:nvSpPr>
-        <p:spPr/>
-        <p:txBody>
-          <a:bodyPr/>
-          <a:lstStyle/>
-          <a:p>
-            <a:r>
-              <a:rPr kumimoji="1" lang="ja-JP" altLang="en-US"/>
-              <a:t>まずは</a:t>
-            </a:r>
-            <a:r>
-              <a:rPr kumimoji="1" lang="en-US" altLang="ja-JP"/>
-              <a:t>cpuestandardize3.</a:t>
+        <p:spPr>
+          <a:xfrm>
+            <a:off x="838200" y="1825625"/>
+            <a:ext cx="11035748" cy="4667250"/>
+          </a:xfrm>
+        </p:spPr>
+        <p:txBody>
+          <a:bodyPr>
+            <a:normAutofit/>
+          </a:bodyPr>
+          <a:lstStyle/>
+          <a:p>
+            <a:r>
+              <a:rPr kumimoji="1" lang="ja-JP" altLang="en-US"/>
+              <a:t>係数の推定では、観測値へのフィット具合を尤度で表現し、</a:t>
+            </a:r>
+            <a:r>
+              <a:rPr lang="en-US" altLang="ja-JP" dirty="0"/>
+              <a:t>    </a:t>
+            </a:r>
+            <a:r>
+              <a:rPr kumimoji="1" lang="ja-JP" altLang="en-US"/>
+              <a:t>（対数）尤度関数が最大になるように推定</a:t>
+            </a:r>
+            <a:endParaRPr kumimoji="1" lang="en-US" altLang="ja-JP" dirty="0"/>
+          </a:p>
+          <a:p>
+            <a:pPr lvl="1"/>
+            <a:r>
+              <a:rPr kumimoji="1" lang="ja-JP" altLang="en-US"/>
+              <a:t>→（対数）尤度関数に</a:t>
             </a:r>
             <a:r>
               <a:rPr kumimoji="1" lang="en-US" altLang="ja-JP" dirty="0"/>
-              <a:t>csv</a:t>
-            </a:r>
+              <a:t>-1</a:t>
+            </a:r>
+            <a:r>
+              <a:rPr kumimoji="1" lang="ja-JP" altLang="en-US"/>
+              <a:t>をかけたものを最小化</a:t>
+            </a:r>
+            <a:endParaRPr kumimoji="1" lang="en-US" altLang="ja-JP" dirty="0"/>
+          </a:p>
+          <a:p>
+            <a:endParaRPr lang="en-US" altLang="ja-JP" dirty="0"/>
+          </a:p>
+          <a:p>
             <a:r>
               <a:rPr lang="ja-JP" altLang="en-US"/>
-              <a:t>データを読み込んで</a:t>
+              <a:t>関数の最小値を求める方法</a:t>
+            </a:r>
+            <a:endParaRPr lang="en-US" altLang="ja-JP" dirty="0"/>
+          </a:p>
+          <a:p>
+            <a:pPr lvl="1"/>
+            <a:r>
+              <a:rPr lang="en-US" altLang="ja-JP" dirty="0" err="1"/>
+              <a:t>Nelder</a:t>
             </a:r>
             <a:r>
               <a:rPr lang="en-US" altLang="ja-JP" dirty="0"/>
-              <a:t>CPUE</a:t>
+              <a:t>-Mead</a:t>
             </a:r>
             <a:r>
               <a:rPr lang="ja-JP" altLang="en-US"/>
-              <a:t>の標準化を行う．</a:t>
+              <a:t>（滑降シンプレックス）法（</a:t>
+            </a:r>
+            <a:r>
+              <a:rPr lang="en-US" altLang="ja-JP" dirty="0" err="1"/>
+              <a:t>optim</a:t>
+            </a:r>
+            <a:r>
+              <a:rPr lang="ja-JP" altLang="en-US"/>
+              <a:t>関数のデフォルト）</a:t>
             </a:r>
             <a:endParaRPr lang="en-US" altLang="ja-JP" dirty="0"/>
           </a:p>
           <a:p>
             <a:pPr lvl="1"/>
             <a:r>
-              <a:rPr kumimoji="1" lang="ja-JP" altLang="en-US"/>
-              <a:t>今回は</a:t>
-            </a:r>
-            <a:r>
-              <a:rPr kumimoji="1" lang="en-US" altLang="ja-JP" dirty="0"/>
-              <a:t>vessel</a:t>
-            </a:r>
-            <a:r>
-              <a:rPr kumimoji="1" lang="ja-JP" altLang="en-US"/>
-              <a:t>の数が多い→ランダム効果にして</a:t>
-            </a:r>
-            <a:r>
               <a:rPr lang="en-US" altLang="ja-JP" dirty="0"/>
-              <a:t>GLMM</a:t>
+              <a:t>BFGF</a:t>
             </a:r>
             <a:r>
               <a:rPr lang="ja-JP" altLang="en-US"/>
-              <a:t>を実行</a:t>
-            </a:r>
-            <a:endParaRPr kumimoji="1" lang="en-US" altLang="ja-JP" dirty="0"/>
+              <a:t>（</a:t>
+            </a:r>
+            <a:r>
+              <a:rPr lang="en" altLang="ja-JP" b="0" i="0" dirty="0" err="1">
+                <a:solidFill>
+                  <a:srgbClr val="202122"/>
+                </a:solidFill>
+                <a:effectLst/>
+              </a:rPr>
+              <a:t>Broyden</a:t>
+            </a:r>
+            <a:r>
+              <a:rPr lang="en" altLang="ja-JP" b="0" i="0" dirty="0">
+                <a:solidFill>
+                  <a:srgbClr val="202122"/>
+                </a:solidFill>
+                <a:effectLst/>
+              </a:rPr>
+              <a:t>, Fletcher, Goldfarb, </a:t>
+            </a:r>
+            <a:r>
+              <a:rPr lang="en" altLang="ja-JP" b="0" i="0" dirty="0" err="1">
+                <a:solidFill>
+                  <a:srgbClr val="202122"/>
+                </a:solidFill>
+                <a:effectLst/>
+              </a:rPr>
+              <a:t>Shanno</a:t>
+            </a:r>
+            <a:r>
+              <a:rPr lang="ja-JP" altLang="en-US" b="0" i="0">
+                <a:solidFill>
+                  <a:srgbClr val="202122"/>
+                </a:solidFill>
+                <a:effectLst/>
+                <a:latin typeface="Arial" panose="020B0604020202020204" pitchFamily="34" charset="0"/>
+              </a:rPr>
+              <a:t>の頭文字</a:t>
+            </a:r>
+            <a:r>
+              <a:rPr lang="ja-JP" altLang="en-US"/>
+              <a:t>、準ニュートン）法</a:t>
+            </a:r>
+            <a:endParaRPr lang="en-US" altLang="ja-JP" dirty="0"/>
+          </a:p>
+          <a:p>
+            <a:pPr lvl="1"/>
+            <a:r>
+              <a:rPr lang="en-US" altLang="ja-JP" dirty="0"/>
+              <a:t>CG</a:t>
+            </a:r>
+            <a:r>
+              <a:rPr lang="ja-JP" altLang="en-US"/>
+              <a:t>（</a:t>
+            </a:r>
+            <a:r>
+              <a:rPr lang="en-US" altLang="ja-JP" dirty="0"/>
+              <a:t>Conjugate</a:t>
+            </a:r>
+            <a:r>
+              <a:rPr lang="ja-JP" altLang="en-US"/>
+              <a:t> </a:t>
+            </a:r>
+            <a:r>
+              <a:rPr lang="en-US" altLang="ja-JP" dirty="0"/>
+              <a:t>Gradient</a:t>
+            </a:r>
+            <a:r>
+              <a:rPr lang="ja-JP" altLang="en-US"/>
+              <a:t>、共役勾配）法</a:t>
+            </a:r>
+            <a:endParaRPr lang="en-US" altLang="ja-JP" dirty="0"/>
+          </a:p>
+          <a:p>
+            <a:pPr lvl="1"/>
+            <a:r>
+              <a:rPr lang="en-US" altLang="ja-JP" dirty="0"/>
+              <a:t>MCMC</a:t>
+            </a:r>
+            <a:r>
+              <a:rPr lang="ja-JP" altLang="en-US"/>
+              <a:t>（</a:t>
+            </a:r>
+            <a:r>
+              <a:rPr lang="en-US" altLang="ja-JP" dirty="0" err="1"/>
+              <a:t>Malkov</a:t>
+            </a:r>
+            <a:r>
+              <a:rPr lang="en-US" altLang="ja-JP" dirty="0"/>
+              <a:t> Chain Monte </a:t>
+            </a:r>
+            <a:r>
+              <a:rPr lang="en-US" altLang="ja-JP" dirty="0" err="1"/>
+              <a:t>Calro</a:t>
+            </a:r>
+            <a:r>
+              <a:rPr lang="ja-JP" altLang="en-US"/>
+              <a:t>）法</a:t>
+            </a:r>
+            <a:endParaRPr lang="en-US" altLang="ja-JP" dirty="0"/>
+          </a:p>
+          <a:p>
+            <a:pPr lvl="1"/>
+            <a:r>
+              <a:rPr lang="ja-JP" altLang="en-US"/>
+              <a:t>自動微分法、</a:t>
+            </a:r>
+            <a:r>
+              <a:rPr lang="en-US" altLang="ja-JP" dirty="0"/>
+              <a:t>R</a:t>
+            </a:r>
+            <a:r>
+              <a:rPr lang="ja-JP" altLang="en-US"/>
+              <a:t>では</a:t>
+            </a:r>
+            <a:r>
+              <a:rPr lang="en-US" altLang="ja-JP" dirty="0"/>
+              <a:t>TMB</a:t>
+            </a:r>
+            <a:r>
+              <a:rPr lang="ja-JP" altLang="en-US"/>
+              <a:t>（</a:t>
+            </a:r>
+            <a:r>
+              <a:rPr lang="en-US" altLang="ja-JP" dirty="0"/>
+              <a:t>Template Model Builder</a:t>
+            </a:r>
+            <a:r>
+              <a:rPr lang="ja-JP" altLang="en-US"/>
+              <a:t>）パッケージで実装</a:t>
+            </a:r>
+            <a:endParaRPr lang="en-US" altLang="ja-JP" dirty="0"/>
+          </a:p>
+          <a:p>
+            <a:pPr marL="457200" lvl="1" indent="0">
+              <a:buNone/>
+            </a:pPr>
+            <a:r>
+              <a:rPr lang="en-US" altLang="ja-JP" dirty="0"/>
+              <a:t>	</a:t>
+            </a:r>
+            <a:r>
+              <a:rPr lang="ja-JP" altLang="en-US"/>
+              <a:t>→</a:t>
+            </a:r>
+            <a:r>
+              <a:rPr lang="en-US" altLang="ja-JP" dirty="0" err="1"/>
+              <a:t>glmmTMB</a:t>
+            </a:r>
+            <a:r>
+              <a:rPr lang="ja-JP" altLang="en-US"/>
+              <a:t>ではこれを利用</a:t>
+            </a:r>
+            <a:endParaRPr lang="en-US" altLang="ja-JP" dirty="0"/>
           </a:p>
           <a:p>
             <a:pPr marL="0" indent="0">
               <a:buNone/>
             </a:pPr>
-            <a:endParaRPr kumimoji="1" lang="en-US" altLang="ja-JP" dirty="0"/>
-          </a:p>
-          <a:p>
-            <a:r>
-              <a:rPr lang="en-US" altLang="ja-JP" dirty="0"/>
-              <a:t>100</a:t>
-            </a:r>
-            <a:r>
-              <a:rPr lang="ja-JP" altLang="en-US"/>
-              <a:t>個のデータセットを作成して標準化</a:t>
-            </a:r>
-            <a:r>
-              <a:rPr lang="en-US" altLang="ja-JP" dirty="0"/>
-              <a:t>CPUE</a:t>
-            </a:r>
-            <a:r>
-              <a:rPr lang="ja-JP" altLang="en-US"/>
-              <a:t>の</a:t>
-            </a:r>
-            <a:r>
-              <a:rPr lang="en-US" altLang="ja-JP" dirty="0"/>
-              <a:t>95</a:t>
-            </a:r>
-            <a:r>
-              <a:rPr lang="ja-JP" altLang="en-US"/>
-              <a:t>％</a:t>
-            </a:r>
-            <a:r>
-              <a:rPr lang="en-US" altLang="ja-JP" dirty="0"/>
-              <a:t>CI</a:t>
-            </a:r>
-            <a:r>
-              <a:rPr lang="ja-JP" altLang="en-US"/>
-              <a:t>を求めてみよう．</a:t>
-            </a:r>
             <a:endParaRPr kumimoji="1" lang="ja-JP" altLang="en-US"/>
           </a:p>
         </p:txBody>
@@ -7995,7 +10287,7 @@
     </p:spTree>
     <p:extLst>
       <p:ext uri="{BB962C8B-B14F-4D97-AF65-F5344CB8AC3E}">
-        <p14:creationId xmlns:p14="http://schemas.microsoft.com/office/powerpoint/2010/main" val="1629263179"/>
+        <p14:creationId xmlns:p14="http://schemas.microsoft.com/office/powerpoint/2010/main" val="1032548093"/>
       </p:ext>
     </p:extLst>
   </p:cSld>

</xml_diff>